<commit_message>
Chapter 2 Version 2 Update
</commit_message>
<xml_diff>
--- a/Presentation Materials/Chapter 2/Chapter 2 Presentation.pptx
+++ b/Presentation Materials/Chapter 2/Chapter 2 Presentation.pptx
@@ -16,22 +16,25 @@
     <p:sldId id="264" r:id="rId10"/>
     <p:sldId id="265" r:id="rId11"/>
     <p:sldId id="266" r:id="rId12"/>
-    <p:sldId id="267" r:id="rId13"/>
-    <p:sldId id="268" r:id="rId14"/>
-    <p:sldId id="269" r:id="rId15"/>
-    <p:sldId id="270" r:id="rId16"/>
-    <p:sldId id="271" r:id="rId17"/>
-    <p:sldId id="272" r:id="rId18"/>
-    <p:sldId id="273" r:id="rId19"/>
-    <p:sldId id="274" r:id="rId20"/>
-    <p:sldId id="275" r:id="rId21"/>
-    <p:sldId id="276" r:id="rId22"/>
-    <p:sldId id="277" r:id="rId23"/>
-    <p:sldId id="278" r:id="rId24"/>
-    <p:sldId id="279" r:id="rId25"/>
-    <p:sldId id="280" r:id="rId26"/>
-    <p:sldId id="281" r:id="rId27"/>
-    <p:sldId id="282" r:id="rId28"/>
+    <p:sldId id="283" r:id="rId13"/>
+    <p:sldId id="267" r:id="rId14"/>
+    <p:sldId id="268" r:id="rId15"/>
+    <p:sldId id="269" r:id="rId16"/>
+    <p:sldId id="270" r:id="rId17"/>
+    <p:sldId id="271" r:id="rId18"/>
+    <p:sldId id="284" r:id="rId19"/>
+    <p:sldId id="285" r:id="rId20"/>
+    <p:sldId id="272" r:id="rId21"/>
+    <p:sldId id="273" r:id="rId22"/>
+    <p:sldId id="274" r:id="rId23"/>
+    <p:sldId id="275" r:id="rId24"/>
+    <p:sldId id="276" r:id="rId25"/>
+    <p:sldId id="277" r:id="rId26"/>
+    <p:sldId id="278" r:id="rId27"/>
+    <p:sldId id="279" r:id="rId28"/>
+    <p:sldId id="280" r:id="rId29"/>
+    <p:sldId id="281" r:id="rId30"/>
+    <p:sldId id="282" r:id="rId31"/>
   </p:sldIdLst>
   <p:sldSz cx="12192000" cy="6858000"/>
   <p:notesSz cx="6858000" cy="9144000"/>
@@ -136,6 +139,18 @@
     </p:ext>
   </p:extLst>
 </p:presentation>
+</file>
+
+<file path=ppt/commentAuthors.xml><?xml version="1.0" encoding="utf-8"?>
+<p:cmAuthorLst xmlns:a="http://schemas.openxmlformats.org/drawingml/2006/main" xmlns:r="http://schemas.openxmlformats.org/officeDocument/2006/relationships" xmlns:p="http://schemas.openxmlformats.org/presentationml/2006/main">
+  <p:cmAuthor id="1" name="Chapman TSE" initials="CT" lastIdx="2" clrIdx="0">
+    <p:extLst>
+      <p:ext uri="{19B8F6BF-5375-455C-9EA6-DF929625EA0E}">
+        <p15:presenceInfo xmlns:p15="http://schemas.microsoft.com/office/powerpoint/2012/main" userId="bf82caa5ecae514f" providerId="Windows Live"/>
+      </p:ext>
+    </p:extLst>
+  </p:cmAuthor>
+</p:cmAuthorLst>
 </file>
 
 <file path=ppt/revisionInfo.xml><?xml version="1.0" encoding="utf-8"?>
@@ -359,6 +374,34 @@
 </pc:chgInfo>
 </file>
 
+<file path=ppt/comments/comment1.xml><?xml version="1.0" encoding="utf-8"?>
+<p:cmLst xmlns:a="http://schemas.openxmlformats.org/drawingml/2006/main" xmlns:r="http://schemas.openxmlformats.org/officeDocument/2006/relationships" xmlns:p="http://schemas.openxmlformats.org/presentationml/2006/main">
+  <p:cm authorId="1" dt="2020-03-07T20:28:12.689" idx="1">
+    <p:pos x="10" y="10"/>
+    <p:text>This slide can go behind the scene for examples.</p:text>
+    <p:extLst>
+      <p:ext uri="{C676402C-5697-4E1C-873F-D02D1690AC5C}">
+        <p15:threadingInfo xmlns:p15="http://schemas.microsoft.com/office/powerpoint/2012/main" timeZoneBias="480"/>
+      </p:ext>
+    </p:extLst>
+  </p:cm>
+</p:cmLst>
+</file>
+
+<file path=ppt/comments/comment2.xml><?xml version="1.0" encoding="utf-8"?>
+<p:cmLst xmlns:a="http://schemas.openxmlformats.org/drawingml/2006/main" xmlns:r="http://schemas.openxmlformats.org/officeDocument/2006/relationships" xmlns:p="http://schemas.openxmlformats.org/presentationml/2006/main">
+  <p:cm authorId="1" dt="2020-03-07T22:17:26.595" idx="2">
+    <p:pos x="10" y="10"/>
+    <p:text>Can use as an example slide. Can take out.</p:text>
+    <p:extLst>
+      <p:ext uri="{C676402C-5697-4E1C-873F-D02D1690AC5C}">
+        <p15:threadingInfo xmlns:p15="http://schemas.microsoft.com/office/powerpoint/2012/main" timeZoneBias="480"/>
+      </p:ext>
+    </p:extLst>
+  </p:cm>
+</p:cmLst>
+</file>
+
 <file path=ppt/slideLayouts/slideLayout1.xml><?xml version="1.0" encoding="utf-8"?>
 <p:sldLayout xmlns:a="http://schemas.openxmlformats.org/drawingml/2006/main" xmlns:r="http://schemas.openxmlformats.org/officeDocument/2006/relationships" xmlns:p="http://schemas.openxmlformats.org/presentationml/2006/main" type="title" preserve="1">
   <p:cSld name="Title Slide">
@@ -506,7 +549,7 @@
           <a:p>
             <a:fld id="{7BB7EBE7-1165-490E-81CC-9521196E8397}" type="datetimeFigureOut">
               <a:rPr lang="en-US" smtClean="0"/>
-              <a:t>3/1/2020</a:t>
+              <a:t>3/22/2020</a:t>
             </a:fld>
             <a:endParaRPr lang="en-US"/>
           </a:p>
@@ -704,7 +747,7 @@
           <a:p>
             <a:fld id="{7BB7EBE7-1165-490E-81CC-9521196E8397}" type="datetimeFigureOut">
               <a:rPr lang="en-US" smtClean="0"/>
-              <a:t>3/1/2020</a:t>
+              <a:t>3/22/2020</a:t>
             </a:fld>
             <a:endParaRPr lang="en-US"/>
           </a:p>
@@ -912,7 +955,7 @@
           <a:p>
             <a:fld id="{7BB7EBE7-1165-490E-81CC-9521196E8397}" type="datetimeFigureOut">
               <a:rPr lang="en-US" smtClean="0"/>
-              <a:t>3/1/2020</a:t>
+              <a:t>3/22/2020</a:t>
             </a:fld>
             <a:endParaRPr lang="en-US"/>
           </a:p>
@@ -1110,7 +1153,7 @@
           <a:p>
             <a:fld id="{7BB7EBE7-1165-490E-81CC-9521196E8397}" type="datetimeFigureOut">
               <a:rPr lang="en-US" smtClean="0"/>
-              <a:t>3/1/2020</a:t>
+              <a:t>3/22/2020</a:t>
             </a:fld>
             <a:endParaRPr lang="en-US"/>
           </a:p>
@@ -1385,7 +1428,7 @@
           <a:p>
             <a:fld id="{7BB7EBE7-1165-490E-81CC-9521196E8397}" type="datetimeFigureOut">
               <a:rPr lang="en-US" smtClean="0"/>
-              <a:t>3/1/2020</a:t>
+              <a:t>3/22/2020</a:t>
             </a:fld>
             <a:endParaRPr lang="en-US"/>
           </a:p>
@@ -1650,7 +1693,7 @@
           <a:p>
             <a:fld id="{7BB7EBE7-1165-490E-81CC-9521196E8397}" type="datetimeFigureOut">
               <a:rPr lang="en-US" smtClean="0"/>
-              <a:t>3/1/2020</a:t>
+              <a:t>3/22/2020</a:t>
             </a:fld>
             <a:endParaRPr lang="en-US"/>
           </a:p>
@@ -2062,7 +2105,7 @@
           <a:p>
             <a:fld id="{7BB7EBE7-1165-490E-81CC-9521196E8397}" type="datetimeFigureOut">
               <a:rPr lang="en-US" smtClean="0"/>
-              <a:t>3/1/2020</a:t>
+              <a:t>3/22/2020</a:t>
             </a:fld>
             <a:endParaRPr lang="en-US"/>
           </a:p>
@@ -2203,7 +2246,7 @@
           <a:p>
             <a:fld id="{7BB7EBE7-1165-490E-81CC-9521196E8397}" type="datetimeFigureOut">
               <a:rPr lang="en-US" smtClean="0"/>
-              <a:t>3/1/2020</a:t>
+              <a:t>3/22/2020</a:t>
             </a:fld>
             <a:endParaRPr lang="en-US"/>
           </a:p>
@@ -2316,7 +2359,7 @@
           <a:p>
             <a:fld id="{7BB7EBE7-1165-490E-81CC-9521196E8397}" type="datetimeFigureOut">
               <a:rPr lang="en-US" smtClean="0"/>
-              <a:t>3/1/2020</a:t>
+              <a:t>3/22/2020</a:t>
             </a:fld>
             <a:endParaRPr lang="en-US"/>
           </a:p>
@@ -2627,7 +2670,7 @@
           <a:p>
             <a:fld id="{7BB7EBE7-1165-490E-81CC-9521196E8397}" type="datetimeFigureOut">
               <a:rPr lang="en-US" smtClean="0"/>
-              <a:t>3/1/2020</a:t>
+              <a:t>3/22/2020</a:t>
             </a:fld>
             <a:endParaRPr lang="en-US"/>
           </a:p>
@@ -2915,7 +2958,7 @@
           <a:p>
             <a:fld id="{7BB7EBE7-1165-490E-81CC-9521196E8397}" type="datetimeFigureOut">
               <a:rPr lang="en-US" smtClean="0"/>
-              <a:t>3/1/2020</a:t>
+              <a:t>3/22/2020</a:t>
             </a:fld>
             <a:endParaRPr lang="en-US"/>
           </a:p>
@@ -3156,7 +3199,7 @@
           <a:p>
             <a:fld id="{7BB7EBE7-1165-490E-81CC-9521196E8397}" type="datetimeFigureOut">
               <a:rPr lang="en-US" smtClean="0"/>
-              <a:t>3/1/2020</a:t>
+              <a:t>3/22/2020</a:t>
             </a:fld>
             <a:endParaRPr lang="en-US"/>
           </a:p>
@@ -3687,7 +3730,7 @@
           <a:p>
             <a:r>
               <a:rPr lang="en-US" dirty="0"/>
-              <a:t>Example of Inference</a:t>
+              <a:t>Difference in Question Between Prediction and Inference</a:t>
             </a:r>
           </a:p>
         </p:txBody>
@@ -3715,19 +3758,19 @@
           <a:p>
             <a:r>
               <a:rPr lang="en-US" dirty="0"/>
-              <a:t>Suppose a person seeks to relate the values of homes to input such as crime rate, zoning, distance from a river, air quality, etc.</a:t>
-            </a:r>
-          </a:p>
-          <a:p>
-            <a:r>
-              <a:rPr lang="en-US" dirty="0"/>
-              <a:t>To this problem, there are two variation: Inference and Prediction.</a:t>
-            </a:r>
-          </a:p>
-          <a:p>
-            <a:r>
-              <a:rPr lang="en-US" dirty="0"/>
-              <a:t>A inference problem will looks like: How much extra will a house be worth if it has a view of the river?</a:t>
+              <a:t>Seeks to relate the values of homes to inputs.</a:t>
+            </a:r>
+          </a:p>
+          <a:p>
+            <a:r>
+              <a:rPr lang="en-US" dirty="0"/>
+              <a:t>Inputs such as crime rate, zoning, distance from a river, air quality, etc.</a:t>
+            </a:r>
+          </a:p>
+          <a:p>
+            <a:r>
+              <a:rPr lang="en-US" dirty="0"/>
+              <a:t>A inference problem will looks like: How much extra will a house worth if it has a view of the river?</a:t>
             </a:r>
           </a:p>
           <a:p>
@@ -3754,6 +3797,14 @@
 <file path=ppt/slides/slide11.xml><?xml version="1.0" encoding="utf-8"?>
 <p:sld xmlns:a="http://schemas.openxmlformats.org/drawingml/2006/main" xmlns:r="http://schemas.openxmlformats.org/officeDocument/2006/relationships" xmlns:p="http://schemas.openxmlformats.org/presentationml/2006/main">
   <p:cSld>
+    <p:bg>
+      <p:bgPr>
+        <a:solidFill>
+          <a:schemeClr val="bg1"/>
+        </a:solidFill>
+        <a:effectLst/>
+      </p:bgPr>
+    </p:bg>
     <p:spTree>
       <p:nvGrpSpPr>
         <p:cNvPr id="1" name=""/>
@@ -3784,9 +3835,16 @@
             <p:ph type="title"/>
           </p:nvPr>
         </p:nvSpPr>
-        <p:spPr/>
-        <p:txBody>
-          <a:bodyPr/>
+        <p:spPr>
+          <a:xfrm>
+            <a:off x="648929" y="629266"/>
+            <a:ext cx="5127031" cy="1676603"/>
+          </a:xfrm>
+        </p:spPr>
+        <p:txBody>
+          <a:bodyPr>
+            <a:normAutofit/>
+          </a:bodyPr>
           <a:lstStyle/>
           <a:p>
             <a:r>
@@ -3820,146 +3878,95 @@
             <p:ph idx="1"/>
           </p:nvPr>
         </p:nvSpPr>
-        <p:spPr/>
+        <p:spPr>
+          <a:xfrm>
+            <a:off x="648930" y="2438400"/>
+            <a:ext cx="5127029" cy="3785419"/>
+          </a:xfrm>
+        </p:spPr>
         <p:txBody>
           <a:bodyPr>
-            <a:normAutofit fontScale="85000" lnSpcReduction="20000"/>
+            <a:normAutofit/>
           </a:bodyPr>
           <a:lstStyle/>
           <a:p>
             <a:r>
-              <a:rPr lang="en-US" dirty="0"/>
-              <a:t>Need to always assume that we have observed a set of n different data point.</a:t>
-            </a:r>
-          </a:p>
-          <a:p>
-            <a:r>
-              <a:rPr lang="en-US" dirty="0"/>
-              <a:t>EX: observed n = 30 data points.</a:t>
-            </a:r>
-          </a:p>
-          <a:p>
-            <a:r>
-              <a:rPr lang="en-US" dirty="0"/>
+              <a:rPr lang="en-US" sz="2400" dirty="0"/>
+              <a:t>Need to always assume that we have observed a set of n different data points.</a:t>
+            </a:r>
+          </a:p>
+          <a:p>
+            <a:r>
+              <a:rPr lang="en-US" sz="2400" dirty="0"/>
               <a:t>These observations are called the </a:t>
             </a:r>
             <a:r>
-              <a:rPr lang="en-US" b="1" dirty="0"/>
-              <a:t>training data </a:t>
-            </a:r>
-            <a:r>
-              <a:rPr lang="en-US" dirty="0"/>
-              <a:t>because we will use these observations to train the method on how to estimate </a:t>
-            </a:r>
-            <a:r>
-              <a:rPr lang="en-US" i="1" dirty="0"/>
+              <a:rPr lang="en-US" sz="2400" b="1" dirty="0"/>
+              <a:t>training data</a:t>
+            </a:r>
+          </a:p>
+          <a:p>
+            <a:r>
+              <a:rPr lang="en-US" sz="2400" dirty="0"/>
+              <a:t>Use these observations to train the method on how to estimate </a:t>
+            </a:r>
+            <a:r>
+              <a:rPr lang="en-US" sz="2400" i="1" dirty="0"/>
               <a:t>f.</a:t>
             </a:r>
           </a:p>
           <a:p>
             <a:r>
-              <a:rPr lang="en-US" dirty="0"/>
-              <a:t>Let </a:t>
-            </a:r>
-            <a:r>
-              <a:rPr lang="en-US" sz="3200" dirty="0" err="1"/>
-              <a:t>x</a:t>
-            </a:r>
-            <a:r>
-              <a:rPr lang="en-US" sz="2000" dirty="0" err="1"/>
-              <a:t>ij</a:t>
-            </a:r>
-            <a:r>
-              <a:rPr lang="en-US" dirty="0"/>
-              <a:t> represent the value of </a:t>
-            </a:r>
-            <a:r>
-              <a:rPr lang="en-US" dirty="0" err="1"/>
-              <a:t>jth</a:t>
-            </a:r>
-            <a:r>
-              <a:rPr lang="en-US" dirty="0"/>
-              <a:t> predictor/input for observation I, where 0 &lt; </a:t>
-            </a:r>
-            <a:r>
-              <a:rPr lang="en-US" dirty="0" err="1"/>
-              <a:t>i</a:t>
-            </a:r>
-            <a:r>
-              <a:rPr lang="en-US" dirty="0"/>
-              <a:t> &lt;= n and 0 &lt; j &lt;= p.</a:t>
-            </a:r>
-          </a:p>
-          <a:p>
-            <a:r>
-              <a:rPr lang="en-US" dirty="0"/>
-              <a:t>Correspondingly, let </a:t>
-            </a:r>
-            <a:r>
-              <a:rPr lang="en-US" sz="3200" dirty="0" err="1"/>
-              <a:t>y</a:t>
-            </a:r>
-            <a:r>
-              <a:rPr lang="en-US" sz="2000" dirty="0" err="1"/>
-              <a:t>i</a:t>
-            </a:r>
-            <a:r>
-              <a:rPr lang="en-US" dirty="0"/>
-              <a:t> represent the response variable for </a:t>
-            </a:r>
-            <a:r>
-              <a:rPr lang="en-US" dirty="0" err="1"/>
-              <a:t>ith</a:t>
-            </a:r>
-            <a:r>
-              <a:rPr lang="en-US" dirty="0"/>
-              <a:t> observation.</a:t>
-            </a:r>
-          </a:p>
-          <a:p>
-            <a:r>
-              <a:rPr lang="en-US" dirty="0"/>
-              <a:t>Under this situation, the training data consist of { (x1, y1), (x2, y2), … , (</a:t>
-            </a:r>
-            <a:r>
-              <a:rPr lang="en-US" dirty="0" err="1"/>
-              <a:t>xn,yn</a:t>
-            </a:r>
-            <a:r>
-              <a:rPr lang="en-US" dirty="0"/>
-              <a:t>)} where x</a:t>
-            </a:r>
-            <a:r>
-              <a:rPr lang="en-US" sz="2000" dirty="0"/>
-              <a:t>i</a:t>
-            </a:r>
-            <a:r>
-              <a:rPr lang="en-US" dirty="0"/>
-              <a:t> = (xi1, xi2, …, </a:t>
-            </a:r>
-            <a:r>
-              <a:rPr lang="en-US" dirty="0" err="1"/>
-              <a:t>xip</a:t>
-            </a:r>
-            <a:r>
-              <a:rPr lang="en-US" dirty="0"/>
-              <a:t>) T</a:t>
-            </a:r>
-          </a:p>
-          <a:p>
-            <a:r>
-              <a:rPr lang="en-US" dirty="0"/>
-              <a:t>The goal is the find function ^f that input X will output Y.</a:t>
-            </a:r>
-          </a:p>
-          <a:p>
-            <a:r>
-              <a:rPr lang="en-US" dirty="0"/>
-              <a:t>Most statistical learning methods for this task can be characterized as either parametric or non-parametric.</a:t>
-            </a:r>
-          </a:p>
-        </p:txBody>
-      </p:sp>
+              <a:rPr lang="en-US" sz="2400" dirty="0"/>
+              <a:t>The goal is to estimate the unknown function </a:t>
+            </a:r>
+            <a:r>
+              <a:rPr lang="en-US" sz="2400" i="1" dirty="0"/>
+              <a:t>f</a:t>
+            </a:r>
+            <a:r>
+              <a:rPr lang="en-US" sz="2400" dirty="0"/>
+              <a:t>.</a:t>
+            </a:r>
+          </a:p>
+        </p:txBody>
+      </p:sp>
+      <p:pic>
+        <p:nvPicPr>
+          <p:cNvPr id="7" name="Picture 6" descr="A screenshot of a cell phone&#10;&#10;Description automatically generated">
+            <a:extLst>
+              <a:ext uri="{FF2B5EF4-FFF2-40B4-BE49-F238E27FC236}">
+                <a16:creationId xmlns:a16="http://schemas.microsoft.com/office/drawing/2014/main" id="{86B77466-8C68-4B63-BBB5-67CB14343A38}"/>
+              </a:ext>
+            </a:extLst>
+          </p:cNvPr>
+          <p:cNvPicPr>
+            <a:picLocks noChangeAspect="1"/>
+          </p:cNvPicPr>
+          <p:nvPr/>
+        </p:nvPicPr>
+        <p:blipFill>
+          <a:blip r:embed="rId2">
+            <a:extLst>
+              <a:ext uri="{28A0092B-C50C-407E-A947-70E740481C1C}">
+                <a14:useLocalDpi xmlns:a14="http://schemas.microsoft.com/office/drawing/2010/main" val="0"/>
+              </a:ext>
+            </a:extLst>
+          </a:blip>
+          <a:stretch>
+            <a:fillRect/>
+          </a:stretch>
+        </p:blipFill>
+        <p:spPr>
+          <a:xfrm>
+            <a:off x="6095999" y="186541"/>
+            <a:ext cx="5277531" cy="6037278"/>
+          </a:xfrm>
+          <a:prstGeom prst="rect">
+            <a:avLst/>
+          </a:prstGeom>
+        </p:spPr>
+      </p:pic>
     </p:spTree>
     <p:extLst>
       <p:ext uri="{BB962C8B-B14F-4D97-AF65-F5344CB8AC3E}">
@@ -3995,7 +4002,7 @@
           <p:cNvPr id="2" name="Title 1">
             <a:extLst>
               <a:ext uri="{FF2B5EF4-FFF2-40B4-BE49-F238E27FC236}">
-                <a16:creationId xmlns:a16="http://schemas.microsoft.com/office/drawing/2014/main" id="{DE35BFC0-E6FC-4406-993D-557A216095DF}"/>
+                <a16:creationId xmlns:a16="http://schemas.microsoft.com/office/drawing/2014/main" id="{3F49996C-C6C5-4B9B-A31E-6D2568C6EB98}"/>
               </a:ext>
             </a:extLst>
           </p:cNvPr>
@@ -4013,148 +4020,342 @@
           <a:p>
             <a:r>
               <a:rPr lang="en-US" dirty="0"/>
-              <a:t>Parametric</a:t>
-            </a:r>
-          </a:p>
-        </p:txBody>
-      </p:sp>
-      <p:sp>
-        <p:nvSpPr>
-          <p:cNvPr id="3" name="Content Placeholder 2">
-            <a:extLst>
-              <a:ext uri="{FF2B5EF4-FFF2-40B4-BE49-F238E27FC236}">
-                <a16:creationId xmlns:a16="http://schemas.microsoft.com/office/drawing/2014/main" id="{5CB6DCB9-0865-4491-BC79-7445EF53CB5F}"/>
-              </a:ext>
-            </a:extLst>
-          </p:cNvPr>
-          <p:cNvSpPr>
-            <a:spLocks noGrp="1"/>
-          </p:cNvSpPr>
-          <p:nvPr>
-            <p:ph idx="1"/>
-          </p:nvPr>
-        </p:nvSpPr>
-        <p:spPr/>
-        <p:txBody>
-          <a:bodyPr>
-            <a:normAutofit lnSpcReduction="10000"/>
-          </a:bodyPr>
-          <a:lstStyle/>
-          <a:p>
-            <a:r>
-              <a:rPr lang="en-US" dirty="0"/>
-              <a:t>Parametric methods involve a two-step model-based approach.</a:t>
-            </a:r>
-          </a:p>
-          <a:p>
-            <a:pPr marL="514350" indent="-514350">
-              <a:buAutoNum type="arabicPeriod"/>
-            </a:pPr>
-            <a:r>
-              <a:rPr lang="en-US" dirty="0"/>
-              <a:t>Make an assumption about the functional form, or shape, of </a:t>
-            </a:r>
-            <a:r>
-              <a:rPr lang="en-US" i="1" dirty="0"/>
-              <a:t>f</a:t>
-            </a:r>
-            <a:r>
-              <a:rPr lang="en-US" dirty="0"/>
-              <a:t>.</a:t>
-            </a:r>
-          </a:p>
-          <a:p>
-            <a:pPr marL="0" indent="0">
-              <a:buNone/>
-            </a:pPr>
-            <a:r>
-              <a:rPr lang="en-US" dirty="0"/>
-              <a:t>	EX: </a:t>
-            </a:r>
-            <a:r>
-              <a:rPr lang="en-US" i="1" dirty="0"/>
-              <a:t>f</a:t>
-            </a:r>
-            <a:r>
-              <a:rPr lang="en-US" dirty="0"/>
-              <a:t>(X) = β0 + β1 X1 + β2 X2 + … + βp </a:t>
-            </a:r>
-            <a:r>
-              <a:rPr lang="en-US" dirty="0" err="1"/>
-              <a:t>Xp</a:t>
-            </a:r>
-            <a:r>
-              <a:rPr lang="en-US" dirty="0"/>
-              <a:t> (This is a linear model)</a:t>
-            </a:r>
-          </a:p>
-          <a:p>
-            <a:pPr marL="0" indent="0">
-              <a:buNone/>
-            </a:pPr>
-            <a:r>
-              <a:rPr lang="en-US" dirty="0"/>
-              <a:t>	And select a model.</a:t>
-            </a:r>
-          </a:p>
-          <a:p>
-            <a:pPr marL="514350" indent="-514350">
-              <a:buFont typeface="+mj-lt"/>
-              <a:buAutoNum type="arabicPeriod" startAt="2"/>
-            </a:pPr>
-            <a:r>
-              <a:rPr lang="en-US" dirty="0"/>
-              <a:t>Need a procedure that uses the training data to </a:t>
-            </a:r>
-            <a:r>
-              <a:rPr lang="en-US" i="1" dirty="0"/>
-              <a:t>fit</a:t>
-            </a:r>
-            <a:r>
-              <a:rPr lang="en-US" dirty="0"/>
-              <a:t> or </a:t>
-            </a:r>
-            <a:r>
-              <a:rPr lang="en-US" i="1" dirty="0"/>
-              <a:t>train</a:t>
-            </a:r>
-            <a:r>
-              <a:rPr lang="en-US" dirty="0"/>
-              <a:t> the model.</a:t>
-            </a:r>
-          </a:p>
-          <a:p>
-            <a:r>
-              <a:rPr lang="en-US" dirty="0"/>
-              <a:t>To find values to these parameters such that Y is similar to β0 + β1 X1 + β2 X2 + … + βp </a:t>
-            </a:r>
-            <a:r>
-              <a:rPr lang="en-US" dirty="0" err="1"/>
-              <a:t>Xp</a:t>
-            </a:r>
-            <a:r>
-              <a:rPr lang="en-US" dirty="0"/>
-              <a:t>.</a:t>
-            </a:r>
-          </a:p>
-          <a:p>
-            <a:r>
-              <a:rPr lang="en-US" dirty="0"/>
-              <a:t>The common approach to fitting the model is referred as (ordinary) least squares.</a:t>
-            </a:r>
-          </a:p>
-          <a:p>
-            <a:pPr marL="514350" indent="-514350">
-              <a:buAutoNum type="arabicPeriod"/>
-            </a:pPr>
-            <a:endParaRPr lang="en-US" dirty="0"/>
-          </a:p>
-        </p:txBody>
-      </p:sp>
+              <a:t>Training Data</a:t>
+            </a:r>
+          </a:p>
+        </p:txBody>
+      </p:sp>
+      <mc:AlternateContent xmlns:mc="http://schemas.openxmlformats.org/markup-compatibility/2006">
+        <mc:Choice xmlns:a14="http://schemas.microsoft.com/office/drawing/2010/main" Requires="a14">
+          <p:sp>
+            <p:nvSpPr>
+              <p:cNvPr id="3" name="Content Placeholder 2">
+                <a:extLst>
+                  <a:ext uri="{FF2B5EF4-FFF2-40B4-BE49-F238E27FC236}">
+                    <a16:creationId xmlns:a16="http://schemas.microsoft.com/office/drawing/2014/main" id="{0C3BE0BA-10E4-43C6-A541-E1DB1846A0CD}"/>
+                  </a:ext>
+                </a:extLst>
+              </p:cNvPr>
+              <p:cNvSpPr>
+                <a:spLocks noGrp="1"/>
+              </p:cNvSpPr>
+              <p:nvPr>
+                <p:ph idx="1"/>
+              </p:nvPr>
+            </p:nvSpPr>
+            <p:spPr/>
+            <p:txBody>
+              <a:bodyPr/>
+              <a:lstStyle/>
+              <a:p>
+                <a:r>
+                  <a:rPr lang="en-US" dirty="0"/>
+                  <a:t>Let </a:t>
+                </a:r>
+                <a:r>
+                  <a:rPr lang="en-US" sz="3200" dirty="0" err="1"/>
+                  <a:t>x</a:t>
+                </a:r>
+                <a:r>
+                  <a:rPr lang="en-US" sz="2000" dirty="0" err="1"/>
+                  <a:t>ij</a:t>
+                </a:r>
+                <a:r>
+                  <a:rPr lang="en-US" dirty="0"/>
+                  <a:t> represent the value of </a:t>
+                </a:r>
+                <a:r>
+                  <a:rPr lang="en-US" dirty="0" err="1"/>
+                  <a:t>jth</a:t>
+                </a:r>
+                <a:r>
+                  <a:rPr lang="en-US" dirty="0"/>
+                  <a:t> predictor/input for observation </a:t>
+                </a:r>
+                <a:r>
+                  <a:rPr lang="en-US" dirty="0" err="1"/>
+                  <a:t>i</a:t>
+                </a:r>
+                <a:r>
+                  <a:rPr lang="en-US" dirty="0"/>
+                  <a:t>, where 0 &lt; </a:t>
+                </a:r>
+                <a:r>
+                  <a:rPr lang="en-US" dirty="0" err="1"/>
+                  <a:t>i</a:t>
+                </a:r>
+                <a:r>
+                  <a:rPr lang="en-US" dirty="0"/>
+                  <a:t> &lt;= n and 0 &lt; j &lt;= p.</a:t>
+                </a:r>
+              </a:p>
+              <a:p>
+                <a:r>
+                  <a:rPr lang="en-US" dirty="0"/>
+                  <a:t>Correspondingly, let </a:t>
+                </a:r>
+                <a:r>
+                  <a:rPr lang="en-US" sz="3200" dirty="0" err="1"/>
+                  <a:t>y</a:t>
+                </a:r>
+                <a:r>
+                  <a:rPr lang="en-US" sz="2000" dirty="0" err="1"/>
+                  <a:t>i</a:t>
+                </a:r>
+                <a:r>
+                  <a:rPr lang="en-US" dirty="0"/>
+                  <a:t> represent the response variable for </a:t>
+                </a:r>
+                <a:r>
+                  <a:rPr lang="en-US" dirty="0" err="1"/>
+                  <a:t>ith</a:t>
+                </a:r>
+                <a:r>
+                  <a:rPr lang="en-US" dirty="0"/>
+                  <a:t> observation.</a:t>
+                </a:r>
+              </a:p>
+              <a:p>
+                <a:r>
+                  <a:rPr lang="en-US" dirty="0"/>
+                  <a:t>Under this situation, the training data consist of { (</a:t>
+                </a:r>
+                <a:r>
+                  <a:rPr lang="en-US" i="1" dirty="0"/>
+                  <a:t>x1</a:t>
+                </a:r>
+                <a:r>
+                  <a:rPr lang="en-US" dirty="0"/>
+                  <a:t>,</a:t>
+                </a:r>
+                <a:r>
+                  <a:rPr lang="en-US" i="1" dirty="0"/>
+                  <a:t> y1</a:t>
+                </a:r>
+                <a:r>
+                  <a:rPr lang="en-US" dirty="0"/>
+                  <a:t>), (</a:t>
+                </a:r>
+                <a:r>
+                  <a:rPr lang="en-US" i="1" dirty="0"/>
+                  <a:t>x2</a:t>
+                </a:r>
+                <a:r>
+                  <a:rPr lang="en-US" dirty="0"/>
+                  <a:t>,</a:t>
+                </a:r>
+                <a:r>
+                  <a:rPr lang="en-US" i="1" dirty="0"/>
+                  <a:t> y2</a:t>
+                </a:r>
+                <a:r>
+                  <a:rPr lang="en-US" dirty="0"/>
+                  <a:t>), … , (</a:t>
+                </a:r>
+                <a14:m>
+                  <m:oMath xmlns:m="http://schemas.openxmlformats.org/officeDocument/2006/math">
+                    <m:sSub>
+                      <m:sSubPr>
+                        <m:ctrlPr>
+                          <a:rPr lang="en-US" i="1" smtClean="0">
+                            <a:latin typeface="Cambria Math" panose="02040503050406030204" pitchFamily="18" charset="0"/>
+                          </a:rPr>
+                        </m:ctrlPr>
+                      </m:sSubPr>
+                      <m:e>
+                        <m:r>
+                          <a:rPr lang="en-US" b="0" i="1" smtClean="0">
+                            <a:latin typeface="Cambria Math" panose="02040503050406030204" pitchFamily="18" charset="0"/>
+                          </a:rPr>
+                          <m:t>𝑥</m:t>
+                        </m:r>
+                      </m:e>
+                      <m:sub>
+                        <m:r>
+                          <a:rPr lang="en-US" b="0" i="1" smtClean="0">
+                            <a:latin typeface="Cambria Math" panose="02040503050406030204" pitchFamily="18" charset="0"/>
+                          </a:rPr>
+                          <m:t>𝑛</m:t>
+                        </m:r>
+                      </m:sub>
+                    </m:sSub>
+                  </m:oMath>
+                </a14:m>
+                <a:r>
+                  <a:rPr lang="en-US" dirty="0"/>
+                  <a:t>, </a:t>
+                </a:r>
+                <a14:m>
+                  <m:oMath xmlns:m="http://schemas.openxmlformats.org/officeDocument/2006/math">
+                    <m:sSub>
+                      <m:sSubPr>
+                        <m:ctrlPr>
+                          <a:rPr lang="en-US" i="1">
+                            <a:latin typeface="Cambria Math" panose="02040503050406030204" pitchFamily="18" charset="0"/>
+                          </a:rPr>
+                        </m:ctrlPr>
+                      </m:sSubPr>
+                      <m:e>
+                        <m:r>
+                          <a:rPr lang="en-US" b="0" i="1" smtClean="0">
+                            <a:latin typeface="Cambria Math" panose="02040503050406030204" pitchFamily="18" charset="0"/>
+                          </a:rPr>
+                          <m:t>𝑦</m:t>
+                        </m:r>
+                      </m:e>
+                      <m:sub>
+                        <m:r>
+                          <a:rPr lang="en-US" i="1">
+                            <a:latin typeface="Cambria Math" panose="02040503050406030204" pitchFamily="18" charset="0"/>
+                          </a:rPr>
+                          <m:t>𝑛</m:t>
+                        </m:r>
+                      </m:sub>
+                    </m:sSub>
+                  </m:oMath>
+                </a14:m>
+                <a:r>
+                  <a:rPr lang="en-US" dirty="0"/>
+                  <a:t>)} where x</a:t>
+                </a:r>
+                <a:r>
+                  <a:rPr lang="en-US" sz="2000" dirty="0"/>
+                  <a:t>i</a:t>
+                </a:r>
+                <a:r>
+                  <a:rPr lang="en-US" dirty="0"/>
+                  <a:t> = </a:t>
+                </a:r>
+                <a14:m>
+                  <m:oMath xmlns:m="http://schemas.openxmlformats.org/officeDocument/2006/math">
+                    <m:sSup>
+                      <m:sSupPr>
+                        <m:ctrlPr>
+                          <a:rPr lang="en-US" i="1" dirty="0" smtClean="0">
+                            <a:latin typeface="Cambria Math" panose="02040503050406030204" pitchFamily="18" charset="0"/>
+                          </a:rPr>
+                        </m:ctrlPr>
+                      </m:sSupPr>
+                      <m:e>
+                        <m:r>
+                          <a:rPr lang="en-US" i="1" dirty="0">
+                            <a:latin typeface="Cambria Math" panose="02040503050406030204" pitchFamily="18" charset="0"/>
+                          </a:rPr>
+                          <m:t>(</m:t>
+                        </m:r>
+                        <m:r>
+                          <a:rPr lang="en-US" i="1" dirty="0">
+                            <a:latin typeface="Cambria Math" panose="02040503050406030204" pitchFamily="18" charset="0"/>
+                          </a:rPr>
+                          <m:t>𝑥𝑖</m:t>
+                        </m:r>
+                        <m:r>
+                          <a:rPr lang="en-US" i="1" dirty="0">
+                            <a:latin typeface="Cambria Math" panose="02040503050406030204" pitchFamily="18" charset="0"/>
+                          </a:rPr>
+                          <m:t>1, </m:t>
+                        </m:r>
+                        <m:r>
+                          <a:rPr lang="en-US" i="1" dirty="0">
+                            <a:latin typeface="Cambria Math" panose="02040503050406030204" pitchFamily="18" charset="0"/>
+                          </a:rPr>
+                          <m:t>𝑥𝑖</m:t>
+                        </m:r>
+                        <m:r>
+                          <a:rPr lang="en-US" i="1" dirty="0">
+                            <a:latin typeface="Cambria Math" panose="02040503050406030204" pitchFamily="18" charset="0"/>
+                          </a:rPr>
+                          <m:t>2, …, </m:t>
+                        </m:r>
+                        <m:r>
+                          <a:rPr lang="en-US" i="1" dirty="0" err="1">
+                            <a:latin typeface="Cambria Math" panose="02040503050406030204" pitchFamily="18" charset="0"/>
+                          </a:rPr>
+                          <m:t>𝑥𝑖𝑝</m:t>
+                        </m:r>
+                        <m:r>
+                          <a:rPr lang="en-US" i="1" dirty="0">
+                            <a:latin typeface="Cambria Math" panose="02040503050406030204" pitchFamily="18" charset="0"/>
+                          </a:rPr>
+                          <m:t>)</m:t>
+                        </m:r>
+                        <m:r>
+                          <m:rPr>
+                            <m:nor/>
+                          </m:rPr>
+                          <a:rPr lang="en-US" dirty="0"/>
+                          <m:t> </m:t>
+                        </m:r>
+                      </m:e>
+                      <m:sup>
+                        <m:r>
+                          <a:rPr lang="en-US" b="0" i="1" dirty="0" smtClean="0">
+                            <a:latin typeface="Cambria Math" panose="02040503050406030204" pitchFamily="18" charset="0"/>
+                          </a:rPr>
+                          <m:t>𝑇</m:t>
+                        </m:r>
+                      </m:sup>
+                    </m:sSup>
+                  </m:oMath>
+                </a14:m>
+                <a:endParaRPr lang="en-US" dirty="0"/>
+              </a:p>
+              <a:p>
+                <a:r>
+                  <a:rPr lang="en-US" dirty="0"/>
+                  <a:t>Most statistical learning methods for this task can be characterized as either parametric or non-parametric.</a:t>
+                </a:r>
+              </a:p>
+              <a:p>
+                <a:endParaRPr lang="en-US" dirty="0"/>
+              </a:p>
+            </p:txBody>
+          </p:sp>
+        </mc:Choice>
+        <mc:Fallback>
+          <p:sp>
+            <p:nvSpPr>
+              <p:cNvPr id="3" name="Content Placeholder 2">
+                <a:extLst>
+                  <a:ext uri="{FF2B5EF4-FFF2-40B4-BE49-F238E27FC236}">
+                    <a16:creationId xmlns:a16="http://schemas.microsoft.com/office/drawing/2014/main" id="{0C3BE0BA-10E4-43C6-A541-E1DB1846A0CD}"/>
+                  </a:ext>
+                </a:extLst>
+              </p:cNvPr>
+              <p:cNvSpPr>
+                <a:spLocks noGrp="1" noRot="1" noChangeAspect="1" noMove="1" noResize="1" noEditPoints="1" noAdjustHandles="1" noChangeArrowheads="1" noChangeShapeType="1" noTextEdit="1"/>
+              </p:cNvSpPr>
+              <p:nvPr>
+                <p:ph idx="1"/>
+              </p:nvPr>
+            </p:nvSpPr>
+            <p:spPr>
+              <a:blipFill>
+                <a:blip r:embed="rId2"/>
+                <a:stretch>
+                  <a:fillRect l="-1043" t="-2941" r="-1217"/>
+                </a:stretch>
+              </a:blipFill>
+            </p:spPr>
+            <p:txBody>
+              <a:bodyPr/>
+              <a:lstStyle/>
+              <a:p>
+                <a:r>
+                  <a:rPr lang="en-US">
+                    <a:noFill/>
+                  </a:rPr>
+                  <a:t> </a:t>
+                </a:r>
+              </a:p>
+            </p:txBody>
+          </p:sp>
+        </mc:Fallback>
+      </mc:AlternateContent>
     </p:spTree>
     <p:extLst>
       <p:ext uri="{BB962C8B-B14F-4D97-AF65-F5344CB8AC3E}">
-        <p14:creationId xmlns:p14="http://schemas.microsoft.com/office/powerpoint/2010/main" val="1485168719"/>
+        <p14:creationId xmlns:p14="http://schemas.microsoft.com/office/powerpoint/2010/main" val="2096287596"/>
       </p:ext>
     </p:extLst>
   </p:cSld>
@@ -4186,7 +4387,7 @@
           <p:cNvPr id="2" name="Title 1">
             <a:extLst>
               <a:ext uri="{FF2B5EF4-FFF2-40B4-BE49-F238E27FC236}">
-                <a16:creationId xmlns:a16="http://schemas.microsoft.com/office/drawing/2014/main" id="{02CBE904-99BF-4D23-90CC-BBC34613A254}"/>
+                <a16:creationId xmlns:a16="http://schemas.microsoft.com/office/drawing/2014/main" id="{DE35BFC0-E6FC-4406-993D-557A216095DF}"/>
               </a:ext>
             </a:extLst>
           </p:cNvPr>
@@ -4202,7 +4403,10 @@
           <a:bodyPr/>
           <a:lstStyle/>
           <a:p>
-            <a:endParaRPr lang="en-US"/>
+            <a:r>
+              <a:rPr lang="en-US" dirty="0"/>
+              <a:t>Parametric</a:t>
+            </a:r>
           </a:p>
         </p:txBody>
       </p:sp>
@@ -4211,7 +4415,7 @@
           <p:cNvPr id="3" name="Content Placeholder 2">
             <a:extLst>
               <a:ext uri="{FF2B5EF4-FFF2-40B4-BE49-F238E27FC236}">
-                <a16:creationId xmlns:a16="http://schemas.microsoft.com/office/drawing/2014/main" id="{5660517B-8D5A-426F-AE11-DD9D16365EC7}"/>
+                <a16:creationId xmlns:a16="http://schemas.microsoft.com/office/drawing/2014/main" id="{5CB6DCB9-0865-4491-BC79-7445EF53CB5F}"/>
               </a:ext>
             </a:extLst>
           </p:cNvPr>
@@ -4224,18 +4428,23 @@
         </p:nvSpPr>
         <p:spPr/>
         <p:txBody>
-          <a:bodyPr/>
-          <a:lstStyle/>
-          <a:p>
-            <a:r>
-              <a:rPr lang="en-US" dirty="0"/>
-              <a:t>The model-based approach just described is referred to as parametric.</a:t>
-            </a:r>
-          </a:p>
-          <a:p>
-            <a:r>
-              <a:rPr lang="en-US" dirty="0"/>
-              <a:t>It reduce the problem of estimating </a:t>
+          <a:bodyPr>
+            <a:normAutofit lnSpcReduction="10000"/>
+          </a:bodyPr>
+          <a:lstStyle/>
+          <a:p>
+            <a:r>
+              <a:rPr lang="en-US" dirty="0"/>
+              <a:t>Parametric methods involve a two-step model-based approach.</a:t>
+            </a:r>
+          </a:p>
+          <a:p>
+            <a:pPr marL="514350" indent="-514350">
+              <a:buAutoNum type="arabicPeriod"/>
+            </a:pPr>
+            <a:r>
+              <a:rPr lang="en-US" dirty="0"/>
+              <a:t>Make an assumption about the functional form, or shape, of </a:t>
             </a:r>
             <a:r>
               <a:rPr lang="en-US" i="1" dirty="0"/>
@@ -4243,45 +4452,121 @@
             </a:r>
             <a:r>
               <a:rPr lang="en-US" dirty="0"/>
-              <a:t> down to one of estimating a set of parameter.</a:t>
-            </a:r>
-          </a:p>
-          <a:p>
-            <a:r>
-              <a:rPr lang="en-US" dirty="0"/>
-              <a:t>EX: Assuming a parametric form for </a:t>
+              <a:t>.</a:t>
+            </a:r>
+          </a:p>
+          <a:p>
+            <a:pPr marL="0" indent="0">
+              <a:buNone/>
+            </a:pPr>
+            <a:r>
+              <a:rPr lang="en-US" dirty="0"/>
+              <a:t>	EX: Assume f(X) is linear: f(X) = β0 + β1 X1 + β2 X2 + … + βp </a:t>
+            </a:r>
+            <a:r>
+              <a:rPr lang="en-US" dirty="0" err="1"/>
+              <a:t>Xp</a:t>
+            </a:r>
+            <a:endParaRPr lang="en-US" dirty="0"/>
+          </a:p>
+          <a:p>
+            <a:pPr marL="0" indent="0">
+              <a:buNone/>
+            </a:pPr>
+            <a:r>
+              <a:rPr lang="en-US" dirty="0"/>
+              <a:t>		now we only need to estimate p+1 coefficients β0, β1 … βp.</a:t>
+            </a:r>
+          </a:p>
+          <a:p>
+            <a:pPr marL="514350" indent="-514350">
+              <a:buFont typeface="+mj-lt"/>
+              <a:buAutoNum type="arabicPeriod" startAt="2"/>
+            </a:pPr>
+            <a:r>
+              <a:rPr lang="en-US" dirty="0"/>
+              <a:t>Need a procedure that uses the training data to </a:t>
             </a:r>
             <a:r>
               <a:rPr lang="en-US" i="1" dirty="0"/>
-              <a:t>f</a:t>
-            </a:r>
-            <a:r>
-              <a:rPr lang="en-US" dirty="0"/>
-              <a:t> simplifies the problem of estimating </a:t>
+              <a:t>fit</a:t>
+            </a:r>
+            <a:r>
+              <a:rPr lang="en-US" dirty="0"/>
+              <a:t> or </a:t>
             </a:r>
             <a:r>
               <a:rPr lang="en-US" i="1" dirty="0"/>
-              <a:t>f </a:t>
-            </a:r>
-            <a:r>
-              <a:rPr lang="en-US" dirty="0"/>
-              <a:t>because it is generally much easier to estimate a set of parameters, such as β0, β1, β2, … , βp in the linear model, than it is to fit an entirely arbitrary function </a:t>
-            </a:r>
-            <a:r>
-              <a:rPr lang="en-US" i="1" dirty="0"/>
-              <a:t>f</a:t>
-            </a:r>
-            <a:r>
-              <a:rPr lang="en-US" dirty="0"/>
-              <a:t>.</a:t>
-            </a:r>
-          </a:p>
-        </p:txBody>
-      </p:sp>
+              <a:t>train</a:t>
+            </a:r>
+            <a:r>
+              <a:rPr lang="en-US" dirty="0"/>
+              <a:t> the model.</a:t>
+            </a:r>
+          </a:p>
+          <a:p>
+            <a:pPr marL="0" indent="0">
+              <a:buNone/>
+            </a:pPr>
+            <a:r>
+              <a:rPr lang="en-US" dirty="0"/>
+              <a:t>      To find values to β0, β1 … βp such that</a:t>
+            </a:r>
+          </a:p>
+          <a:p>
+            <a:r>
+              <a:rPr lang="en-US" dirty="0"/>
+              <a:t>The common approach to fitting the model is referred as (ordinary) least squares. (Will discuss in Chapter 3)</a:t>
+            </a:r>
+          </a:p>
+          <a:p>
+            <a:pPr marL="514350" indent="-514350">
+              <a:buAutoNum type="arabicPeriod"/>
+            </a:pPr>
+            <a:endParaRPr lang="en-US" dirty="0"/>
+          </a:p>
+        </p:txBody>
+      </p:sp>
+      <p:pic>
+        <p:nvPicPr>
+          <p:cNvPr id="5" name="Picture 4">
+            <a:extLst>
+              <a:ext uri="{FF2B5EF4-FFF2-40B4-BE49-F238E27FC236}">
+                <a16:creationId xmlns:a16="http://schemas.microsoft.com/office/drawing/2014/main" id="{9E863542-7912-4903-93D7-FD1FAF1F73D8}"/>
+              </a:ext>
+            </a:extLst>
+          </p:cNvPr>
+          <p:cNvPicPr>
+            <a:picLocks noChangeAspect="1"/>
+          </p:cNvPicPr>
+          <p:nvPr/>
+        </p:nvPicPr>
+        <p:blipFill>
+          <a:blip r:embed="rId2">
+            <a:extLst>
+              <a:ext uri="{28A0092B-C50C-407E-A947-70E740481C1C}">
+                <a14:useLocalDpi xmlns:a14="http://schemas.microsoft.com/office/drawing/2010/main" val="0"/>
+              </a:ext>
+            </a:extLst>
+          </a:blip>
+          <a:stretch>
+            <a:fillRect/>
+          </a:stretch>
+        </p:blipFill>
+        <p:spPr>
+          <a:xfrm>
+            <a:off x="7077750" y="4805101"/>
+            <a:ext cx="4819685" cy="495304"/>
+          </a:xfrm>
+          <a:prstGeom prst="rect">
+            <a:avLst/>
+          </a:prstGeom>
+        </p:spPr>
+      </p:pic>
     </p:spTree>
     <p:extLst>
       <p:ext uri="{BB962C8B-B14F-4D97-AF65-F5344CB8AC3E}">
-        <p14:creationId xmlns:p14="http://schemas.microsoft.com/office/powerpoint/2010/main" val="2740296970"/>
+        <p14:creationId xmlns:p14="http://schemas.microsoft.com/office/powerpoint/2010/main" val="1485168719"/>
       </p:ext>
     </p:extLst>
   </p:cSld>
@@ -4313,7 +4598,7 @@
           <p:cNvPr id="2" name="Title 1">
             <a:extLst>
               <a:ext uri="{FF2B5EF4-FFF2-40B4-BE49-F238E27FC236}">
-                <a16:creationId xmlns:a16="http://schemas.microsoft.com/office/drawing/2014/main" id="{2F443D60-E9D1-422A-92F1-DDB3E9EC095B}"/>
+                <a16:creationId xmlns:a16="http://schemas.microsoft.com/office/drawing/2014/main" id="{02CBE904-99BF-4D23-90CC-BBC34613A254}"/>
               </a:ext>
             </a:extLst>
           </p:cNvPr>
@@ -4329,10 +4614,7 @@
           <a:bodyPr/>
           <a:lstStyle/>
           <a:p>
-            <a:r>
-              <a:rPr lang="en-US" dirty="0"/>
-              <a:t>Disadvantage</a:t>
-            </a:r>
+            <a:endParaRPr lang="en-US"/>
           </a:p>
         </p:txBody>
       </p:sp>
@@ -4341,7 +4623,7 @@
           <p:cNvPr id="3" name="Content Placeholder 2">
             <a:extLst>
               <a:ext uri="{FF2B5EF4-FFF2-40B4-BE49-F238E27FC236}">
-                <a16:creationId xmlns:a16="http://schemas.microsoft.com/office/drawing/2014/main" id="{E14C685B-78AF-40F2-BDCF-5CD21213D703}"/>
+                <a16:creationId xmlns:a16="http://schemas.microsoft.com/office/drawing/2014/main" id="{5660517B-8D5A-426F-AE11-DD9D16365EC7}"/>
               </a:ext>
             </a:extLst>
           </p:cNvPr>
@@ -4359,7 +4641,13 @@
           <a:p>
             <a:r>
               <a:rPr lang="en-US" dirty="0"/>
-              <a:t>The potential disadvantage of a parametric approach is that the model we choose will usually not match the true unknow form of </a:t>
+              <a:t>The model-based approach just described is referred to as parametric.</a:t>
+            </a:r>
+          </a:p>
+          <a:p>
+            <a:r>
+              <a:rPr lang="en-US" dirty="0"/>
+              <a:t>It reduce the problem of estimating </a:t>
             </a:r>
             <a:r>
               <a:rPr lang="en-US" i="1" dirty="0"/>
@@ -4367,13 +4655,13 @@
             </a:r>
             <a:r>
               <a:rPr lang="en-US" dirty="0"/>
-              <a:t>.</a:t>
-            </a:r>
-          </a:p>
-          <a:p>
-            <a:r>
-              <a:rPr lang="en-US" dirty="0"/>
-              <a:t>This can be addressed by choosing flexible models that can fit many different possible functional forms for </a:t>
+              <a:t> down to one of estimating a set of parameters.</a:t>
+            </a:r>
+          </a:p>
+          <a:p>
+            <a:r>
+              <a:rPr lang="en-US" dirty="0"/>
+              <a:t>EX: Assuming a parametric form for </a:t>
             </a:r>
             <a:r>
               <a:rPr lang="en-US" i="1" dirty="0"/>
@@ -4381,19 +4669,23 @@
             </a:r>
             <a:r>
               <a:rPr lang="en-US" dirty="0"/>
+              <a:t> simplifies the problem of estimating </a:t>
+            </a:r>
+            <a:r>
+              <a:rPr lang="en-US" i="1" dirty="0"/>
+              <a:t>f </a:t>
+            </a:r>
+            <a:r>
+              <a:rPr lang="en-US" dirty="0"/>
+              <a:t>than it is to fit an entirely arbitrary function </a:t>
+            </a:r>
+            <a:r>
+              <a:rPr lang="en-US" i="1" dirty="0"/>
+              <a:t>f</a:t>
+            </a:r>
+            <a:r>
+              <a:rPr lang="en-US" dirty="0"/>
               <a:t>.</a:t>
-            </a:r>
-          </a:p>
-          <a:p>
-            <a:r>
-              <a:rPr lang="en-US" dirty="0"/>
-              <a:t>There is a draw back from this, because in general, fitting a more flexible model requires estimating a greater number of parameters.</a:t>
-            </a:r>
-          </a:p>
-          <a:p>
-            <a:r>
-              <a:rPr lang="en-US" dirty="0"/>
-              <a:t>Those more complex models can lead to overfitting the data, which means they follow the errors too closely.</a:t>
             </a:r>
           </a:p>
         </p:txBody>
@@ -4401,7 +4693,7 @@
     </p:spTree>
     <p:extLst>
       <p:ext uri="{BB962C8B-B14F-4D97-AF65-F5344CB8AC3E}">
-        <p14:creationId xmlns:p14="http://schemas.microsoft.com/office/powerpoint/2010/main" val="979548349"/>
+        <p14:creationId xmlns:p14="http://schemas.microsoft.com/office/powerpoint/2010/main" val="2740296970"/>
       </p:ext>
     </p:extLst>
   </p:cSld>
@@ -4433,7 +4725,7 @@
           <p:cNvPr id="2" name="Title 1">
             <a:extLst>
               <a:ext uri="{FF2B5EF4-FFF2-40B4-BE49-F238E27FC236}">
-                <a16:creationId xmlns:a16="http://schemas.microsoft.com/office/drawing/2014/main" id="{222855C2-BBC5-4A94-B68D-78541F8ECF31}"/>
+                <a16:creationId xmlns:a16="http://schemas.microsoft.com/office/drawing/2014/main" id="{2F443D60-E9D1-422A-92F1-DDB3E9EC095B}"/>
               </a:ext>
             </a:extLst>
           </p:cNvPr>
@@ -4451,7 +4743,7 @@
           <a:p>
             <a:r>
               <a:rPr lang="en-US" dirty="0"/>
-              <a:t>Non-parametric</a:t>
+              <a:t>Disadvantage</a:t>
             </a:r>
           </a:p>
         </p:txBody>
@@ -4461,7 +4753,7 @@
           <p:cNvPr id="3" name="Content Placeholder 2">
             <a:extLst>
               <a:ext uri="{FF2B5EF4-FFF2-40B4-BE49-F238E27FC236}">
-                <a16:creationId xmlns:a16="http://schemas.microsoft.com/office/drawing/2014/main" id="{53F3A229-7F9B-423A-9EC5-957194CCDF09}"/>
+                <a16:creationId xmlns:a16="http://schemas.microsoft.com/office/drawing/2014/main" id="{E14C685B-78AF-40F2-BDCF-5CD21213D703}"/>
               </a:ext>
             </a:extLst>
           </p:cNvPr>
@@ -4474,12 +4766,14 @@
         </p:nvSpPr>
         <p:spPr/>
         <p:txBody>
-          <a:bodyPr/>
-          <a:lstStyle/>
-          <a:p>
-            <a:r>
-              <a:rPr lang="en-US" dirty="0"/>
-              <a:t>Do not make explicit assumption about the function form of </a:t>
+          <a:bodyPr>
+            <a:normAutofit lnSpcReduction="10000"/>
+          </a:bodyPr>
+          <a:lstStyle/>
+          <a:p>
+            <a:r>
+              <a:rPr lang="en-US" dirty="0"/>
+              <a:t>The model we choose will usually not match the true unknown form of </a:t>
             </a:r>
             <a:r>
               <a:rPr lang="en-US" i="1" dirty="0"/>
@@ -4493,7 +4787,7 @@
           <a:p>
             <a:r>
               <a:rPr lang="en-US" dirty="0"/>
-              <a:t>Seek an estimate of </a:t>
+              <a:t>If chosen model is too far from true </a:t>
             </a:r>
             <a:r>
               <a:rPr lang="en-US" i="1" dirty="0"/>
@@ -4501,13 +4795,13 @@
             </a:r>
             <a:r>
               <a:rPr lang="en-US" dirty="0"/>
-              <a:t> that gets as close to the data points as possible without being too rough.</a:t>
-            </a:r>
-          </a:p>
-          <a:p>
-            <a:r>
-              <a:rPr lang="en-US" dirty="0"/>
-              <a:t>Advantage of non-parametric over parametric approach is by avoiding the assumption of a particular function form for </a:t>
+              <a:t>, then the estimation will be poor.</a:t>
+            </a:r>
+          </a:p>
+          <a:p>
+            <a:r>
+              <a:rPr lang="en-US" dirty="0"/>
+              <a:t>Choosing flexible models that can fit many different possible functional forms for </a:t>
             </a:r>
             <a:r>
               <a:rPr lang="en-US" i="1" dirty="0"/>
@@ -4515,7 +4809,133 @@
             </a:r>
             <a:r>
               <a:rPr lang="en-US" dirty="0"/>
-              <a:t>, non-parametric approaches have the potential to accurately fit a wider range of possible shapes for </a:t>
+              <a:t>.</a:t>
+            </a:r>
+          </a:p>
+          <a:p>
+            <a:r>
+              <a:rPr lang="en-US" dirty="0"/>
+              <a:t>Fitting a more flexible model requires estimating a greater number of parameters.</a:t>
+            </a:r>
+          </a:p>
+          <a:p>
+            <a:r>
+              <a:rPr lang="en-US" dirty="0"/>
+              <a:t>Those more complex models can lead to overfitting the data, which means they follow the errors too closely.</a:t>
+            </a:r>
+          </a:p>
+        </p:txBody>
+      </p:sp>
+    </p:spTree>
+    <p:extLst>
+      <p:ext uri="{BB962C8B-B14F-4D97-AF65-F5344CB8AC3E}">
+        <p14:creationId xmlns:p14="http://schemas.microsoft.com/office/powerpoint/2010/main" val="979548349"/>
+      </p:ext>
+    </p:extLst>
+  </p:cSld>
+  <p:clrMapOvr>
+    <a:masterClrMapping/>
+  </p:clrMapOvr>
+</p:sld>
+</file>
+
+<file path=ppt/slides/slide16.xml><?xml version="1.0" encoding="utf-8"?>
+<p:sld xmlns:a="http://schemas.openxmlformats.org/drawingml/2006/main" xmlns:r="http://schemas.openxmlformats.org/officeDocument/2006/relationships" xmlns:p="http://schemas.openxmlformats.org/presentationml/2006/main">
+  <p:cSld>
+    <p:spTree>
+      <p:nvGrpSpPr>
+        <p:cNvPr id="1" name=""/>
+        <p:cNvGrpSpPr/>
+        <p:nvPr/>
+      </p:nvGrpSpPr>
+      <p:grpSpPr>
+        <a:xfrm>
+          <a:off x="0" y="0"/>
+          <a:ext cx="0" cy="0"/>
+          <a:chOff x="0" y="0"/>
+          <a:chExt cx="0" cy="0"/>
+        </a:xfrm>
+      </p:grpSpPr>
+      <p:sp>
+        <p:nvSpPr>
+          <p:cNvPr id="2" name="Title 1">
+            <a:extLst>
+              <a:ext uri="{FF2B5EF4-FFF2-40B4-BE49-F238E27FC236}">
+                <a16:creationId xmlns:a16="http://schemas.microsoft.com/office/drawing/2014/main" id="{222855C2-BBC5-4A94-B68D-78541F8ECF31}"/>
+              </a:ext>
+            </a:extLst>
+          </p:cNvPr>
+          <p:cNvSpPr>
+            <a:spLocks noGrp="1"/>
+          </p:cNvSpPr>
+          <p:nvPr>
+            <p:ph type="title"/>
+          </p:nvPr>
+        </p:nvSpPr>
+        <p:spPr/>
+        <p:txBody>
+          <a:bodyPr/>
+          <a:lstStyle/>
+          <a:p>
+            <a:r>
+              <a:rPr lang="en-US" dirty="0"/>
+              <a:t>Non-parametric</a:t>
+            </a:r>
+          </a:p>
+        </p:txBody>
+      </p:sp>
+      <p:sp>
+        <p:nvSpPr>
+          <p:cNvPr id="3" name="Content Placeholder 2">
+            <a:extLst>
+              <a:ext uri="{FF2B5EF4-FFF2-40B4-BE49-F238E27FC236}">
+                <a16:creationId xmlns:a16="http://schemas.microsoft.com/office/drawing/2014/main" id="{53F3A229-7F9B-423A-9EC5-957194CCDF09}"/>
+              </a:ext>
+            </a:extLst>
+          </p:cNvPr>
+          <p:cNvSpPr>
+            <a:spLocks noGrp="1"/>
+          </p:cNvSpPr>
+          <p:nvPr>
+            <p:ph idx="1"/>
+          </p:nvPr>
+        </p:nvSpPr>
+        <p:spPr/>
+        <p:txBody>
+          <a:bodyPr/>
+          <a:lstStyle/>
+          <a:p>
+            <a:r>
+              <a:rPr lang="en-US" dirty="0"/>
+              <a:t>Do not make explicit assumption about the function form of </a:t>
+            </a:r>
+            <a:r>
+              <a:rPr lang="en-US" i="1" dirty="0"/>
+              <a:t>f</a:t>
+            </a:r>
+            <a:r>
+              <a:rPr lang="en-US" dirty="0"/>
+              <a:t>.</a:t>
+            </a:r>
+          </a:p>
+          <a:p>
+            <a:r>
+              <a:rPr lang="en-US" dirty="0"/>
+              <a:t>Seek an estimate of </a:t>
+            </a:r>
+            <a:r>
+              <a:rPr lang="en-US" i="1" dirty="0"/>
+              <a:t>f</a:t>
+            </a:r>
+            <a:r>
+              <a:rPr lang="en-US" dirty="0"/>
+              <a:t> that gets as close to the data points as possible without being too rough.</a:t>
+            </a:r>
+          </a:p>
+          <a:p>
+            <a:r>
+              <a:rPr lang="en-US" dirty="0"/>
+              <a:t>The potential to accurately fit a wider range of possible shapes for </a:t>
             </a:r>
             <a:r>
               <a:rPr lang="en-US" i="1" dirty="0"/>
@@ -4555,7 +4975,7 @@
 </p:sld>
 </file>
 
-<file path=ppt/slides/slide16.xml><?xml version="1.0" encoding="utf-8"?>
+<file path=ppt/slides/slide17.xml><?xml version="1.0" encoding="utf-8"?>
 <p:sld xmlns:a="http://schemas.openxmlformats.org/drawingml/2006/main" xmlns:r="http://schemas.openxmlformats.org/officeDocument/2006/relationships" xmlns:p="http://schemas.openxmlformats.org/presentationml/2006/main">
   <p:cSld>
     <p:bg>
@@ -4921,31 +5341,31 @@
           <a:lstStyle/>
           <a:p>
             <a:r>
-              <a:rPr lang="en-US" sz="1300"/>
+              <a:rPr lang="en-US" sz="1600" dirty="0"/>
               <a:t>Suffers from a very large number of observation because it is required in order to obtain an accurate estimate for </a:t>
             </a:r>
             <a:r>
-              <a:rPr lang="en-US" sz="1300" i="1"/>
+              <a:rPr lang="en-US" sz="1600" i="1" dirty="0"/>
               <a:t>f</a:t>
             </a:r>
             <a:r>
-              <a:rPr lang="en-US" sz="1300"/>
+              <a:rPr lang="en-US" sz="1600" dirty="0"/>
               <a:t>.</a:t>
             </a:r>
           </a:p>
           <a:p>
             <a:r>
-              <a:rPr lang="en-US" sz="1300"/>
+              <a:rPr lang="en-US" sz="1600" dirty="0"/>
               <a:t>Example: non-parametric approach to fitting the </a:t>
             </a:r>
             <a:r>
-              <a:rPr lang="en-US" sz="1300">
+              <a:rPr lang="en-US" sz="1600" dirty="0">
                 <a:latin typeface="Consolas" panose="020B0609020204030204" pitchFamily="49" charset="0"/>
               </a:rPr>
               <a:t>Income </a:t>
             </a:r>
             <a:r>
-              <a:rPr lang="en-US" sz="1300"/>
+              <a:rPr lang="en-US" sz="1600" dirty="0"/>
               <a:t>data.</a:t>
             </a:r>
           </a:p>
@@ -4954,19 +5374,19 @@
               <a:buNone/>
             </a:pPr>
             <a:r>
-              <a:rPr lang="en-US" sz="1300"/>
+              <a:rPr lang="en-US" sz="1600" dirty="0"/>
               <a:t>A </a:t>
             </a:r>
             <a:r>
-              <a:rPr lang="en-US" sz="1300" i="1"/>
+              <a:rPr lang="en-US" sz="1600" i="1" dirty="0"/>
               <a:t>thin-plate spline</a:t>
             </a:r>
             <a:r>
-              <a:rPr lang="en-US" sz="1300"/>
+              <a:rPr lang="en-US" sz="1600" dirty="0"/>
               <a:t> is used to estimate </a:t>
             </a:r>
             <a:r>
-              <a:rPr lang="en-US" sz="1300" i="1"/>
+              <a:rPr lang="en-US" sz="1600" i="1" dirty="0"/>
               <a:t>f:</a:t>
             </a:r>
           </a:p>
@@ -4975,15 +5395,15 @@
               <a:buNone/>
             </a:pPr>
             <a:r>
-              <a:rPr lang="en-US" sz="1300"/>
-              <a:t>This does not impose an pre-specified model on </a:t>
-            </a:r>
-            <a:r>
-              <a:rPr lang="en-US" sz="1300" i="1"/>
+              <a:rPr lang="en-US" sz="1600" dirty="0"/>
+              <a:t>- This does not impose an pre-specified model on </a:t>
+            </a:r>
+            <a:r>
+              <a:rPr lang="en-US" sz="1600" i="1" dirty="0"/>
               <a:t>f</a:t>
             </a:r>
             <a:r>
-              <a:rPr lang="en-US" sz="1300"/>
+              <a:rPr lang="en-US" sz="1600" dirty="0"/>
               <a:t>.</a:t>
             </a:r>
           </a:p>
@@ -4991,76 +5411,26 @@
             <a:pPr marL="0" indent="0">
               <a:buNone/>
             </a:pPr>
-            <a:endParaRPr lang="en-US" sz="1300"/>
+            <a:r>
+              <a:rPr lang="en-US" sz="1600" dirty="0"/>
+              <a:t>- It instead attempts to produce an estimate for </a:t>
+            </a:r>
+            <a:r>
+              <a:rPr lang="en-US" sz="1600" i="1" dirty="0"/>
+              <a:t>f</a:t>
+            </a:r>
+            <a:r>
+              <a:rPr lang="en-US" sz="1600" dirty="0"/>
+              <a:t> that is as close as possible to the observed data, subject to the fit (yellow surface) </a:t>
+            </a:r>
           </a:p>
           <a:p>
             <a:pPr marL="0" indent="0">
               <a:buNone/>
             </a:pPr>
             <a:r>
-              <a:rPr lang="en-US" sz="1300"/>
-              <a:t>It instead attempts to produce an estimate</a:t>
-            </a:r>
-          </a:p>
-          <a:p>
-            <a:pPr marL="0" indent="0">
-              <a:buNone/>
-            </a:pPr>
-            <a:r>
-              <a:rPr lang="en-US" sz="1300"/>
-              <a:t>for </a:t>
-            </a:r>
-            <a:r>
-              <a:rPr lang="en-US" sz="1300" i="1"/>
-              <a:t>f</a:t>
-            </a:r>
-            <a:r>
-              <a:rPr lang="en-US" sz="1300"/>
-              <a:t> that is as close as possible to the </a:t>
-            </a:r>
-          </a:p>
-          <a:p>
-            <a:pPr marL="0" indent="0">
-              <a:buNone/>
-            </a:pPr>
-            <a:r>
-              <a:rPr lang="en-US" sz="1300"/>
-              <a:t>Observed data, subject to the fit (yellow surface) </a:t>
-            </a:r>
-          </a:p>
-          <a:p>
-            <a:pPr marL="0" indent="0">
-              <a:buNone/>
-            </a:pPr>
-            <a:r>
-              <a:rPr lang="en-US" sz="1300"/>
-              <a:t>Being </a:t>
-            </a:r>
-            <a:r>
-              <a:rPr lang="en-US" sz="1300" i="1"/>
-              <a:t>smooth</a:t>
-            </a:r>
-            <a:r>
-              <a:rPr lang="en-US" sz="1300"/>
-              <a:t>.</a:t>
-            </a:r>
-          </a:p>
-          <a:p>
-            <a:pPr marL="0" indent="0">
-              <a:buNone/>
-            </a:pPr>
-            <a:r>
-              <a:rPr lang="en-US" sz="1300"/>
-              <a:t>In order to fit a thin-plate spline, </a:t>
-            </a:r>
-          </a:p>
-          <a:p>
-            <a:pPr marL="0" indent="0">
-              <a:buNone/>
-            </a:pPr>
-            <a:r>
-              <a:rPr lang="en-US" sz="1300"/>
-              <a:t>we must elect a level of smoothness.</a:t>
+              <a:rPr lang="en-US" sz="1600" dirty="0"/>
+              <a:t>In order to fit a thin-plate spline, we must select a level of smoothness.</a:t>
             </a:r>
           </a:p>
         </p:txBody>
@@ -5246,7 +5616,441 @@
 </p:sld>
 </file>
 
-<file path=ppt/slides/slide17.xml><?xml version="1.0" encoding="utf-8"?>
+<file path=ppt/slides/slide18.xml><?xml version="1.0" encoding="utf-8"?>
+<p:sld xmlns:a="http://schemas.openxmlformats.org/drawingml/2006/main" xmlns:r="http://schemas.openxmlformats.org/officeDocument/2006/relationships" xmlns:p="http://schemas.openxmlformats.org/presentationml/2006/main">
+  <p:cSld>
+    <p:bg>
+      <p:bgPr>
+        <a:solidFill>
+          <a:schemeClr val="bg1"/>
+        </a:solidFill>
+        <a:effectLst/>
+      </p:bgPr>
+    </p:bg>
+    <p:spTree>
+      <p:nvGrpSpPr>
+        <p:cNvPr id="1" name=""/>
+        <p:cNvGrpSpPr/>
+        <p:nvPr/>
+      </p:nvGrpSpPr>
+      <p:grpSpPr>
+        <a:xfrm>
+          <a:off x="0" y="0"/>
+          <a:ext cx="0" cy="0"/>
+          <a:chOff x="0" y="0"/>
+          <a:chExt cx="0" cy="0"/>
+        </a:xfrm>
+      </p:grpSpPr>
+      <p:sp>
+        <p:nvSpPr>
+          <p:cNvPr id="2" name="Title 1">
+            <a:extLst>
+              <a:ext uri="{FF2B5EF4-FFF2-40B4-BE49-F238E27FC236}">
+                <a16:creationId xmlns:a16="http://schemas.microsoft.com/office/drawing/2014/main" id="{C4003291-DB17-4B80-A9E5-4C206DD9C628}"/>
+              </a:ext>
+            </a:extLst>
+          </p:cNvPr>
+          <p:cNvSpPr>
+            <a:spLocks noGrp="1"/>
+          </p:cNvSpPr>
+          <p:nvPr>
+            <p:ph type="title"/>
+          </p:nvPr>
+        </p:nvSpPr>
+        <p:spPr>
+          <a:xfrm>
+            <a:off x="648929" y="629266"/>
+            <a:ext cx="3667039" cy="1676603"/>
+          </a:xfrm>
+        </p:spPr>
+        <p:txBody>
+          <a:bodyPr>
+            <a:normAutofit/>
+          </a:bodyPr>
+          <a:lstStyle/>
+          <a:p>
+            <a:r>
+              <a:rPr lang="en-US" sz="3700"/>
+              <a:t>After using lower level of smoothness</a:t>
+            </a:r>
+          </a:p>
+        </p:txBody>
+      </p:sp>
+      <p:sp>
+        <p:nvSpPr>
+          <p:cNvPr id="9" name="Content Placeholder 8">
+            <a:extLst>
+              <a:ext uri="{FF2B5EF4-FFF2-40B4-BE49-F238E27FC236}">
+                <a16:creationId xmlns:a16="http://schemas.microsoft.com/office/drawing/2014/main" id="{49901DD5-3120-42CE-947D-014EA946D2A3}"/>
+              </a:ext>
+            </a:extLst>
+          </p:cNvPr>
+          <p:cNvSpPr>
+            <a:spLocks noGrp="1"/>
+          </p:cNvSpPr>
+          <p:nvPr>
+            <p:ph idx="1"/>
+          </p:nvPr>
+        </p:nvSpPr>
+        <p:spPr>
+          <a:xfrm>
+            <a:off x="648930" y="2438400"/>
+            <a:ext cx="3667037" cy="3785419"/>
+          </a:xfrm>
+        </p:spPr>
+        <p:txBody>
+          <a:bodyPr>
+            <a:normAutofit/>
+          </a:bodyPr>
+          <a:lstStyle/>
+          <a:p>
+            <a:r>
+              <a:rPr lang="en-US" sz="1800" dirty="0"/>
+              <a:t>The same thin-plate graph, but select a lower level of smoothness.</a:t>
+            </a:r>
+          </a:p>
+          <a:p>
+            <a:r>
+              <a:rPr lang="en-US" sz="1800" dirty="0"/>
+              <a:t>The resulting estimate fits the observed data perfectly.</a:t>
+            </a:r>
+          </a:p>
+          <a:p>
+            <a:r>
+              <a:rPr lang="en-US" sz="1800" dirty="0"/>
+              <a:t>However, the spline fit shown is far more variable than the true f.</a:t>
+            </a:r>
+          </a:p>
+        </p:txBody>
+      </p:sp>
+      <p:pic>
+        <p:nvPicPr>
+          <p:cNvPr id="7" name="Picture 6" descr="A close up of a map&#10;&#10;Description automatically generated">
+            <a:extLst>
+              <a:ext uri="{FF2B5EF4-FFF2-40B4-BE49-F238E27FC236}">
+                <a16:creationId xmlns:a16="http://schemas.microsoft.com/office/drawing/2014/main" id="{62645F47-8C97-4905-990E-541975EDC0AB}"/>
+              </a:ext>
+            </a:extLst>
+          </p:cNvPr>
+          <p:cNvPicPr>
+            <a:picLocks noChangeAspect="1"/>
+          </p:cNvPicPr>
+          <p:nvPr/>
+        </p:nvPicPr>
+        <p:blipFill>
+          <a:blip r:embed="rId2">
+            <a:extLst>
+              <a:ext uri="{28A0092B-C50C-407E-A947-70E740481C1C}">
+                <a14:useLocalDpi xmlns:a14="http://schemas.microsoft.com/office/drawing/2010/main" val="0"/>
+              </a:ext>
+            </a:extLst>
+          </a:blip>
+          <a:stretch>
+            <a:fillRect/>
+          </a:stretch>
+        </p:blipFill>
+        <p:spPr>
+          <a:xfrm>
+            <a:off x="4534222" y="629266"/>
+            <a:ext cx="6515148" cy="5124487"/>
+          </a:xfrm>
+          <a:prstGeom prst="rect">
+            <a:avLst/>
+          </a:prstGeom>
+        </p:spPr>
+      </p:pic>
+    </p:spTree>
+    <p:extLst>
+      <p:ext uri="{BB962C8B-B14F-4D97-AF65-F5344CB8AC3E}">
+        <p14:creationId xmlns:p14="http://schemas.microsoft.com/office/powerpoint/2010/main" val="2469999002"/>
+      </p:ext>
+    </p:extLst>
+  </p:cSld>
+  <p:clrMapOvr>
+    <a:masterClrMapping/>
+  </p:clrMapOvr>
+</p:sld>
+</file>
+
+<file path=ppt/slides/slide19.xml><?xml version="1.0" encoding="utf-8"?>
+<p:sld xmlns:a="http://schemas.openxmlformats.org/drawingml/2006/main" xmlns:r="http://schemas.openxmlformats.org/officeDocument/2006/relationships" xmlns:p="http://schemas.openxmlformats.org/presentationml/2006/main">
+  <p:cSld>
+    <p:bg>
+      <p:bgPr>
+        <a:solidFill>
+          <a:schemeClr val="bg1"/>
+        </a:solidFill>
+        <a:effectLst/>
+      </p:bgPr>
+    </p:bg>
+    <p:spTree>
+      <p:nvGrpSpPr>
+        <p:cNvPr id="1" name=""/>
+        <p:cNvGrpSpPr/>
+        <p:nvPr/>
+      </p:nvGrpSpPr>
+      <p:grpSpPr>
+        <a:xfrm>
+          <a:off x="0" y="0"/>
+          <a:ext cx="0" cy="0"/>
+          <a:chOff x="0" y="0"/>
+          <a:chExt cx="0" cy="0"/>
+        </a:xfrm>
+      </p:grpSpPr>
+      <p:sp>
+        <p:nvSpPr>
+          <p:cNvPr id="2" name="Title 1">
+            <a:extLst>
+              <a:ext uri="{FF2B5EF4-FFF2-40B4-BE49-F238E27FC236}">
+                <a16:creationId xmlns:a16="http://schemas.microsoft.com/office/drawing/2014/main" id="{51B6BBB8-405D-43AE-8F71-28C464DA6D4D}"/>
+              </a:ext>
+            </a:extLst>
+          </p:cNvPr>
+          <p:cNvSpPr>
+            <a:spLocks noGrp="1"/>
+          </p:cNvSpPr>
+          <p:nvPr>
+            <p:ph type="title"/>
+          </p:nvPr>
+        </p:nvSpPr>
+        <p:spPr>
+          <a:xfrm>
+            <a:off x="648929" y="629266"/>
+            <a:ext cx="3667039" cy="1676603"/>
+          </a:xfrm>
+        </p:spPr>
+        <p:txBody>
+          <a:bodyPr>
+            <a:normAutofit/>
+          </a:bodyPr>
+          <a:lstStyle/>
+          <a:p>
+            <a:r>
+              <a:rPr lang="en-US" dirty="0"/>
+              <a:t>True function f</a:t>
+            </a:r>
+          </a:p>
+        </p:txBody>
+      </p:sp>
+      <p:sp>
+        <p:nvSpPr>
+          <p:cNvPr id="11" name="Content Placeholder 10">
+            <a:extLst>
+              <a:ext uri="{FF2B5EF4-FFF2-40B4-BE49-F238E27FC236}">
+                <a16:creationId xmlns:a16="http://schemas.microsoft.com/office/drawing/2014/main" id="{81E92209-C5D5-426F-97F5-C252A1A72E3A}"/>
+              </a:ext>
+            </a:extLst>
+          </p:cNvPr>
+          <p:cNvSpPr>
+            <a:spLocks noGrp="1"/>
+          </p:cNvSpPr>
+          <p:nvPr>
+            <p:ph idx="1"/>
+          </p:nvPr>
+        </p:nvSpPr>
+        <p:spPr>
+          <a:xfrm>
+            <a:off x="648930" y="2438400"/>
+            <a:ext cx="3667037" cy="3785419"/>
+          </a:xfrm>
+        </p:spPr>
+        <p:txBody>
+          <a:bodyPr>
+            <a:normAutofit/>
+          </a:bodyPr>
+          <a:lstStyle/>
+          <a:p>
+            <a:r>
+              <a:rPr lang="en-US" sz="1800" dirty="0"/>
+              <a:t>This is an example of overfitting the data.</a:t>
+            </a:r>
+          </a:p>
+          <a:p>
+            <a:r>
+              <a:rPr lang="en-US" sz="1800" dirty="0"/>
+              <a:t>Undesirable situation</a:t>
+            </a:r>
+          </a:p>
+          <a:p>
+            <a:r>
+              <a:rPr lang="en-US" sz="1800" dirty="0"/>
+              <a:t>More variable</a:t>
+            </a:r>
+          </a:p>
+        </p:txBody>
+      </p:sp>
+      <p:pic>
+        <p:nvPicPr>
+          <p:cNvPr id="10" name="Picture 9" descr="A close up of a map&#10;&#10;Description automatically generated">
+            <a:extLst>
+              <a:ext uri="{FF2B5EF4-FFF2-40B4-BE49-F238E27FC236}">
+                <a16:creationId xmlns:a16="http://schemas.microsoft.com/office/drawing/2014/main" id="{6B0BF5A0-4AC9-488A-9330-7851A3B4F386}"/>
+              </a:ext>
+            </a:extLst>
+          </p:cNvPr>
+          <p:cNvPicPr>
+            <a:picLocks noChangeAspect="1"/>
+          </p:cNvPicPr>
+          <p:nvPr/>
+        </p:nvPicPr>
+        <p:blipFill>
+          <a:blip r:embed="rId2">
+            <a:extLst>
+              <a:ext uri="{28A0092B-C50C-407E-A947-70E740481C1C}">
+                <a14:useLocalDpi xmlns:a14="http://schemas.microsoft.com/office/drawing/2010/main" val="0"/>
+              </a:ext>
+            </a:extLst>
+          </a:blip>
+          <a:stretch>
+            <a:fillRect/>
+          </a:stretch>
+        </p:blipFill>
+        <p:spPr>
+          <a:xfrm>
+            <a:off x="4914226" y="934860"/>
+            <a:ext cx="6519910" cy="5110200"/>
+          </a:xfrm>
+          <a:prstGeom prst="rect">
+            <a:avLst/>
+          </a:prstGeom>
+        </p:spPr>
+      </p:pic>
+    </p:spTree>
+    <p:extLst>
+      <p:ext uri="{BB962C8B-B14F-4D97-AF65-F5344CB8AC3E}">
+        <p14:creationId xmlns:p14="http://schemas.microsoft.com/office/powerpoint/2010/main" val="4221849338"/>
+      </p:ext>
+    </p:extLst>
+  </p:cSld>
+  <p:clrMapOvr>
+    <a:masterClrMapping/>
+  </p:clrMapOvr>
+</p:sld>
+</file>
+
+<file path=ppt/slides/slide2.xml><?xml version="1.0" encoding="utf-8"?>
+<p:sld xmlns:a="http://schemas.openxmlformats.org/drawingml/2006/main" xmlns:r="http://schemas.openxmlformats.org/officeDocument/2006/relationships" xmlns:p="http://schemas.openxmlformats.org/presentationml/2006/main">
+  <p:cSld>
+    <p:spTree>
+      <p:nvGrpSpPr>
+        <p:cNvPr id="1" name=""/>
+        <p:cNvGrpSpPr/>
+        <p:nvPr/>
+      </p:nvGrpSpPr>
+      <p:grpSpPr>
+        <a:xfrm>
+          <a:off x="0" y="0"/>
+          <a:ext cx="0" cy="0"/>
+          <a:chOff x="0" y="0"/>
+          <a:chExt cx="0" cy="0"/>
+        </a:xfrm>
+      </p:grpSpPr>
+      <p:sp>
+        <p:nvSpPr>
+          <p:cNvPr id="2" name="Title 1">
+            <a:extLst>
+              <a:ext uri="{FF2B5EF4-FFF2-40B4-BE49-F238E27FC236}">
+                <a16:creationId xmlns:a16="http://schemas.microsoft.com/office/drawing/2014/main" id="{788E85B7-861A-45DD-BA95-04E672E70903}"/>
+              </a:ext>
+            </a:extLst>
+          </p:cNvPr>
+          <p:cNvSpPr>
+            <a:spLocks noGrp="1"/>
+          </p:cNvSpPr>
+          <p:nvPr>
+            <p:ph type="title"/>
+          </p:nvPr>
+        </p:nvSpPr>
+        <p:spPr/>
+        <p:txBody>
+          <a:bodyPr/>
+          <a:lstStyle/>
+          <a:p>
+            <a:r>
+              <a:rPr lang="en-US" dirty="0"/>
+              <a:t>Variables and Function in Statistical Learning</a:t>
+            </a:r>
+          </a:p>
+        </p:txBody>
+      </p:sp>
+      <p:sp>
+        <p:nvSpPr>
+          <p:cNvPr id="3" name="Content Placeholder 2">
+            <a:extLst>
+              <a:ext uri="{FF2B5EF4-FFF2-40B4-BE49-F238E27FC236}">
+                <a16:creationId xmlns:a16="http://schemas.microsoft.com/office/drawing/2014/main" id="{1121B6E0-5F7C-4781-9815-1C1D5E7B8640}"/>
+              </a:ext>
+            </a:extLst>
+          </p:cNvPr>
+          <p:cNvSpPr>
+            <a:spLocks noGrp="1"/>
+          </p:cNvSpPr>
+          <p:nvPr>
+            <p:ph idx="1"/>
+          </p:nvPr>
+        </p:nvSpPr>
+        <p:spPr/>
+        <p:txBody>
+          <a:bodyPr/>
+          <a:lstStyle/>
+          <a:p>
+            <a:r>
+              <a:rPr lang="en-US" dirty="0"/>
+              <a:t>The following are the variables and function used in statistical learning:</a:t>
+            </a:r>
+          </a:p>
+          <a:p>
+            <a:pPr marL="514350" indent="-514350">
+              <a:buAutoNum type="arabicPeriod"/>
+            </a:pPr>
+            <a:r>
+              <a:rPr lang="en-US" dirty="0"/>
+              <a:t>Input variable</a:t>
+            </a:r>
+          </a:p>
+          <a:p>
+            <a:pPr marL="514350" indent="-514350">
+              <a:buAutoNum type="arabicPeriod"/>
+            </a:pPr>
+            <a:r>
+              <a:rPr lang="en-US" dirty="0"/>
+              <a:t>Output variable</a:t>
+            </a:r>
+          </a:p>
+          <a:p>
+            <a:pPr marL="514350" indent="-514350">
+              <a:buAutoNum type="arabicPeriod"/>
+            </a:pPr>
+            <a:r>
+              <a:rPr lang="en-US" dirty="0"/>
+              <a:t>Estimate function</a:t>
+            </a:r>
+          </a:p>
+          <a:p>
+            <a:pPr marL="514350" indent="-514350">
+              <a:buAutoNum type="arabicPeriod"/>
+            </a:pPr>
+            <a:r>
+              <a:rPr lang="en-US" dirty="0"/>
+              <a:t>Error term</a:t>
+            </a:r>
+          </a:p>
+        </p:txBody>
+      </p:sp>
+    </p:spTree>
+    <p:extLst>
+      <p:ext uri="{BB962C8B-B14F-4D97-AF65-F5344CB8AC3E}">
+        <p14:creationId xmlns:p14="http://schemas.microsoft.com/office/powerpoint/2010/main" val="3484538836"/>
+      </p:ext>
+    </p:extLst>
+  </p:cSld>
+  <p:clrMapOvr>
+    <a:masterClrMapping/>
+  </p:clrMapOvr>
+</p:sld>
+</file>
+
+<file path=ppt/slides/slide20.xml><?xml version="1.0" encoding="utf-8"?>
 <p:sld xmlns:a="http://schemas.openxmlformats.org/drawingml/2006/main" xmlns:r="http://schemas.openxmlformats.org/officeDocument/2006/relationships" xmlns:p="http://schemas.openxmlformats.org/presentationml/2006/main">
   <p:cSld>
     <p:bg>
@@ -5368,8 +6172,8 @@
           <a:p>
             <a:pPr algn="ctr"/>
             <a:r>
-              <a:rPr lang="en-US" sz="2600"/>
-              <a:t>The Trad-Off Between Prediction Accuracy and Model Interpretability</a:t>
+              <a:rPr lang="en-US" sz="2600" dirty="0"/>
+              <a:t>The Trade-Off Between Prediction Accuracy and Model Interpretability</a:t>
             </a:r>
           </a:p>
         </p:txBody>
@@ -5404,13 +6208,13 @@
           <a:p>
             <a:r>
               <a:rPr lang="en-US" sz="2000" dirty="0"/>
-              <a:t>Many statistical learning methods have different characteristic.</a:t>
+              <a:t>Many statistical learning methods have different characteristics.</a:t>
             </a:r>
           </a:p>
           <a:p>
             <a:r>
               <a:rPr lang="en-US" sz="2000" dirty="0"/>
-              <a:t>Some are less flexible or some are more restrictive)</a:t>
+              <a:t>Some are less flexible or some are more restrictive.</a:t>
             </a:r>
           </a:p>
           <a:p>
@@ -5470,537 +6274,6 @@
 </p:sld>
 </file>
 
-<file path=ppt/slides/slide18.xml><?xml version="1.0" encoding="utf-8"?>
-<p:sld xmlns:a="http://schemas.openxmlformats.org/drawingml/2006/main" xmlns:r="http://schemas.openxmlformats.org/officeDocument/2006/relationships" xmlns:p="http://schemas.openxmlformats.org/presentationml/2006/main">
-  <p:cSld>
-    <p:spTree>
-      <p:nvGrpSpPr>
-        <p:cNvPr id="1" name=""/>
-        <p:cNvGrpSpPr/>
-        <p:nvPr/>
-      </p:nvGrpSpPr>
-      <p:grpSpPr>
-        <a:xfrm>
-          <a:off x="0" y="0"/>
-          <a:ext cx="0" cy="0"/>
-          <a:chOff x="0" y="0"/>
-          <a:chExt cx="0" cy="0"/>
-        </a:xfrm>
-      </p:grpSpPr>
-      <p:sp>
-        <p:nvSpPr>
-          <p:cNvPr id="2" name="Title 1">
-            <a:extLst>
-              <a:ext uri="{FF2B5EF4-FFF2-40B4-BE49-F238E27FC236}">
-                <a16:creationId xmlns:a16="http://schemas.microsoft.com/office/drawing/2014/main" id="{0A27DD21-5255-4DF9-9B46-4BB876A5F0FC}"/>
-              </a:ext>
-            </a:extLst>
-          </p:cNvPr>
-          <p:cNvSpPr>
-            <a:spLocks noGrp="1"/>
-          </p:cNvSpPr>
-          <p:nvPr>
-            <p:ph type="title"/>
-          </p:nvPr>
-        </p:nvSpPr>
-        <p:spPr/>
-        <p:txBody>
-          <a:bodyPr/>
-          <a:lstStyle/>
-          <a:p>
-            <a:r>
-              <a:rPr lang="en-US" dirty="0"/>
-              <a:t>Deciding when to use a restrictive or flexible approach</a:t>
-            </a:r>
-          </a:p>
-        </p:txBody>
-      </p:sp>
-      <p:sp>
-        <p:nvSpPr>
-          <p:cNvPr id="3" name="Content Placeholder 2">
-            <a:extLst>
-              <a:ext uri="{FF2B5EF4-FFF2-40B4-BE49-F238E27FC236}">
-                <a16:creationId xmlns:a16="http://schemas.microsoft.com/office/drawing/2014/main" id="{04BA13A4-6897-4386-A943-290534FEE584}"/>
-              </a:ext>
-            </a:extLst>
-          </p:cNvPr>
-          <p:cNvSpPr>
-            <a:spLocks noGrp="1"/>
-          </p:cNvSpPr>
-          <p:nvPr>
-            <p:ph idx="1"/>
-          </p:nvPr>
-        </p:nvSpPr>
-        <p:spPr/>
-        <p:txBody>
-          <a:bodyPr/>
-          <a:lstStyle/>
-          <a:p>
-            <a:r>
-              <a:rPr lang="en-US" dirty="0"/>
-              <a:t>The reason that we might prefer a more restrictive model:</a:t>
-            </a:r>
-          </a:p>
-          <a:p>
-            <a:pPr marL="514350" indent="-514350">
-              <a:buFont typeface="+mj-lt"/>
-              <a:buAutoNum type="arabicPeriod"/>
-            </a:pPr>
-            <a:r>
-              <a:rPr lang="en-US" dirty="0"/>
-              <a:t>If we are mainly interested in inference, then restrictive models are much more interpretable.</a:t>
-            </a:r>
-          </a:p>
-          <a:p>
-            <a:pPr marL="0" indent="0">
-              <a:buNone/>
-            </a:pPr>
-            <a:r>
-              <a:rPr lang="en-US" dirty="0"/>
-              <a:t>EX: when inference is the goal, the linear model may be a good choice since it is easier to understand the relationship between Y and X1, X2, … , </a:t>
-            </a:r>
-            <a:r>
-              <a:rPr lang="en-US" dirty="0" err="1"/>
-              <a:t>Xp</a:t>
-            </a:r>
-            <a:r>
-              <a:rPr lang="en-US" dirty="0"/>
-              <a:t>.</a:t>
-            </a:r>
-          </a:p>
-          <a:p>
-            <a:r>
-              <a:rPr lang="en-US" dirty="0"/>
-              <a:t>In contrast, approaches such as splines and boosting method are very flexible, which can lead to complicated estimates of </a:t>
-            </a:r>
-            <a:r>
-              <a:rPr lang="en-US" i="1" dirty="0"/>
-              <a:t>f</a:t>
-            </a:r>
-            <a:r>
-              <a:rPr lang="en-US" dirty="0"/>
-              <a:t> that it is difficult to understand how any individual predictor is associated with the response.</a:t>
-            </a:r>
-          </a:p>
-          <a:p>
-            <a:pPr marL="514350" indent="-514350">
-              <a:buFont typeface="+mj-lt"/>
-              <a:buAutoNum type="arabicPeriod"/>
-            </a:pPr>
-            <a:endParaRPr lang="en-US" dirty="0"/>
-          </a:p>
-        </p:txBody>
-      </p:sp>
-    </p:spTree>
-    <p:extLst>
-      <p:ext uri="{BB962C8B-B14F-4D97-AF65-F5344CB8AC3E}">
-        <p14:creationId xmlns:p14="http://schemas.microsoft.com/office/powerpoint/2010/main" val="3241602179"/>
-      </p:ext>
-    </p:extLst>
-  </p:cSld>
-  <p:clrMapOvr>
-    <a:masterClrMapping/>
-  </p:clrMapOvr>
-</p:sld>
-</file>
-
-<file path=ppt/slides/slide19.xml><?xml version="1.0" encoding="utf-8"?>
-<p:sld xmlns:a="http://schemas.openxmlformats.org/drawingml/2006/main" xmlns:r="http://schemas.openxmlformats.org/officeDocument/2006/relationships" xmlns:p="http://schemas.openxmlformats.org/presentationml/2006/main">
-  <p:cSld>
-    <p:spTree>
-      <p:nvGrpSpPr>
-        <p:cNvPr id="1" name=""/>
-        <p:cNvGrpSpPr/>
-        <p:nvPr/>
-      </p:nvGrpSpPr>
-      <p:grpSpPr>
-        <a:xfrm>
-          <a:off x="0" y="0"/>
-          <a:ext cx="0" cy="0"/>
-          <a:chOff x="0" y="0"/>
-          <a:chExt cx="0" cy="0"/>
-        </a:xfrm>
-      </p:grpSpPr>
-      <p:sp>
-        <p:nvSpPr>
-          <p:cNvPr id="3" name="Content Placeholder 2">
-            <a:extLst>
-              <a:ext uri="{FF2B5EF4-FFF2-40B4-BE49-F238E27FC236}">
-                <a16:creationId xmlns:a16="http://schemas.microsoft.com/office/drawing/2014/main" id="{F0C81A20-9C09-4E57-8ACA-3B4799C91621}"/>
-              </a:ext>
-            </a:extLst>
-          </p:cNvPr>
-          <p:cNvSpPr>
-            <a:spLocks noGrp="1"/>
-          </p:cNvSpPr>
-          <p:nvPr>
-            <p:ph idx="1"/>
-          </p:nvPr>
-        </p:nvSpPr>
-        <p:spPr>
-          <a:xfrm>
-            <a:off x="838200" y="296562"/>
-            <a:ext cx="10515600" cy="5880401"/>
-          </a:xfrm>
-        </p:spPr>
-        <p:txBody>
-          <a:bodyPr>
-            <a:normAutofit fontScale="92500" lnSpcReduction="10000"/>
-          </a:bodyPr>
-          <a:lstStyle/>
-          <a:p>
-            <a:r>
-              <a:rPr lang="en-US" dirty="0"/>
-              <a:t>an example of inflexible methods is Least squares linear regression is relatively inflexible but is quite interpretable.</a:t>
-            </a:r>
-          </a:p>
-          <a:p>
-            <a:r>
-              <a:rPr lang="en-US" dirty="0"/>
-              <a:t>Another example is lasso because it is restrictive in estimating the coefficients, and sets a number of β0, β1, β2, … , βp to exactly zero, but it is more interpretable than linear regression because in the final model, the response variable will only be related to a small subset of the predictor</a:t>
-            </a:r>
-          </a:p>
-          <a:p>
-            <a:r>
-              <a:rPr lang="en-US" dirty="0"/>
-              <a:t>However, GAM is more flexible but less interpretable than linear regression because the relationship between each predictor and the response is now modeled using a curve.</a:t>
-            </a:r>
-          </a:p>
-          <a:p>
-            <a:r>
-              <a:rPr lang="en-US" dirty="0"/>
-              <a:t>Furthermore, fully non-linear methods such as </a:t>
-            </a:r>
-            <a:r>
-              <a:rPr lang="en-US" i="1" dirty="0"/>
-              <a:t>bagging, boosting</a:t>
-            </a:r>
-            <a:r>
-              <a:rPr lang="en-US" dirty="0"/>
-              <a:t>, and </a:t>
-            </a:r>
-            <a:r>
-              <a:rPr lang="en-US" i="1" dirty="0"/>
-              <a:t>support vector machines</a:t>
-            </a:r>
-            <a:r>
-              <a:rPr lang="en-US" dirty="0"/>
-              <a:t> with non-linear kernels are highly flexible approaches that are harder to interpret.</a:t>
-            </a:r>
-          </a:p>
-          <a:p>
-            <a:r>
-              <a:rPr lang="en-US" dirty="0"/>
-              <a:t>When inference is the goal, there are clear advantage to using simple and relatively inflexible statistical learning methods.</a:t>
-            </a:r>
-          </a:p>
-          <a:p>
-            <a:r>
-              <a:rPr lang="en-US" dirty="0"/>
-              <a:t>Also it might be best to use a more flexible model when the requirement for the algorithm is to predict accurately, not to interpret.</a:t>
-            </a:r>
-          </a:p>
-          <a:p>
-            <a:endParaRPr lang="en-US" dirty="0"/>
-          </a:p>
-          <a:p>
-            <a:endParaRPr lang="en-US" dirty="0"/>
-          </a:p>
-        </p:txBody>
-      </p:sp>
-    </p:spTree>
-    <p:extLst>
-      <p:ext uri="{BB962C8B-B14F-4D97-AF65-F5344CB8AC3E}">
-        <p14:creationId xmlns:p14="http://schemas.microsoft.com/office/powerpoint/2010/main" val="1569276042"/>
-      </p:ext>
-    </p:extLst>
-  </p:cSld>
-  <p:clrMapOvr>
-    <a:masterClrMapping/>
-  </p:clrMapOvr>
-</p:sld>
-</file>
-
-<file path=ppt/slides/slide2.xml><?xml version="1.0" encoding="utf-8"?>
-<p:sld xmlns:a="http://schemas.openxmlformats.org/drawingml/2006/main" xmlns:r="http://schemas.openxmlformats.org/officeDocument/2006/relationships" xmlns:p="http://schemas.openxmlformats.org/presentationml/2006/main">
-  <p:cSld>
-    <p:spTree>
-      <p:nvGrpSpPr>
-        <p:cNvPr id="1" name=""/>
-        <p:cNvGrpSpPr/>
-        <p:nvPr/>
-      </p:nvGrpSpPr>
-      <p:grpSpPr>
-        <a:xfrm>
-          <a:off x="0" y="0"/>
-          <a:ext cx="0" cy="0"/>
-          <a:chOff x="0" y="0"/>
-          <a:chExt cx="0" cy="0"/>
-        </a:xfrm>
-      </p:grpSpPr>
-      <p:sp>
-        <p:nvSpPr>
-          <p:cNvPr id="2" name="Title 1">
-            <a:extLst>
-              <a:ext uri="{FF2B5EF4-FFF2-40B4-BE49-F238E27FC236}">
-                <a16:creationId xmlns:a16="http://schemas.microsoft.com/office/drawing/2014/main" id="{788E85B7-861A-45DD-BA95-04E672E70903}"/>
-              </a:ext>
-            </a:extLst>
-          </p:cNvPr>
-          <p:cNvSpPr>
-            <a:spLocks noGrp="1"/>
-          </p:cNvSpPr>
-          <p:nvPr>
-            <p:ph type="title"/>
-          </p:nvPr>
-        </p:nvSpPr>
-        <p:spPr/>
-        <p:txBody>
-          <a:bodyPr/>
-          <a:lstStyle/>
-          <a:p>
-            <a:r>
-              <a:rPr lang="en-US" dirty="0"/>
-              <a:t>Variables and Function in Statistical Learning</a:t>
-            </a:r>
-          </a:p>
-        </p:txBody>
-      </p:sp>
-      <p:sp>
-        <p:nvSpPr>
-          <p:cNvPr id="3" name="Content Placeholder 2">
-            <a:extLst>
-              <a:ext uri="{FF2B5EF4-FFF2-40B4-BE49-F238E27FC236}">
-                <a16:creationId xmlns:a16="http://schemas.microsoft.com/office/drawing/2014/main" id="{1121B6E0-5F7C-4781-9815-1C1D5E7B8640}"/>
-              </a:ext>
-            </a:extLst>
-          </p:cNvPr>
-          <p:cNvSpPr>
-            <a:spLocks noGrp="1"/>
-          </p:cNvSpPr>
-          <p:nvPr>
-            <p:ph idx="1"/>
-          </p:nvPr>
-        </p:nvSpPr>
-        <p:spPr/>
-        <p:txBody>
-          <a:bodyPr/>
-          <a:lstStyle/>
-          <a:p>
-            <a:r>
-              <a:rPr lang="en-US" dirty="0"/>
-              <a:t>The following are the variables and function used in statistical learning:</a:t>
-            </a:r>
-          </a:p>
-          <a:p>
-            <a:pPr marL="514350" indent="-514350">
-              <a:buAutoNum type="arabicPeriod"/>
-            </a:pPr>
-            <a:r>
-              <a:rPr lang="en-US" dirty="0"/>
-              <a:t>Input variable</a:t>
-            </a:r>
-          </a:p>
-          <a:p>
-            <a:pPr marL="514350" indent="-514350">
-              <a:buAutoNum type="arabicPeriod"/>
-            </a:pPr>
-            <a:r>
-              <a:rPr lang="en-US" dirty="0"/>
-              <a:t>Output variable</a:t>
-            </a:r>
-          </a:p>
-          <a:p>
-            <a:pPr marL="514350" indent="-514350">
-              <a:buAutoNum type="arabicPeriod"/>
-            </a:pPr>
-            <a:r>
-              <a:rPr lang="en-US" dirty="0"/>
-              <a:t>Estimate function</a:t>
-            </a:r>
-          </a:p>
-          <a:p>
-            <a:pPr marL="514350" indent="-514350">
-              <a:buAutoNum type="arabicPeriod"/>
-            </a:pPr>
-            <a:r>
-              <a:rPr lang="en-US" dirty="0"/>
-              <a:t>Error term</a:t>
-            </a:r>
-          </a:p>
-        </p:txBody>
-      </p:sp>
-    </p:spTree>
-    <p:extLst>
-      <p:ext uri="{BB962C8B-B14F-4D97-AF65-F5344CB8AC3E}">
-        <p14:creationId xmlns:p14="http://schemas.microsoft.com/office/powerpoint/2010/main" val="3484538836"/>
-      </p:ext>
-    </p:extLst>
-  </p:cSld>
-  <p:clrMapOvr>
-    <a:masterClrMapping/>
-  </p:clrMapOvr>
-</p:sld>
-</file>
-
-<file path=ppt/slides/slide20.xml><?xml version="1.0" encoding="utf-8"?>
-<p:sld xmlns:a="http://schemas.openxmlformats.org/drawingml/2006/main" xmlns:r="http://schemas.openxmlformats.org/officeDocument/2006/relationships" xmlns:p="http://schemas.openxmlformats.org/presentationml/2006/main">
-  <p:cSld>
-    <p:spTree>
-      <p:nvGrpSpPr>
-        <p:cNvPr id="1" name=""/>
-        <p:cNvGrpSpPr/>
-        <p:nvPr/>
-      </p:nvGrpSpPr>
-      <p:grpSpPr>
-        <a:xfrm>
-          <a:off x="0" y="0"/>
-          <a:ext cx="0" cy="0"/>
-          <a:chOff x="0" y="0"/>
-          <a:chExt cx="0" cy="0"/>
-        </a:xfrm>
-      </p:grpSpPr>
-      <p:sp>
-        <p:nvSpPr>
-          <p:cNvPr id="2" name="Title 1">
-            <a:extLst>
-              <a:ext uri="{FF2B5EF4-FFF2-40B4-BE49-F238E27FC236}">
-                <a16:creationId xmlns:a16="http://schemas.microsoft.com/office/drawing/2014/main" id="{150AD9BB-7A41-4470-AE16-5D5938F56D33}"/>
-              </a:ext>
-            </a:extLst>
-          </p:cNvPr>
-          <p:cNvSpPr>
-            <a:spLocks noGrp="1"/>
-          </p:cNvSpPr>
-          <p:nvPr>
-            <p:ph type="title"/>
-          </p:nvPr>
-        </p:nvSpPr>
-        <p:spPr/>
-        <p:txBody>
-          <a:bodyPr/>
-          <a:lstStyle/>
-          <a:p>
-            <a:r>
-              <a:rPr lang="en-US" dirty="0"/>
-              <a:t>Supervised VS Unsupervised Learning</a:t>
-            </a:r>
-          </a:p>
-        </p:txBody>
-      </p:sp>
-      <p:sp>
-        <p:nvSpPr>
-          <p:cNvPr id="3" name="Content Placeholder 2">
-            <a:extLst>
-              <a:ext uri="{FF2B5EF4-FFF2-40B4-BE49-F238E27FC236}">
-                <a16:creationId xmlns:a16="http://schemas.microsoft.com/office/drawing/2014/main" id="{09BEC18C-E62C-49C9-96A6-3A5C4177E059}"/>
-              </a:ext>
-            </a:extLst>
-          </p:cNvPr>
-          <p:cNvSpPr>
-            <a:spLocks noGrp="1"/>
-          </p:cNvSpPr>
-          <p:nvPr>
-            <p:ph idx="1"/>
-          </p:nvPr>
-        </p:nvSpPr>
-        <p:spPr/>
-        <p:txBody>
-          <a:bodyPr/>
-          <a:lstStyle/>
-          <a:p>
-            <a:r>
-              <a:rPr lang="en-US" dirty="0">
-                <a:hlinkClick r:id="rId2"/>
-              </a:rPr>
-              <a:t>What is supervised and unsupervised learning</a:t>
-            </a:r>
-            <a:r>
-              <a:rPr lang="en-US" dirty="0"/>
-              <a:t>: Slide 3</a:t>
-            </a:r>
-          </a:p>
-          <a:p>
-            <a:r>
-              <a:rPr lang="en-US" dirty="0"/>
-              <a:t>The parametric and non-parametric approaches are supervised learning because each observation of the predictor x</a:t>
-            </a:r>
-            <a:r>
-              <a:rPr lang="en-US" sz="2000" dirty="0"/>
-              <a:t>i</a:t>
-            </a:r>
-            <a:r>
-              <a:rPr lang="en-US" dirty="0"/>
-              <a:t> is an associated response to the measurement </a:t>
-            </a:r>
-            <a:r>
-              <a:rPr lang="en-US" dirty="0" err="1"/>
-              <a:t>y</a:t>
-            </a:r>
-            <a:r>
-              <a:rPr lang="en-US" sz="2000" dirty="0" err="1"/>
-              <a:t>i</a:t>
-            </a:r>
-            <a:r>
-              <a:rPr lang="en-US" dirty="0"/>
-              <a:t>.</a:t>
-            </a:r>
-          </a:p>
-          <a:p>
-            <a:r>
-              <a:rPr lang="en-US" dirty="0"/>
-              <a:t>Example of statistical learning methods that fall into the supervised learning domain: linear regression, logistic regression, GAM, boosting, and support vector machines.</a:t>
-            </a:r>
-          </a:p>
-          <a:p>
-            <a:r>
-              <a:rPr lang="en-US" dirty="0"/>
-              <a:t>In contrast, unsupervised learning describes the somewhat more challenging situation in which for every observation </a:t>
-            </a:r>
-            <a:r>
-              <a:rPr lang="en-US" dirty="0" err="1"/>
-              <a:t>i</a:t>
-            </a:r>
-            <a:r>
-              <a:rPr lang="en-US" dirty="0"/>
-              <a:t> = 1, … , n, we observe a vector measurements x</a:t>
-            </a:r>
-            <a:r>
-              <a:rPr lang="en-US" sz="2000" dirty="0"/>
-              <a:t>i</a:t>
-            </a:r>
-            <a:r>
-              <a:rPr lang="en-US" dirty="0"/>
-              <a:t> but no associated response </a:t>
-            </a:r>
-            <a:r>
-              <a:rPr lang="en-US" dirty="0" err="1"/>
-              <a:t>y</a:t>
-            </a:r>
-            <a:r>
-              <a:rPr lang="en-US" sz="2000" dirty="0" err="1"/>
-              <a:t>i</a:t>
-            </a:r>
-            <a:r>
-              <a:rPr lang="en-US" dirty="0"/>
-              <a:t>.</a:t>
-            </a:r>
-          </a:p>
-        </p:txBody>
-      </p:sp>
-    </p:spTree>
-    <p:extLst>
-      <p:ext uri="{BB962C8B-B14F-4D97-AF65-F5344CB8AC3E}">
-        <p14:creationId xmlns:p14="http://schemas.microsoft.com/office/powerpoint/2010/main" val="1578736230"/>
-      </p:ext>
-    </p:extLst>
-  </p:cSld>
-  <p:clrMapOvr>
-    <a:masterClrMapping/>
-  </p:clrMapOvr>
-</p:sld>
-</file>
-
 <file path=ppt/slides/slide21.xml><?xml version="1.0" encoding="utf-8"?>
 <p:sld xmlns:a="http://schemas.openxmlformats.org/drawingml/2006/main" xmlns:r="http://schemas.openxmlformats.org/officeDocument/2006/relationships" xmlns:p="http://schemas.openxmlformats.org/presentationml/2006/main">
   <p:cSld>
@@ -6023,7 +6296,7 @@
           <p:cNvPr id="2" name="Title 1">
             <a:extLst>
               <a:ext uri="{FF2B5EF4-FFF2-40B4-BE49-F238E27FC236}">
-                <a16:creationId xmlns:a16="http://schemas.microsoft.com/office/drawing/2014/main" id="{2194AF91-50DB-494C-B8CC-162566670E1A}"/>
+                <a16:creationId xmlns:a16="http://schemas.microsoft.com/office/drawing/2014/main" id="{0A27DD21-5255-4DF9-9B46-4BB876A5F0FC}"/>
               </a:ext>
             </a:extLst>
           </p:cNvPr>
@@ -6039,7 +6312,10 @@
           <a:bodyPr/>
           <a:lstStyle/>
           <a:p>
-            <a:endParaRPr lang="en-US"/>
+            <a:r>
+              <a:rPr lang="en-US" dirty="0"/>
+              <a:t>Deciding when to use a restrictive or flexible approach</a:t>
+            </a:r>
           </a:p>
         </p:txBody>
       </p:sp>
@@ -6048,7 +6324,7 @@
           <p:cNvPr id="3" name="Content Placeholder 2">
             <a:extLst>
               <a:ext uri="{FF2B5EF4-FFF2-40B4-BE49-F238E27FC236}">
-                <a16:creationId xmlns:a16="http://schemas.microsoft.com/office/drawing/2014/main" id="{497A49D5-3B4E-4EFA-A8B0-AFCE21C8757C}"/>
+                <a16:creationId xmlns:a16="http://schemas.microsoft.com/office/drawing/2014/main" id="{04BA13A4-6897-4386-A943-290534FEE584}"/>
               </a:ext>
             </a:extLst>
           </p:cNvPr>
@@ -6061,54 +6337,68 @@
         </p:nvSpPr>
         <p:spPr/>
         <p:txBody>
-          <a:bodyPr>
-            <a:normAutofit lnSpcReduction="10000"/>
-          </a:bodyPr>
-          <a:lstStyle/>
-          <a:p>
-            <a:r>
-              <a:rPr lang="en-US" dirty="0"/>
-              <a:t>Use linear regression as an example:</a:t>
-            </a:r>
-          </a:p>
-          <a:p>
-            <a:r>
-              <a:rPr lang="en-US" dirty="0"/>
-              <a:t>Linear regression is a supervised learning method because there are predictor x is an  associated response to the measurement y.</a:t>
-            </a:r>
-          </a:p>
-          <a:p>
-            <a:r>
-              <a:rPr lang="en-US" dirty="0"/>
-              <a:t>However, since linear regression requires the measurement of y, we should not use linear regression to do unsupervised learning because there is no response variable y to predict in unsupervised learning.</a:t>
-            </a:r>
-          </a:p>
-          <a:p>
-            <a:r>
-              <a:rPr lang="en-US" dirty="0"/>
-              <a:t>Therefore, one statistical learning tool may use in this setting is </a:t>
+          <a:bodyPr/>
+          <a:lstStyle/>
+          <a:p>
+            <a:r>
+              <a:rPr lang="en-US" dirty="0"/>
+              <a:t>The reason that we might prefer a more restrictive model:</a:t>
+            </a:r>
+          </a:p>
+          <a:p>
+            <a:pPr marL="514350" indent="-514350">
+              <a:buFont typeface="+mj-lt"/>
+              <a:buAutoNum type="arabicPeriod"/>
+            </a:pPr>
+            <a:r>
+              <a:rPr lang="en-US" dirty="0"/>
+              <a:t>If we are mainly interested in inference, then restrictive models are much more interpretable.</a:t>
+            </a:r>
+          </a:p>
+          <a:p>
+            <a:pPr marL="0" indent="0">
+              <a:buNone/>
+            </a:pPr>
+            <a:r>
+              <a:rPr lang="en-US" dirty="0"/>
+              <a:t>EX: when inference is the goal, the linear model may be a good choice since it is easier to understand the relationship between Y and X1, X2, … , </a:t>
+            </a:r>
+            <a:r>
+              <a:rPr lang="en-US" dirty="0" err="1"/>
+              <a:t>Xp</a:t>
+            </a:r>
+            <a:r>
+              <a:rPr lang="en-US" dirty="0"/>
+              <a:t>.</a:t>
+            </a:r>
+          </a:p>
+          <a:p>
+            <a:r>
+              <a:rPr lang="en-US" dirty="0"/>
+              <a:t>In contrast, approaches such as splines and boosting method are very flexible, which can lead to complicated estimates of </a:t>
             </a:r>
             <a:r>
               <a:rPr lang="en-US" i="1" dirty="0"/>
-              <a:t>cluster analysis</a:t>
-            </a:r>
-            <a:r>
-              <a:rPr lang="en-US" dirty="0"/>
-              <a:t>.</a:t>
-            </a:r>
-          </a:p>
-          <a:p>
-            <a:r>
-              <a:rPr lang="en-US" dirty="0"/>
-              <a:t>The goal for cluster analysis is to ascertain whether the observations fall into relatively distinct groups.</a:t>
-            </a:r>
+              <a:t>f</a:t>
+            </a:r>
+            <a:r>
+              <a:rPr lang="en-US" dirty="0"/>
+              <a:t> that it is difficult to understand how any individual predictor is associated with the response.</a:t>
+            </a:r>
+          </a:p>
+          <a:p>
+            <a:pPr marL="514350" indent="-514350">
+              <a:buFont typeface="+mj-lt"/>
+              <a:buAutoNum type="arabicPeriod"/>
+            </a:pPr>
+            <a:endParaRPr lang="en-US" dirty="0"/>
           </a:p>
         </p:txBody>
       </p:sp>
     </p:spTree>
     <p:extLst>
       <p:ext uri="{BB962C8B-B14F-4D97-AF65-F5344CB8AC3E}">
-        <p14:creationId xmlns:p14="http://schemas.microsoft.com/office/powerpoint/2010/main" val="3911561990"/>
+        <p14:creationId xmlns:p14="http://schemas.microsoft.com/office/powerpoint/2010/main" val="3241602179"/>
       </p:ext>
     </p:extLst>
   </p:cSld>
@@ -6140,6 +6430,398 @@
           <p:cNvPr id="3" name="Content Placeholder 2">
             <a:extLst>
               <a:ext uri="{FF2B5EF4-FFF2-40B4-BE49-F238E27FC236}">
+                <a16:creationId xmlns:a16="http://schemas.microsoft.com/office/drawing/2014/main" id="{F0C81A20-9C09-4E57-8ACA-3B4799C91621}"/>
+              </a:ext>
+            </a:extLst>
+          </p:cNvPr>
+          <p:cNvSpPr>
+            <a:spLocks noGrp="1"/>
+          </p:cNvSpPr>
+          <p:nvPr>
+            <p:ph idx="1"/>
+          </p:nvPr>
+        </p:nvSpPr>
+        <p:spPr>
+          <a:xfrm>
+            <a:off x="838200" y="296562"/>
+            <a:ext cx="10515600" cy="5880401"/>
+          </a:xfrm>
+        </p:spPr>
+        <p:txBody>
+          <a:bodyPr>
+            <a:normAutofit fontScale="92500" lnSpcReduction="10000"/>
+          </a:bodyPr>
+          <a:lstStyle/>
+          <a:p>
+            <a:r>
+              <a:rPr lang="en-US" dirty="0"/>
+              <a:t>an example of inflexible methods is Least squares linear regression is relatively inflexible but is quite interpretable.</a:t>
+            </a:r>
+          </a:p>
+          <a:p>
+            <a:r>
+              <a:rPr lang="en-US" dirty="0"/>
+              <a:t>Another example is lasso because it is restrictive in estimating the coefficients, and sets a number of β0, β1, β2, … , βp to exactly zero, but it is more interpretable than linear regression because in the final model, the response variable will only be related to a small subset of the predictor</a:t>
+            </a:r>
+          </a:p>
+          <a:p>
+            <a:r>
+              <a:rPr lang="en-US" dirty="0"/>
+              <a:t>However, GAM is more flexible but less interpretable than linear regression because the relationship between each predictor and the response is now modeled using a curve.</a:t>
+            </a:r>
+          </a:p>
+          <a:p>
+            <a:r>
+              <a:rPr lang="en-US" dirty="0"/>
+              <a:t>Furthermore, fully non-linear methods such as </a:t>
+            </a:r>
+            <a:r>
+              <a:rPr lang="en-US" i="1" dirty="0"/>
+              <a:t>bagging, boosting</a:t>
+            </a:r>
+            <a:r>
+              <a:rPr lang="en-US" dirty="0"/>
+              <a:t>, and </a:t>
+            </a:r>
+            <a:r>
+              <a:rPr lang="en-US" i="1" dirty="0"/>
+              <a:t>support vector machines</a:t>
+            </a:r>
+            <a:r>
+              <a:rPr lang="en-US" dirty="0"/>
+              <a:t> with non-linear kernels are highly flexible approaches that are harder to interpret.</a:t>
+            </a:r>
+          </a:p>
+          <a:p>
+            <a:r>
+              <a:rPr lang="en-US" dirty="0"/>
+              <a:t>When inference is the goal, there are clear advantage to using simple and relatively inflexible statistical learning methods.</a:t>
+            </a:r>
+          </a:p>
+          <a:p>
+            <a:r>
+              <a:rPr lang="en-US" dirty="0"/>
+              <a:t>Also it might be best to use a more flexible model when the requirement for the algorithm is to predict accurately, not to interpret.</a:t>
+            </a:r>
+          </a:p>
+          <a:p>
+            <a:endParaRPr lang="en-US" dirty="0"/>
+          </a:p>
+          <a:p>
+            <a:endParaRPr lang="en-US" dirty="0"/>
+          </a:p>
+        </p:txBody>
+      </p:sp>
+    </p:spTree>
+    <p:extLst>
+      <p:ext uri="{BB962C8B-B14F-4D97-AF65-F5344CB8AC3E}">
+        <p14:creationId xmlns:p14="http://schemas.microsoft.com/office/powerpoint/2010/main" val="1569276042"/>
+      </p:ext>
+    </p:extLst>
+  </p:cSld>
+  <p:clrMapOvr>
+    <a:masterClrMapping/>
+  </p:clrMapOvr>
+</p:sld>
+</file>
+
+<file path=ppt/slides/slide23.xml><?xml version="1.0" encoding="utf-8"?>
+<p:sld xmlns:a="http://schemas.openxmlformats.org/drawingml/2006/main" xmlns:r="http://schemas.openxmlformats.org/officeDocument/2006/relationships" xmlns:p="http://schemas.openxmlformats.org/presentationml/2006/main">
+  <p:cSld>
+    <p:spTree>
+      <p:nvGrpSpPr>
+        <p:cNvPr id="1" name=""/>
+        <p:cNvGrpSpPr/>
+        <p:nvPr/>
+      </p:nvGrpSpPr>
+      <p:grpSpPr>
+        <a:xfrm>
+          <a:off x="0" y="0"/>
+          <a:ext cx="0" cy="0"/>
+          <a:chOff x="0" y="0"/>
+          <a:chExt cx="0" cy="0"/>
+        </a:xfrm>
+      </p:grpSpPr>
+      <p:sp>
+        <p:nvSpPr>
+          <p:cNvPr id="2" name="Title 1">
+            <a:extLst>
+              <a:ext uri="{FF2B5EF4-FFF2-40B4-BE49-F238E27FC236}">
+                <a16:creationId xmlns:a16="http://schemas.microsoft.com/office/drawing/2014/main" id="{150AD9BB-7A41-4470-AE16-5D5938F56D33}"/>
+              </a:ext>
+            </a:extLst>
+          </p:cNvPr>
+          <p:cNvSpPr>
+            <a:spLocks noGrp="1"/>
+          </p:cNvSpPr>
+          <p:nvPr>
+            <p:ph type="title"/>
+          </p:nvPr>
+        </p:nvSpPr>
+        <p:spPr/>
+        <p:txBody>
+          <a:bodyPr/>
+          <a:lstStyle/>
+          <a:p>
+            <a:r>
+              <a:rPr lang="en-US" dirty="0"/>
+              <a:t>Supervised VS Unsupervised Learning</a:t>
+            </a:r>
+          </a:p>
+        </p:txBody>
+      </p:sp>
+      <p:sp>
+        <p:nvSpPr>
+          <p:cNvPr id="3" name="Content Placeholder 2">
+            <a:extLst>
+              <a:ext uri="{FF2B5EF4-FFF2-40B4-BE49-F238E27FC236}">
+                <a16:creationId xmlns:a16="http://schemas.microsoft.com/office/drawing/2014/main" id="{09BEC18C-E62C-49C9-96A6-3A5C4177E059}"/>
+              </a:ext>
+            </a:extLst>
+          </p:cNvPr>
+          <p:cNvSpPr>
+            <a:spLocks noGrp="1"/>
+          </p:cNvSpPr>
+          <p:nvPr>
+            <p:ph idx="1"/>
+          </p:nvPr>
+        </p:nvSpPr>
+        <p:spPr/>
+        <p:txBody>
+          <a:bodyPr/>
+          <a:lstStyle/>
+          <a:p>
+            <a:r>
+              <a:rPr lang="en-US" dirty="0">
+                <a:hlinkClick r:id="rId2"/>
+              </a:rPr>
+              <a:t>What is supervised and unsupervised learning</a:t>
+            </a:r>
+            <a:r>
+              <a:rPr lang="en-US" dirty="0"/>
+              <a:t>: Slide 3</a:t>
+            </a:r>
+          </a:p>
+          <a:p>
+            <a:r>
+              <a:rPr lang="en-US" dirty="0"/>
+              <a:t>The parametric and non-parametric approaches are supervised learning because each observation of the predictor x</a:t>
+            </a:r>
+            <a:r>
+              <a:rPr lang="en-US" sz="2000" dirty="0"/>
+              <a:t>i</a:t>
+            </a:r>
+            <a:r>
+              <a:rPr lang="en-US" dirty="0"/>
+              <a:t> is an associated response to the measurement </a:t>
+            </a:r>
+            <a:r>
+              <a:rPr lang="en-US" dirty="0" err="1"/>
+              <a:t>y</a:t>
+            </a:r>
+            <a:r>
+              <a:rPr lang="en-US" sz="2000" dirty="0" err="1"/>
+              <a:t>i</a:t>
+            </a:r>
+            <a:r>
+              <a:rPr lang="en-US" dirty="0"/>
+              <a:t>.</a:t>
+            </a:r>
+          </a:p>
+          <a:p>
+            <a:r>
+              <a:rPr lang="en-US" dirty="0"/>
+              <a:t>Example of statistical learning methods that fall into the supervised learning domain: linear regression, logistic regression, GAM, boosting, and support vector machines.</a:t>
+            </a:r>
+          </a:p>
+          <a:p>
+            <a:r>
+              <a:rPr lang="en-US" dirty="0"/>
+              <a:t>In contrast, unsupervised learning describes the somewhat more challenging situation in which for every observation </a:t>
+            </a:r>
+            <a:r>
+              <a:rPr lang="en-US" dirty="0" err="1"/>
+              <a:t>i</a:t>
+            </a:r>
+            <a:r>
+              <a:rPr lang="en-US" dirty="0"/>
+              <a:t> = 1, … , n, we observe a vector measurements x</a:t>
+            </a:r>
+            <a:r>
+              <a:rPr lang="en-US" sz="2000" dirty="0"/>
+              <a:t>i</a:t>
+            </a:r>
+            <a:r>
+              <a:rPr lang="en-US" dirty="0"/>
+              <a:t> but no associated response </a:t>
+            </a:r>
+            <a:r>
+              <a:rPr lang="en-US" dirty="0" err="1"/>
+              <a:t>y</a:t>
+            </a:r>
+            <a:r>
+              <a:rPr lang="en-US" sz="2000" dirty="0" err="1"/>
+              <a:t>i</a:t>
+            </a:r>
+            <a:r>
+              <a:rPr lang="en-US" dirty="0"/>
+              <a:t>.</a:t>
+            </a:r>
+          </a:p>
+        </p:txBody>
+      </p:sp>
+    </p:spTree>
+    <p:extLst>
+      <p:ext uri="{BB962C8B-B14F-4D97-AF65-F5344CB8AC3E}">
+        <p14:creationId xmlns:p14="http://schemas.microsoft.com/office/powerpoint/2010/main" val="1578736230"/>
+      </p:ext>
+    </p:extLst>
+  </p:cSld>
+  <p:clrMapOvr>
+    <a:masterClrMapping/>
+  </p:clrMapOvr>
+</p:sld>
+</file>
+
+<file path=ppt/slides/slide24.xml><?xml version="1.0" encoding="utf-8"?>
+<p:sld xmlns:a="http://schemas.openxmlformats.org/drawingml/2006/main" xmlns:r="http://schemas.openxmlformats.org/officeDocument/2006/relationships" xmlns:p="http://schemas.openxmlformats.org/presentationml/2006/main">
+  <p:cSld>
+    <p:spTree>
+      <p:nvGrpSpPr>
+        <p:cNvPr id="1" name=""/>
+        <p:cNvGrpSpPr/>
+        <p:nvPr/>
+      </p:nvGrpSpPr>
+      <p:grpSpPr>
+        <a:xfrm>
+          <a:off x="0" y="0"/>
+          <a:ext cx="0" cy="0"/>
+          <a:chOff x="0" y="0"/>
+          <a:chExt cx="0" cy="0"/>
+        </a:xfrm>
+      </p:grpSpPr>
+      <p:sp>
+        <p:nvSpPr>
+          <p:cNvPr id="2" name="Title 1">
+            <a:extLst>
+              <a:ext uri="{FF2B5EF4-FFF2-40B4-BE49-F238E27FC236}">
+                <a16:creationId xmlns:a16="http://schemas.microsoft.com/office/drawing/2014/main" id="{2194AF91-50DB-494C-B8CC-162566670E1A}"/>
+              </a:ext>
+            </a:extLst>
+          </p:cNvPr>
+          <p:cNvSpPr>
+            <a:spLocks noGrp="1"/>
+          </p:cNvSpPr>
+          <p:nvPr>
+            <p:ph type="title"/>
+          </p:nvPr>
+        </p:nvSpPr>
+        <p:spPr/>
+        <p:txBody>
+          <a:bodyPr/>
+          <a:lstStyle/>
+          <a:p>
+            <a:endParaRPr lang="en-US"/>
+          </a:p>
+        </p:txBody>
+      </p:sp>
+      <p:sp>
+        <p:nvSpPr>
+          <p:cNvPr id="3" name="Content Placeholder 2">
+            <a:extLst>
+              <a:ext uri="{FF2B5EF4-FFF2-40B4-BE49-F238E27FC236}">
+                <a16:creationId xmlns:a16="http://schemas.microsoft.com/office/drawing/2014/main" id="{497A49D5-3B4E-4EFA-A8B0-AFCE21C8757C}"/>
+              </a:ext>
+            </a:extLst>
+          </p:cNvPr>
+          <p:cNvSpPr>
+            <a:spLocks noGrp="1"/>
+          </p:cNvSpPr>
+          <p:nvPr>
+            <p:ph idx="1"/>
+          </p:nvPr>
+        </p:nvSpPr>
+        <p:spPr/>
+        <p:txBody>
+          <a:bodyPr>
+            <a:normAutofit lnSpcReduction="10000"/>
+          </a:bodyPr>
+          <a:lstStyle/>
+          <a:p>
+            <a:r>
+              <a:rPr lang="en-US" dirty="0"/>
+              <a:t>Use linear regression as an example:</a:t>
+            </a:r>
+          </a:p>
+          <a:p>
+            <a:r>
+              <a:rPr lang="en-US" dirty="0"/>
+              <a:t>Linear regression is a supervised learning method because there are predictor x is an  associated response to the measurement y.</a:t>
+            </a:r>
+          </a:p>
+          <a:p>
+            <a:r>
+              <a:rPr lang="en-US" dirty="0"/>
+              <a:t>However, since linear regression requires the measurement of y, we should not use linear regression to do unsupervised learning because there is no response variable y to predict in unsupervised learning.</a:t>
+            </a:r>
+          </a:p>
+          <a:p>
+            <a:r>
+              <a:rPr lang="en-US" dirty="0"/>
+              <a:t>Therefore, one statistical learning tool may use in this setting is </a:t>
+            </a:r>
+            <a:r>
+              <a:rPr lang="en-US" i="1" dirty="0"/>
+              <a:t>cluster analysis</a:t>
+            </a:r>
+            <a:r>
+              <a:rPr lang="en-US" dirty="0"/>
+              <a:t>.</a:t>
+            </a:r>
+          </a:p>
+          <a:p>
+            <a:r>
+              <a:rPr lang="en-US" dirty="0"/>
+              <a:t>The goal for cluster analysis is to ascertain whether the observations fall into relatively distinct groups.</a:t>
+            </a:r>
+          </a:p>
+        </p:txBody>
+      </p:sp>
+    </p:spTree>
+    <p:extLst>
+      <p:ext uri="{BB962C8B-B14F-4D97-AF65-F5344CB8AC3E}">
+        <p14:creationId xmlns:p14="http://schemas.microsoft.com/office/powerpoint/2010/main" val="3911561990"/>
+      </p:ext>
+    </p:extLst>
+  </p:cSld>
+  <p:clrMapOvr>
+    <a:masterClrMapping/>
+  </p:clrMapOvr>
+</p:sld>
+</file>
+
+<file path=ppt/slides/slide25.xml><?xml version="1.0" encoding="utf-8"?>
+<p:sld xmlns:a="http://schemas.openxmlformats.org/drawingml/2006/main" xmlns:r="http://schemas.openxmlformats.org/officeDocument/2006/relationships" xmlns:p="http://schemas.openxmlformats.org/presentationml/2006/main">
+  <p:cSld>
+    <p:spTree>
+      <p:nvGrpSpPr>
+        <p:cNvPr id="1" name=""/>
+        <p:cNvGrpSpPr/>
+        <p:nvPr/>
+      </p:nvGrpSpPr>
+      <p:grpSpPr>
+        <a:xfrm>
+          <a:off x="0" y="0"/>
+          <a:ext cx="0" cy="0"/>
+          <a:chOff x="0" y="0"/>
+          <a:chExt cx="0" cy="0"/>
+        </a:xfrm>
+      </p:grpSpPr>
+      <p:sp>
+        <p:nvSpPr>
+          <p:cNvPr id="3" name="Content Placeholder 2">
+            <a:extLst>
+              <a:ext uri="{FF2B5EF4-FFF2-40B4-BE49-F238E27FC236}">
                 <a16:creationId xmlns:a16="http://schemas.microsoft.com/office/drawing/2014/main" id="{52492953-2CE6-4469-A541-F7BF683D915E}"/>
               </a:ext>
             </a:extLst>
@@ -6226,7 +6908,7 @@
 </p:sld>
 </file>
 
-<file path=ppt/slides/slide23.xml><?xml version="1.0" encoding="utf-8"?>
+<file path=ppt/slides/slide26.xml><?xml version="1.0" encoding="utf-8"?>
 <p:sld xmlns:a="http://schemas.openxmlformats.org/drawingml/2006/main" xmlns:r="http://schemas.openxmlformats.org/officeDocument/2006/relationships" xmlns:p="http://schemas.openxmlformats.org/presentationml/2006/main">
   <p:cSld>
     <p:bg>
@@ -6541,7 +7223,7 @@
 </p:sld>
 </file>
 
-<file path=ppt/slides/slide24.xml><?xml version="1.0" encoding="utf-8"?>
+<file path=ppt/slides/slide27.xml><?xml version="1.0" encoding="utf-8"?>
 <p:sld xmlns:a="http://schemas.openxmlformats.org/drawingml/2006/main" xmlns:r="http://schemas.openxmlformats.org/officeDocument/2006/relationships" xmlns:p="http://schemas.openxmlformats.org/presentationml/2006/main">
   <p:cSld>
     <p:spTree>
@@ -6630,7 +7312,7 @@
 </p:sld>
 </file>
 
-<file path=ppt/slides/slide25.xml><?xml version="1.0" encoding="utf-8"?>
+<file path=ppt/slides/slide28.xml><?xml version="1.0" encoding="utf-8"?>
 <p:sld xmlns:a="http://schemas.openxmlformats.org/drawingml/2006/main" xmlns:r="http://schemas.openxmlformats.org/officeDocument/2006/relationships" xmlns:p="http://schemas.openxmlformats.org/presentationml/2006/main">
   <p:cSld>
     <p:spTree>
@@ -6769,7 +7451,7 @@
 </p:sld>
 </file>
 
-<file path=ppt/slides/slide26.xml><?xml version="1.0" encoding="utf-8"?>
+<file path=ppt/slides/slide29.xml><?xml version="1.0" encoding="utf-8"?>
 <p:sld xmlns:a="http://schemas.openxmlformats.org/drawingml/2006/main" xmlns:r="http://schemas.openxmlformats.org/officeDocument/2006/relationships" xmlns:p="http://schemas.openxmlformats.org/presentationml/2006/main">
   <p:cSld>
     <p:spTree>
@@ -6935,14 +7617,26 @@
                               <a:rPr lang="en-US" b="0" i="1" smtClean="0">
                                 <a:latin typeface="Cambria Math" panose="02040503050406030204" pitchFamily="18" charset="0"/>
                               </a:rPr>
-                              <m:t>− ^</m:t>
+                              <m:t>−</m:t>
                             </m:r>
-                            <m:r>
-                              <a:rPr lang="en-US" b="0" i="1" smtClean="0">
-                                <a:latin typeface="Cambria Math" panose="02040503050406030204" pitchFamily="18" charset="0"/>
-                              </a:rPr>
-                              <m:t>𝑓</m:t>
-                            </m:r>
+                            <m:acc>
+                              <m:accPr>
+                                <m:chr m:val="̂"/>
+                                <m:ctrlPr>
+                                  <a:rPr lang="en-US" i="1">
+                                    <a:latin typeface="Cambria Math" panose="02040503050406030204" pitchFamily="18" charset="0"/>
+                                  </a:rPr>
+                                </m:ctrlPr>
+                              </m:accPr>
+                              <m:e>
+                                <m:r>
+                                  <a:rPr lang="en-US" i="1">
+                                    <a:latin typeface="Cambria Math" panose="02040503050406030204" pitchFamily="18" charset="0"/>
+                                  </a:rPr>
+                                  <m:t>𝑓</m:t>
+                                </m:r>
+                              </m:e>
+                            </m:acc>
                             <m:r>
                               <a:rPr lang="en-US" b="0" i="1" smtClean="0">
                                 <a:latin typeface="Cambria Math" panose="02040503050406030204" pitchFamily="18" charset="0"/>
@@ -6991,18 +7685,24 @@
               <a:p>
                 <a14:m>
                   <m:oMath xmlns:m="http://schemas.openxmlformats.org/officeDocument/2006/math">
-                    <m:r>
-                      <a:rPr lang="en-US" b="0" i="1" smtClean="0">
-                        <a:latin typeface="Cambria Math" panose="02040503050406030204" pitchFamily="18" charset="0"/>
-                      </a:rPr>
-                      <m:t>^</m:t>
-                    </m:r>
-                    <m:r>
-                      <a:rPr lang="en-US" b="0" i="1" smtClean="0">
-                        <a:latin typeface="Cambria Math" panose="02040503050406030204" pitchFamily="18" charset="0"/>
-                      </a:rPr>
-                      <m:t>𝑓</m:t>
-                    </m:r>
+                    <m:acc>
+                      <m:accPr>
+                        <m:chr m:val="̂"/>
+                        <m:ctrlPr>
+                          <a:rPr lang="en-US" i="1">
+                            <a:latin typeface="Cambria Math" panose="02040503050406030204" pitchFamily="18" charset="0"/>
+                          </a:rPr>
+                        </m:ctrlPr>
+                      </m:accPr>
+                      <m:e>
+                        <m:r>
+                          <a:rPr lang="en-US" i="1">
+                            <a:latin typeface="Cambria Math" panose="02040503050406030204" pitchFamily="18" charset="0"/>
+                          </a:rPr>
+                          <m:t>𝑓</m:t>
+                        </m:r>
+                      </m:e>
+                    </m:acc>
                     <m:d>
                       <m:dPr>
                         <m:ctrlPr>
@@ -7043,12 +7743,30 @@
                 </a14:m>
                 <a:r>
                   <a:rPr lang="en-US" dirty="0"/>
-                  <a:t> is the prediction that ^</a:t>
+                  <a:t> is the prediction that </a:t>
                 </a:r>
-                <a:r>
-                  <a:rPr lang="en-US" i="1" dirty="0"/>
-                  <a:t>f</a:t>
-                </a:r>
+                <a14:m>
+                  <m:oMath xmlns:m="http://schemas.openxmlformats.org/officeDocument/2006/math">
+                    <m:acc>
+                      <m:accPr>
+                        <m:chr m:val="̂"/>
+                        <m:ctrlPr>
+                          <a:rPr lang="en-US" i="1">
+                            <a:latin typeface="Cambria Math" panose="02040503050406030204" pitchFamily="18" charset="0"/>
+                          </a:rPr>
+                        </m:ctrlPr>
+                      </m:accPr>
+                      <m:e>
+                        <m:r>
+                          <a:rPr lang="en-US" i="1">
+                            <a:latin typeface="Cambria Math" panose="02040503050406030204" pitchFamily="18" charset="0"/>
+                          </a:rPr>
+                          <m:t>𝑓</m:t>
+                        </m:r>
+                      </m:e>
+                    </m:acc>
+                  </m:oMath>
+                </a14:m>
                 <a:r>
                   <a:rPr lang="en-US" dirty="0"/>
                   <a:t> gives for the </a:t>
@@ -7092,7 +7810,7 @@
               <a:blipFill>
                 <a:blip r:embed="rId2"/>
                 <a:stretch>
-                  <a:fillRect l="-1217" t="-2241" r="-1217" b="-140"/>
+                  <a:fillRect l="-1217" t="-2241" r="-1217" b="-1821"/>
                 </a:stretch>
               </a:blipFill>
             </p:spPr>
@@ -7124,120 +7842,6 @@
 </p:sld>
 </file>
 
-<file path=ppt/slides/slide27.xml><?xml version="1.0" encoding="utf-8"?>
-<p:sld xmlns:a="http://schemas.openxmlformats.org/drawingml/2006/main" xmlns:r="http://schemas.openxmlformats.org/officeDocument/2006/relationships" xmlns:p="http://schemas.openxmlformats.org/presentationml/2006/main">
-  <p:cSld>
-    <p:spTree>
-      <p:nvGrpSpPr>
-        <p:cNvPr id="1" name=""/>
-        <p:cNvGrpSpPr/>
-        <p:nvPr/>
-      </p:nvGrpSpPr>
-      <p:grpSpPr>
-        <a:xfrm>
-          <a:off x="0" y="0"/>
-          <a:ext cx="0" cy="0"/>
-          <a:chOff x="0" y="0"/>
-          <a:chExt cx="0" cy="0"/>
-        </a:xfrm>
-      </p:grpSpPr>
-      <p:sp>
-        <p:nvSpPr>
-          <p:cNvPr id="2" name="Title 1">
-            <a:extLst>
-              <a:ext uri="{FF2B5EF4-FFF2-40B4-BE49-F238E27FC236}">
-                <a16:creationId xmlns:a16="http://schemas.microsoft.com/office/drawing/2014/main" id="{5C912DD6-4E85-4443-930D-9960E5DFBCEE}"/>
-              </a:ext>
-            </a:extLst>
-          </p:cNvPr>
-          <p:cNvSpPr>
-            <a:spLocks noGrp="1"/>
-          </p:cNvSpPr>
-          <p:nvPr>
-            <p:ph type="title"/>
-          </p:nvPr>
-        </p:nvSpPr>
-        <p:spPr/>
-        <p:txBody>
-          <a:bodyPr/>
-          <a:lstStyle/>
-          <a:p>
-            <a:r>
-              <a:rPr lang="en-US" dirty="0"/>
-              <a:t>Training MSE</a:t>
-            </a:r>
-          </a:p>
-        </p:txBody>
-      </p:sp>
-      <p:sp>
-        <p:nvSpPr>
-          <p:cNvPr id="3" name="Content Placeholder 2">
-            <a:extLst>
-              <a:ext uri="{FF2B5EF4-FFF2-40B4-BE49-F238E27FC236}">
-                <a16:creationId xmlns:a16="http://schemas.microsoft.com/office/drawing/2014/main" id="{F464421A-7A2D-4371-92C2-9DAE6C9BE9A4}"/>
-              </a:ext>
-            </a:extLst>
-          </p:cNvPr>
-          <p:cNvSpPr>
-            <a:spLocks noGrp="1"/>
-          </p:cNvSpPr>
-          <p:nvPr>
-            <p:ph idx="1"/>
-          </p:nvPr>
-        </p:nvSpPr>
-        <p:spPr/>
-        <p:txBody>
-          <a:bodyPr/>
-          <a:lstStyle/>
-          <a:p>
-            <a:r>
-              <a:rPr lang="en-US" dirty="0"/>
-              <a:t>The MSE that is for computing the training data is referred as the training MSE</a:t>
-            </a:r>
-          </a:p>
-          <a:p>
-            <a:r>
-              <a:rPr lang="en-US" dirty="0"/>
-              <a:t>In general, we don’t really care how well the method works on the training data.</a:t>
-            </a:r>
-          </a:p>
-          <a:p>
-            <a:r>
-              <a:rPr lang="en-US" dirty="0"/>
-              <a:t>We are more interested in the accuracy of the predictions that we obtain </a:t>
-            </a:r>
-            <a:r>
-              <a:rPr lang="en-US"/>
-              <a:t>when w</a:t>
-            </a:r>
-            <a:r>
-              <a:rPr lang="en-US" dirty="0"/>
-              <a:t>e</a:t>
-            </a:r>
-            <a:r>
-              <a:rPr lang="en-US"/>
-              <a:t> </a:t>
-            </a:r>
-            <a:r>
-              <a:rPr lang="en-US" dirty="0"/>
-              <a:t>apply our method to previously unseen test data.</a:t>
-            </a:r>
-          </a:p>
-        </p:txBody>
-      </p:sp>
-    </p:spTree>
-    <p:extLst>
-      <p:ext uri="{BB962C8B-B14F-4D97-AF65-F5344CB8AC3E}">
-        <p14:creationId xmlns:p14="http://schemas.microsoft.com/office/powerpoint/2010/main" val="3758714531"/>
-      </p:ext>
-    </p:extLst>
-  </p:cSld>
-  <p:clrMapOvr>
-    <a:masterClrMapping/>
-  </p:clrMapOvr>
-</p:sld>
-</file>
-
 <file path=ppt/slides/slide3.xml><?xml version="1.0" encoding="utf-8"?>
 <p:sld xmlns:a="http://schemas.openxmlformats.org/drawingml/2006/main" xmlns:r="http://schemas.openxmlformats.org/officeDocument/2006/relationships" xmlns:p="http://schemas.openxmlformats.org/presentationml/2006/main">
   <p:cSld>
@@ -7352,6 +7956,120 @@
     <p:extLst>
       <p:ext uri="{BB962C8B-B14F-4D97-AF65-F5344CB8AC3E}">
         <p14:creationId xmlns:p14="http://schemas.microsoft.com/office/powerpoint/2010/main" val="3095474609"/>
+      </p:ext>
+    </p:extLst>
+  </p:cSld>
+  <p:clrMapOvr>
+    <a:masterClrMapping/>
+  </p:clrMapOvr>
+</p:sld>
+</file>
+
+<file path=ppt/slides/slide30.xml><?xml version="1.0" encoding="utf-8"?>
+<p:sld xmlns:a="http://schemas.openxmlformats.org/drawingml/2006/main" xmlns:r="http://schemas.openxmlformats.org/officeDocument/2006/relationships" xmlns:p="http://schemas.openxmlformats.org/presentationml/2006/main">
+  <p:cSld>
+    <p:spTree>
+      <p:nvGrpSpPr>
+        <p:cNvPr id="1" name=""/>
+        <p:cNvGrpSpPr/>
+        <p:nvPr/>
+      </p:nvGrpSpPr>
+      <p:grpSpPr>
+        <a:xfrm>
+          <a:off x="0" y="0"/>
+          <a:ext cx="0" cy="0"/>
+          <a:chOff x="0" y="0"/>
+          <a:chExt cx="0" cy="0"/>
+        </a:xfrm>
+      </p:grpSpPr>
+      <p:sp>
+        <p:nvSpPr>
+          <p:cNvPr id="2" name="Title 1">
+            <a:extLst>
+              <a:ext uri="{FF2B5EF4-FFF2-40B4-BE49-F238E27FC236}">
+                <a16:creationId xmlns:a16="http://schemas.microsoft.com/office/drawing/2014/main" id="{5C912DD6-4E85-4443-930D-9960E5DFBCEE}"/>
+              </a:ext>
+            </a:extLst>
+          </p:cNvPr>
+          <p:cNvSpPr>
+            <a:spLocks noGrp="1"/>
+          </p:cNvSpPr>
+          <p:nvPr>
+            <p:ph type="title"/>
+          </p:nvPr>
+        </p:nvSpPr>
+        <p:spPr/>
+        <p:txBody>
+          <a:bodyPr/>
+          <a:lstStyle/>
+          <a:p>
+            <a:r>
+              <a:rPr lang="en-US" dirty="0"/>
+              <a:t>Training MSE</a:t>
+            </a:r>
+          </a:p>
+        </p:txBody>
+      </p:sp>
+      <p:sp>
+        <p:nvSpPr>
+          <p:cNvPr id="3" name="Content Placeholder 2">
+            <a:extLst>
+              <a:ext uri="{FF2B5EF4-FFF2-40B4-BE49-F238E27FC236}">
+                <a16:creationId xmlns:a16="http://schemas.microsoft.com/office/drawing/2014/main" id="{F464421A-7A2D-4371-92C2-9DAE6C9BE9A4}"/>
+              </a:ext>
+            </a:extLst>
+          </p:cNvPr>
+          <p:cNvSpPr>
+            <a:spLocks noGrp="1"/>
+          </p:cNvSpPr>
+          <p:nvPr>
+            <p:ph idx="1"/>
+          </p:nvPr>
+        </p:nvSpPr>
+        <p:spPr/>
+        <p:txBody>
+          <a:bodyPr/>
+          <a:lstStyle/>
+          <a:p>
+            <a:r>
+              <a:rPr lang="en-US" dirty="0"/>
+              <a:t>The MSE that is for computing the training data is referred as the training MSE</a:t>
+            </a:r>
+          </a:p>
+          <a:p>
+            <a:r>
+              <a:rPr lang="en-US" dirty="0"/>
+              <a:t>In general, we don’t really care how well the method works on the training data.</a:t>
+            </a:r>
+          </a:p>
+          <a:p>
+            <a:r>
+              <a:rPr lang="en-US" dirty="0"/>
+              <a:t>We are more interested in the accuracy of the predictions that we obtain </a:t>
+            </a:r>
+            <a:r>
+              <a:rPr lang="en-US"/>
+              <a:t>when w</a:t>
+            </a:r>
+            <a:r>
+              <a:rPr lang="en-US" dirty="0"/>
+              <a:t>e</a:t>
+            </a:r>
+            <a:r>
+              <a:rPr lang="en-US"/>
+              <a:t> </a:t>
+            </a:r>
+            <a:r>
+              <a:rPr lang="en-US" dirty="0"/>
+              <a:t>apply our method to previously unseen test data.</a:t>
+            </a:r>
+          </a:p>
+        </p:txBody>
+      </p:sp>
+    </p:spTree>
+    <p:extLst>
+      <p:ext uri="{BB962C8B-B14F-4D97-AF65-F5344CB8AC3E}">
+        <p14:creationId xmlns:p14="http://schemas.microsoft.com/office/powerpoint/2010/main" val="3758714531"/>
       </p:ext>
     </p:extLst>
   </p:cSld>
@@ -7701,74 +8419,217 @@
           </a:p>
         </p:txBody>
       </p:sp>
-      <p:sp>
-        <p:nvSpPr>
-          <p:cNvPr id="3" name="Content Placeholder 2">
-            <a:extLst>
-              <a:ext uri="{FF2B5EF4-FFF2-40B4-BE49-F238E27FC236}">
-                <a16:creationId xmlns:a16="http://schemas.microsoft.com/office/drawing/2014/main" id="{BC444685-AFFA-4752-9019-F5B474499EB0}"/>
-              </a:ext>
-            </a:extLst>
-          </p:cNvPr>
-          <p:cNvSpPr>
-            <a:spLocks noGrp="1"/>
-          </p:cNvSpPr>
-          <p:nvPr>
-            <p:ph idx="1"/>
-          </p:nvPr>
-        </p:nvSpPr>
-        <p:spPr/>
-        <p:txBody>
-          <a:bodyPr>
-            <a:normAutofit lnSpcReduction="10000"/>
-          </a:bodyPr>
-          <a:lstStyle/>
-          <a:p>
-            <a:r>
-              <a:rPr lang="en-US" dirty="0"/>
-              <a:t>To illustrate Prediction, here is a general situation:</a:t>
-            </a:r>
-          </a:p>
-          <a:p>
-            <a:r>
-              <a:rPr lang="en-US" dirty="0"/>
-              <a:t>Many situations, a set of input X are available, but the output Y cannot be easily obtained.</a:t>
-            </a:r>
-          </a:p>
-          <a:p>
-            <a:r>
-              <a:rPr lang="en-US" dirty="0"/>
-              <a:t>In this setting, since the error term averages to zero, we can predict Y using: Ŷ = ^f (X)</a:t>
-            </a:r>
-          </a:p>
-          <a:p>
-            <a:r>
-              <a:rPr lang="en-US" dirty="0"/>
-              <a:t>^f represents the estimate for f.</a:t>
-            </a:r>
-          </a:p>
-          <a:p>
-            <a:r>
-              <a:rPr lang="en-US" dirty="0"/>
-              <a:t>Ŷ represents the resulting prediction for Y.</a:t>
-            </a:r>
-          </a:p>
-          <a:p>
-            <a:r>
-              <a:rPr lang="en-US" dirty="0"/>
-              <a:t>In this setting, ^f is often treated as a </a:t>
-            </a:r>
-            <a:r>
-              <a:rPr lang="en-US" i="1" dirty="0"/>
-              <a:t>black box</a:t>
-            </a:r>
-            <a:r>
-              <a:rPr lang="en-US" dirty="0"/>
-              <a:t>, in the sense that one is not typically concerned with the exact form of ^f, provided that it yields accurate predictions for Y.</a:t>
-            </a:r>
-          </a:p>
-        </p:txBody>
-      </p:sp>
+      <mc:AlternateContent xmlns:mc="http://schemas.openxmlformats.org/markup-compatibility/2006" xmlns:a14="http://schemas.microsoft.com/office/drawing/2010/main">
+        <mc:Choice Requires="a14">
+          <p:sp>
+            <p:nvSpPr>
+              <p:cNvPr id="3" name="Content Placeholder 2">
+                <a:extLst>
+                  <a:ext uri="{FF2B5EF4-FFF2-40B4-BE49-F238E27FC236}">
+                    <a16:creationId xmlns:a16="http://schemas.microsoft.com/office/drawing/2014/main" id="{BC444685-AFFA-4752-9019-F5B474499EB0}"/>
+                  </a:ext>
+                </a:extLst>
+              </p:cNvPr>
+              <p:cNvSpPr>
+                <a:spLocks noGrp="1"/>
+              </p:cNvSpPr>
+              <p:nvPr>
+                <p:ph idx="1"/>
+              </p:nvPr>
+            </p:nvSpPr>
+            <p:spPr/>
+            <p:txBody>
+              <a:bodyPr>
+                <a:normAutofit lnSpcReduction="10000"/>
+              </a:bodyPr>
+              <a:lstStyle/>
+              <a:p>
+                <a:r>
+                  <a:rPr lang="en-US" dirty="0"/>
+                  <a:t>To illustrate Prediction, here is a general situation:</a:t>
+                </a:r>
+              </a:p>
+              <a:p>
+                <a:r>
+                  <a:rPr lang="en-US" dirty="0"/>
+                  <a:t>Many situations, a set of input X are available, but the output Y cannot be easily obtained.</a:t>
+                </a:r>
+              </a:p>
+              <a:p>
+                <a:r>
+                  <a:rPr lang="en-US" dirty="0"/>
+                  <a:t>In this setting, since the error term averages to zero, we can predict Y using: Ŷ = </a:t>
+                </a:r>
+                <a14:m>
+                  <m:oMath xmlns:m="http://schemas.openxmlformats.org/officeDocument/2006/math">
+                    <m:acc>
+                      <m:accPr>
+                        <m:chr m:val="̂"/>
+                        <m:ctrlPr>
+                          <a:rPr lang="en-US" i="1" dirty="0" smtClean="0">
+                            <a:latin typeface="Cambria Math" panose="02040503050406030204" pitchFamily="18" charset="0"/>
+                          </a:rPr>
+                        </m:ctrlPr>
+                      </m:accPr>
+                      <m:e>
+                        <m:r>
+                          <a:rPr lang="en-US" b="0" i="1" dirty="0" smtClean="0">
+                            <a:latin typeface="Cambria Math" panose="02040503050406030204" pitchFamily="18" charset="0"/>
+                          </a:rPr>
+                          <m:t>𝑓</m:t>
+                        </m:r>
+                      </m:e>
+                    </m:acc>
+                  </m:oMath>
+                </a14:m>
+                <a:r>
+                  <a:rPr lang="en-US" dirty="0"/>
+                  <a:t> (X)</a:t>
+                </a:r>
+              </a:p>
+              <a:p>
+                <a14:m>
+                  <m:oMath xmlns:m="http://schemas.openxmlformats.org/officeDocument/2006/math">
+                    <m:acc>
+                      <m:accPr>
+                        <m:chr m:val="̂"/>
+                        <m:ctrlPr>
+                          <a:rPr lang="en-US" i="1" smtClean="0">
+                            <a:latin typeface="Cambria Math" panose="02040503050406030204" pitchFamily="18" charset="0"/>
+                          </a:rPr>
+                        </m:ctrlPr>
+                      </m:accPr>
+                      <m:e>
+                        <m:r>
+                          <a:rPr lang="en-US" b="0" i="1" smtClean="0">
+                            <a:latin typeface="Cambria Math" panose="02040503050406030204" pitchFamily="18" charset="0"/>
+                          </a:rPr>
+                          <m:t>𝑓</m:t>
+                        </m:r>
+                      </m:e>
+                    </m:acc>
+                  </m:oMath>
+                </a14:m>
+                <a:r>
+                  <a:rPr lang="en-US" dirty="0"/>
+                  <a:t> represents the estimate for f.</a:t>
+                </a:r>
+              </a:p>
+              <a:p>
+                <a:r>
+                  <a:rPr lang="en-US" dirty="0"/>
+                  <a:t>Ŷ represents the resulting prediction for Y.</a:t>
+                </a:r>
+              </a:p>
+              <a:p>
+                <a:r>
+                  <a:rPr lang="en-US" dirty="0"/>
+                  <a:t>In this setting, </a:t>
+                </a:r>
+                <a14:m>
+                  <m:oMath xmlns:m="http://schemas.openxmlformats.org/officeDocument/2006/math">
+                    <m:acc>
+                      <m:accPr>
+                        <m:chr m:val="̂"/>
+                        <m:ctrlPr>
+                          <a:rPr lang="en-US" i="1">
+                            <a:latin typeface="Cambria Math" panose="02040503050406030204" pitchFamily="18" charset="0"/>
+                          </a:rPr>
+                        </m:ctrlPr>
+                      </m:accPr>
+                      <m:e>
+                        <m:r>
+                          <a:rPr lang="en-US" i="1">
+                            <a:latin typeface="Cambria Math" panose="02040503050406030204" pitchFamily="18" charset="0"/>
+                          </a:rPr>
+                          <m:t>𝑓</m:t>
+                        </m:r>
+                      </m:e>
+                    </m:acc>
+                  </m:oMath>
+                </a14:m>
+                <a:r>
+                  <a:rPr lang="en-US" dirty="0"/>
+                  <a:t> is often treated as a </a:t>
+                </a:r>
+                <a:r>
+                  <a:rPr lang="en-US" i="1" dirty="0"/>
+                  <a:t>black box</a:t>
+                </a:r>
+                <a:r>
+                  <a:rPr lang="en-US" dirty="0"/>
+                  <a:t>, in the sense that one is not typically concerned with the exact form of </a:t>
+                </a:r>
+                <a14:m>
+                  <m:oMath xmlns:m="http://schemas.openxmlformats.org/officeDocument/2006/math">
+                    <m:acc>
+                      <m:accPr>
+                        <m:chr m:val="̂"/>
+                        <m:ctrlPr>
+                          <a:rPr lang="en-US" i="1">
+                            <a:latin typeface="Cambria Math" panose="02040503050406030204" pitchFamily="18" charset="0"/>
+                          </a:rPr>
+                        </m:ctrlPr>
+                      </m:accPr>
+                      <m:e>
+                        <m:r>
+                          <a:rPr lang="en-US" i="1">
+                            <a:latin typeface="Cambria Math" panose="02040503050406030204" pitchFamily="18" charset="0"/>
+                          </a:rPr>
+                          <m:t>𝑓</m:t>
+                        </m:r>
+                      </m:e>
+                    </m:acc>
+                  </m:oMath>
+                </a14:m>
+                <a:r>
+                  <a:rPr lang="en-US" dirty="0"/>
+                  <a:t> , provided that it yields accurate predictions for Y.</a:t>
+                </a:r>
+              </a:p>
+            </p:txBody>
+          </p:sp>
+        </mc:Choice>
+        <mc:Fallback xmlns="">
+          <p:sp>
+            <p:nvSpPr>
+              <p:cNvPr id="3" name="Content Placeholder 2">
+                <a:extLst>
+                  <a:ext uri="{FF2B5EF4-FFF2-40B4-BE49-F238E27FC236}">
+                    <a16:creationId xmlns:a16="http://schemas.microsoft.com/office/drawing/2014/main" id="{BC444685-AFFA-4752-9019-F5B474499EB0}"/>
+                  </a:ext>
+                </a:extLst>
+              </p:cNvPr>
+              <p:cNvSpPr>
+                <a:spLocks noGrp="1" noRot="1" noChangeAspect="1" noMove="1" noResize="1" noEditPoints="1" noAdjustHandles="1" noChangeArrowheads="1" noChangeShapeType="1" noTextEdit="1"/>
+              </p:cNvSpPr>
+              <p:nvPr>
+                <p:ph idx="1"/>
+              </p:nvPr>
+            </p:nvSpPr>
+            <p:spPr>
+              <a:blipFill>
+                <a:blip r:embed="rId2"/>
+                <a:stretch>
+                  <a:fillRect l="-1043" t="-3081" r="-638" b="-1120"/>
+                </a:stretch>
+              </a:blipFill>
+            </p:spPr>
+            <p:txBody>
+              <a:bodyPr/>
+              <a:lstStyle/>
+              <a:p>
+                <a:r>
+                  <a:rPr lang="en-US">
+                    <a:noFill/>
+                  </a:rPr>
+                  <a:t> </a:t>
+                </a:r>
+              </a:p>
+            </p:txBody>
+          </p:sp>
+        </mc:Fallback>
+      </mc:AlternateContent>
     </p:spTree>
     <p:extLst>
       <p:ext uri="{BB962C8B-B14F-4D97-AF65-F5344CB8AC3E}">
@@ -7799,71 +8660,196 @@
           <a:chExt cx="0" cy="0"/>
         </a:xfrm>
       </p:grpSpPr>
-      <p:sp>
-        <p:nvSpPr>
-          <p:cNvPr id="3" name="Content Placeholder 2">
-            <a:extLst>
-              <a:ext uri="{FF2B5EF4-FFF2-40B4-BE49-F238E27FC236}">
-                <a16:creationId xmlns:a16="http://schemas.microsoft.com/office/drawing/2014/main" id="{36CE8F49-9E81-4E71-A6F2-5079AD55DDD9}"/>
-              </a:ext>
-            </a:extLst>
-          </p:cNvPr>
-          <p:cNvSpPr>
-            <a:spLocks noGrp="1"/>
-          </p:cNvSpPr>
-          <p:nvPr>
-            <p:ph idx="1"/>
-          </p:nvPr>
-        </p:nvSpPr>
-        <p:spPr>
-          <a:xfrm>
-            <a:off x="838200" y="1664043"/>
-            <a:ext cx="10515600" cy="5789785"/>
-          </a:xfrm>
-        </p:spPr>
-        <p:txBody>
-          <a:bodyPr/>
-          <a:lstStyle/>
-          <a:p>
-            <a:r>
-              <a:rPr lang="en-US" dirty="0"/>
-              <a:t>The accuracy of Ŷ as a prediction for Y depends on two quantities, which is call the reducible error and irreducible error</a:t>
-            </a:r>
-          </a:p>
-          <a:p>
-            <a:r>
-              <a:rPr lang="en-US" dirty="0"/>
-              <a:t>In general ^f will not be a perfect estimation for f, and this inaccuracy will introduce some error.</a:t>
-            </a:r>
-          </a:p>
-          <a:p>
-            <a:r>
-              <a:rPr lang="en-US" dirty="0"/>
-              <a:t>The above error is reducible  because we can potentially improve the accuracy of ^f by using the most appropriate statistical learning technique to estimate f.</a:t>
-            </a:r>
-          </a:p>
-          <a:p>
-            <a:r>
-              <a:rPr lang="en-US" dirty="0"/>
-              <a:t>If we cannot reduce the error introduced by </a:t>
-            </a:r>
-            <a:r>
-              <a:rPr lang="el-GR" dirty="0"/>
-              <a:t>ϵ</a:t>
-            </a:r>
-            <a:r>
-              <a:rPr lang="en-US" dirty="0"/>
-              <a:t>, then no matter how well the estimation of ^f is, there is still a irreducible error.</a:t>
-            </a:r>
-          </a:p>
-          <a:p>
-            <a:endParaRPr lang="en-US" dirty="0"/>
-          </a:p>
-          <a:p>
-            <a:endParaRPr lang="en-US" dirty="0"/>
-          </a:p>
-        </p:txBody>
-      </p:sp>
+      <mc:AlternateContent xmlns:mc="http://schemas.openxmlformats.org/markup-compatibility/2006" xmlns:a14="http://schemas.microsoft.com/office/drawing/2010/main">
+        <mc:Choice Requires="a14">
+          <p:sp>
+            <p:nvSpPr>
+              <p:cNvPr id="3" name="Content Placeholder 2">
+                <a:extLst>
+                  <a:ext uri="{FF2B5EF4-FFF2-40B4-BE49-F238E27FC236}">
+                    <a16:creationId xmlns:a16="http://schemas.microsoft.com/office/drawing/2014/main" id="{36CE8F49-9E81-4E71-A6F2-5079AD55DDD9}"/>
+                  </a:ext>
+                </a:extLst>
+              </p:cNvPr>
+              <p:cNvSpPr>
+                <a:spLocks noGrp="1"/>
+              </p:cNvSpPr>
+              <p:nvPr>
+                <p:ph idx="1"/>
+              </p:nvPr>
+            </p:nvSpPr>
+            <p:spPr>
+              <a:xfrm>
+                <a:off x="838200" y="1664043"/>
+                <a:ext cx="10515600" cy="5789785"/>
+              </a:xfrm>
+            </p:spPr>
+            <p:txBody>
+              <a:bodyPr/>
+              <a:lstStyle/>
+              <a:p>
+                <a:r>
+                  <a:rPr lang="en-US" dirty="0"/>
+                  <a:t>The accuracy of Ŷ as a prediction for Y depends on two quantities, which is call the reducible error and irreducible error</a:t>
+                </a:r>
+              </a:p>
+              <a:p>
+                <a:r>
+                  <a:rPr lang="en-US" dirty="0"/>
+                  <a:t>In general </a:t>
+                </a:r>
+                <a14:m>
+                  <m:oMath xmlns:m="http://schemas.openxmlformats.org/officeDocument/2006/math">
+                    <m:acc>
+                      <m:accPr>
+                        <m:chr m:val="̂"/>
+                        <m:ctrlPr>
+                          <a:rPr lang="en-US" i="1">
+                            <a:latin typeface="Cambria Math" panose="02040503050406030204" pitchFamily="18" charset="0"/>
+                          </a:rPr>
+                        </m:ctrlPr>
+                      </m:accPr>
+                      <m:e>
+                        <m:r>
+                          <a:rPr lang="en-US" i="1">
+                            <a:latin typeface="Cambria Math" panose="02040503050406030204" pitchFamily="18" charset="0"/>
+                          </a:rPr>
+                          <m:t>𝑓</m:t>
+                        </m:r>
+                      </m:e>
+                    </m:acc>
+                  </m:oMath>
+                </a14:m>
+                <a:r>
+                  <a:rPr lang="en-US" dirty="0"/>
+                  <a:t> will not be a perfect estimation for f, and this inaccuracy will introduce some error.</a:t>
+                </a:r>
+              </a:p>
+              <a:p>
+                <a:r>
+                  <a:rPr lang="en-US" dirty="0"/>
+                  <a:t>The above error is reducible  because we can potentially improve the accuracy of </a:t>
+                </a:r>
+                <a14:m>
+                  <m:oMath xmlns:m="http://schemas.openxmlformats.org/officeDocument/2006/math">
+                    <m:acc>
+                      <m:accPr>
+                        <m:chr m:val="̂"/>
+                        <m:ctrlPr>
+                          <a:rPr lang="en-US" i="1">
+                            <a:latin typeface="Cambria Math" panose="02040503050406030204" pitchFamily="18" charset="0"/>
+                          </a:rPr>
+                        </m:ctrlPr>
+                      </m:accPr>
+                      <m:e>
+                        <m:r>
+                          <a:rPr lang="en-US" i="1">
+                            <a:latin typeface="Cambria Math" panose="02040503050406030204" pitchFamily="18" charset="0"/>
+                          </a:rPr>
+                          <m:t>𝑓</m:t>
+                        </m:r>
+                      </m:e>
+                    </m:acc>
+                  </m:oMath>
+                </a14:m>
+                <a:r>
+                  <a:rPr lang="en-US" dirty="0"/>
+                  <a:t> by using the most appropriate statistical learning technique to estimate f.</a:t>
+                </a:r>
+              </a:p>
+              <a:p>
+                <a:r>
+                  <a:rPr lang="en-US" dirty="0"/>
+                  <a:t>If we cannot reduce the error introduced by </a:t>
+                </a:r>
+                <a:r>
+                  <a:rPr lang="el-GR" dirty="0"/>
+                  <a:t>ϵ</a:t>
+                </a:r>
+                <a:r>
+                  <a:rPr lang="en-US" dirty="0"/>
+                  <a:t>, then no matter how well the estimation of </a:t>
+                </a:r>
+                <a14:m>
+                  <m:oMath xmlns:m="http://schemas.openxmlformats.org/officeDocument/2006/math">
+                    <m:acc>
+                      <m:accPr>
+                        <m:chr m:val="̂"/>
+                        <m:ctrlPr>
+                          <a:rPr lang="en-US" i="1">
+                            <a:latin typeface="Cambria Math" panose="02040503050406030204" pitchFamily="18" charset="0"/>
+                          </a:rPr>
+                        </m:ctrlPr>
+                      </m:accPr>
+                      <m:e>
+                        <m:r>
+                          <a:rPr lang="en-US" i="1">
+                            <a:latin typeface="Cambria Math" panose="02040503050406030204" pitchFamily="18" charset="0"/>
+                          </a:rPr>
+                          <m:t>𝑓</m:t>
+                        </m:r>
+                      </m:e>
+                    </m:acc>
+                  </m:oMath>
+                </a14:m>
+                <a:r>
+                  <a:rPr lang="en-US" dirty="0"/>
+                  <a:t> is, there is still a irreducible error.</a:t>
+                </a:r>
+              </a:p>
+              <a:p>
+                <a:endParaRPr lang="en-US" dirty="0"/>
+              </a:p>
+              <a:p>
+                <a:endParaRPr lang="en-US" dirty="0"/>
+              </a:p>
+            </p:txBody>
+          </p:sp>
+        </mc:Choice>
+        <mc:Fallback xmlns="">
+          <p:sp>
+            <p:nvSpPr>
+              <p:cNvPr id="3" name="Content Placeholder 2">
+                <a:extLst>
+                  <a:ext uri="{FF2B5EF4-FFF2-40B4-BE49-F238E27FC236}">
+                    <a16:creationId xmlns:a16="http://schemas.microsoft.com/office/drawing/2014/main" id="{36CE8F49-9E81-4E71-A6F2-5079AD55DDD9}"/>
+                  </a:ext>
+                </a:extLst>
+              </p:cNvPr>
+              <p:cNvSpPr>
+                <a:spLocks noGrp="1" noRot="1" noChangeAspect="1" noMove="1" noResize="1" noEditPoints="1" noAdjustHandles="1" noChangeArrowheads="1" noChangeShapeType="1" noTextEdit="1"/>
+              </p:cNvSpPr>
+              <p:nvPr>
+                <p:ph idx="1"/>
+              </p:nvPr>
+            </p:nvSpPr>
+            <p:spPr>
+              <a:xfrm>
+                <a:off x="838200" y="1664043"/>
+                <a:ext cx="10515600" cy="5789785"/>
+              </a:xfrm>
+              <a:blipFill>
+                <a:blip r:embed="rId2"/>
+                <a:stretch>
+                  <a:fillRect l="-1043" t="-1789" r="-290"/>
+                </a:stretch>
+              </a:blipFill>
+            </p:spPr>
+            <p:txBody>
+              <a:bodyPr/>
+              <a:lstStyle/>
+              <a:p>
+                <a:r>
+                  <a:rPr lang="en-US">
+                    <a:noFill/>
+                  </a:rPr>
+                  <a:t> </a:t>
+                </a:r>
+              </a:p>
+            </p:txBody>
+          </p:sp>
+        </mc:Fallback>
+      </mc:AlternateContent>
     </p:spTree>
     <p:extLst>
       <p:ext uri="{BB962C8B-B14F-4D97-AF65-F5344CB8AC3E}">
@@ -7922,97 +8908,172 @@
           </a:p>
         </p:txBody>
       </p:sp>
-      <p:sp>
-        <p:nvSpPr>
-          <p:cNvPr id="3" name="Content Placeholder 2">
-            <a:extLst>
-              <a:ext uri="{FF2B5EF4-FFF2-40B4-BE49-F238E27FC236}">
-                <a16:creationId xmlns:a16="http://schemas.microsoft.com/office/drawing/2014/main" id="{4F7F324D-4620-4671-87C0-B9990B693C9D}"/>
-              </a:ext>
-            </a:extLst>
-          </p:cNvPr>
-          <p:cNvSpPr>
-            <a:spLocks noGrp="1"/>
-          </p:cNvSpPr>
-          <p:nvPr>
-            <p:ph idx="1"/>
-          </p:nvPr>
-        </p:nvSpPr>
-        <p:spPr/>
-        <p:txBody>
-          <a:bodyPr/>
-          <a:lstStyle/>
-          <a:p>
-            <a:r>
-              <a:rPr lang="en-US" dirty="0"/>
-              <a:t>Consider a given estimate ^f and a set of predictor X, which yields the prediction Ŷ = ^f (X).\</a:t>
-            </a:r>
-          </a:p>
-          <a:p>
-            <a:r>
-              <a:rPr lang="en-US" dirty="0"/>
-              <a:t>(Assume for a moment that both ^f and X are fixed.)</a:t>
-            </a:r>
-          </a:p>
-          <a:p>
-            <a:r>
-              <a:rPr lang="en-US" dirty="0"/>
-              <a:t>It would be easy to show error:</a:t>
-            </a:r>
-          </a:p>
-          <a:p>
-            <a:r>
-              <a:rPr lang="en-US" dirty="0"/>
-              <a:t>E(Y – Ŷ)^2 represents the average,</a:t>
-            </a:r>
-          </a:p>
-          <a:p>
-            <a:pPr marL="0" indent="0">
-              <a:buNone/>
-            </a:pPr>
-            <a:r>
-              <a:rPr lang="en-US" dirty="0"/>
-              <a:t>   or </a:t>
-            </a:r>
-            <a:r>
-              <a:rPr lang="en-US" i="1" dirty="0"/>
-              <a:t>expected value</a:t>
-            </a:r>
-            <a:r>
-              <a:rPr lang="en-US" dirty="0"/>
-              <a:t>, of the squared</a:t>
-            </a:r>
-          </a:p>
-          <a:p>
-            <a:pPr marL="0" indent="0">
-              <a:buNone/>
-            </a:pPr>
-            <a:r>
-              <a:rPr lang="en-US" dirty="0"/>
-              <a:t>   difference between the predicted and actual value of Y, and Var(</a:t>
-            </a:r>
-            <a:r>
-              <a:rPr lang="el-GR" dirty="0"/>
-              <a:t>ϵ</a:t>
-            </a:r>
-            <a:r>
-              <a:rPr lang="en-US" dirty="0"/>
-              <a:t>)  	represents the variance associated with the error term </a:t>
-            </a:r>
-            <a:r>
-              <a:rPr lang="el-GR" dirty="0"/>
-              <a:t>ϵ</a:t>
-            </a:r>
-            <a:r>
-              <a:rPr lang="en-US" dirty="0"/>
-              <a:t>.</a:t>
-            </a:r>
-          </a:p>
-          <a:p>
-            <a:endParaRPr lang="en-US" dirty="0"/>
-          </a:p>
-        </p:txBody>
-      </p:sp>
+      <mc:AlternateContent xmlns:mc="http://schemas.openxmlformats.org/markup-compatibility/2006">
+        <mc:Choice xmlns:a14="http://schemas.microsoft.com/office/drawing/2010/main" Requires="a14">
+          <p:sp>
+            <p:nvSpPr>
+              <p:cNvPr id="3" name="Content Placeholder 2">
+                <a:extLst>
+                  <a:ext uri="{FF2B5EF4-FFF2-40B4-BE49-F238E27FC236}">
+                    <a16:creationId xmlns:a16="http://schemas.microsoft.com/office/drawing/2014/main" id="{4F7F324D-4620-4671-87C0-B9990B693C9D}"/>
+                  </a:ext>
+                </a:extLst>
+              </p:cNvPr>
+              <p:cNvSpPr>
+                <a:spLocks noGrp="1"/>
+              </p:cNvSpPr>
+              <p:nvPr>
+                <p:ph idx="1"/>
+              </p:nvPr>
+            </p:nvSpPr>
+            <p:spPr/>
+            <p:txBody>
+              <a:bodyPr/>
+              <a:lstStyle/>
+              <a:p>
+                <a:r>
+                  <a:rPr lang="en-US" dirty="0"/>
+                  <a:t>Consider a given estimate ^f and a set of predictor X, which yields the prediction Ŷ = </a:t>
+                </a:r>
+                <a14:m>
+                  <m:oMath xmlns:m="http://schemas.openxmlformats.org/officeDocument/2006/math">
+                    <m:acc>
+                      <m:accPr>
+                        <m:chr m:val="̂"/>
+                        <m:ctrlPr>
+                          <a:rPr lang="en-US" i="1">
+                            <a:latin typeface="Cambria Math" panose="02040503050406030204" pitchFamily="18" charset="0"/>
+                          </a:rPr>
+                        </m:ctrlPr>
+                      </m:accPr>
+                      <m:e>
+                        <m:r>
+                          <a:rPr lang="en-US" i="1">
+                            <a:latin typeface="Cambria Math" panose="02040503050406030204" pitchFamily="18" charset="0"/>
+                          </a:rPr>
+                          <m:t>𝑓</m:t>
+                        </m:r>
+                      </m:e>
+                    </m:acc>
+                  </m:oMath>
+                </a14:m>
+                <a:r>
+                  <a:rPr lang="en-US" dirty="0"/>
+                  <a:t> (X).</a:t>
+                </a:r>
+              </a:p>
+              <a:p>
+                <a:r>
+                  <a:rPr lang="en-US" dirty="0"/>
+                  <a:t>(Assume for a moment that both ^f and X are fixed.)</a:t>
+                </a:r>
+              </a:p>
+              <a:p>
+                <a:r>
+                  <a:rPr lang="en-US" dirty="0"/>
+                  <a:t>It would be easy to show error:</a:t>
+                </a:r>
+              </a:p>
+              <a:p>
+                <a:r>
+                  <a:rPr lang="en-US" dirty="0"/>
+                  <a:t>E(Y – Ŷ)^2 represents the average,</a:t>
+                </a:r>
+              </a:p>
+              <a:p>
+                <a:pPr marL="0" indent="0">
+                  <a:buNone/>
+                </a:pPr>
+                <a:r>
+                  <a:rPr lang="en-US" dirty="0"/>
+                  <a:t>   or </a:t>
+                </a:r>
+                <a:r>
+                  <a:rPr lang="en-US" i="1" dirty="0"/>
+                  <a:t>expected value</a:t>
+                </a:r>
+                <a:r>
+                  <a:rPr lang="en-US" dirty="0"/>
+                  <a:t>, of the squared</a:t>
+                </a:r>
+              </a:p>
+              <a:p>
+                <a:pPr marL="0" indent="0">
+                  <a:buNone/>
+                </a:pPr>
+                <a:r>
+                  <a:rPr lang="en-US" dirty="0"/>
+                  <a:t>   difference between the predicted and actual value of Y</a:t>
+                </a:r>
+              </a:p>
+              <a:p>
+                <a:r>
+                  <a:rPr lang="en-US" dirty="0"/>
+                  <a:t>Var(</a:t>
+                </a:r>
+                <a:r>
+                  <a:rPr lang="el-GR" dirty="0"/>
+                  <a:t>ϵ</a:t>
+                </a:r>
+                <a:r>
+                  <a:rPr lang="en-US" dirty="0"/>
+                  <a:t>) represents the variance associated with the error term </a:t>
+                </a:r>
+                <a:r>
+                  <a:rPr lang="el-GR" dirty="0"/>
+                  <a:t>ϵ</a:t>
+                </a:r>
+                <a:r>
+                  <a:rPr lang="en-US" dirty="0"/>
+                  <a:t>.</a:t>
+                </a:r>
+              </a:p>
+              <a:p>
+                <a:endParaRPr lang="en-US" dirty="0"/>
+              </a:p>
+            </p:txBody>
+          </p:sp>
+        </mc:Choice>
+        <mc:Fallback>
+          <p:sp>
+            <p:nvSpPr>
+              <p:cNvPr id="3" name="Content Placeholder 2">
+                <a:extLst>
+                  <a:ext uri="{FF2B5EF4-FFF2-40B4-BE49-F238E27FC236}">
+                    <a16:creationId xmlns:a16="http://schemas.microsoft.com/office/drawing/2014/main" id="{4F7F324D-4620-4671-87C0-B9990B693C9D}"/>
+                  </a:ext>
+                </a:extLst>
+              </p:cNvPr>
+              <p:cNvSpPr>
+                <a:spLocks noGrp="1" noRot="1" noChangeAspect="1" noMove="1" noResize="1" noEditPoints="1" noAdjustHandles="1" noChangeArrowheads="1" noChangeShapeType="1" noTextEdit="1"/>
+              </p:cNvSpPr>
+              <p:nvPr>
+                <p:ph idx="1"/>
+              </p:nvPr>
+            </p:nvSpPr>
+            <p:spPr>
+              <a:blipFill>
+                <a:blip r:embed="rId2"/>
+                <a:stretch>
+                  <a:fillRect l="-1043" t="-2241" r="-1101"/>
+                </a:stretch>
+              </a:blipFill>
+            </p:spPr>
+            <p:txBody>
+              <a:bodyPr/>
+              <a:lstStyle/>
+              <a:p>
+                <a:r>
+                  <a:rPr lang="en-US">
+                    <a:noFill/>
+                  </a:rPr>
+                  <a:t> </a:t>
+                </a:r>
+              </a:p>
+            </p:txBody>
+          </p:sp>
+        </mc:Fallback>
+      </mc:AlternateContent>
       <p:pic>
         <p:nvPicPr>
           <p:cNvPr id="5" name="Picture 4" descr="A picture containing clock&#10;&#10;Description automatically generated">
@@ -8028,7 +9089,7 @@
           <p:nvPr/>
         </p:nvPicPr>
         <p:blipFill>
-          <a:blip r:embed="rId2">
+          <a:blip r:embed="rId3">
             <a:extLst>
               <a:ext uri="{28A0092B-C50C-407E-A947-70E740481C1C}">
                 <a14:useLocalDpi xmlns:a14="http://schemas.microsoft.com/office/drawing/2010/main" val="0"/>
@@ -8107,48 +9168,117 @@
           </a:p>
         </p:txBody>
       </p:sp>
-      <p:sp>
-        <p:nvSpPr>
-          <p:cNvPr id="3" name="Content Placeholder 2">
-            <a:extLst>
-              <a:ext uri="{FF2B5EF4-FFF2-40B4-BE49-F238E27FC236}">
-                <a16:creationId xmlns:a16="http://schemas.microsoft.com/office/drawing/2014/main" id="{C2B20E4E-6B9E-48A7-A4F7-C27A14895FCF}"/>
-              </a:ext>
-            </a:extLst>
-          </p:cNvPr>
-          <p:cNvSpPr>
-            <a:spLocks noGrp="1"/>
-          </p:cNvSpPr>
-          <p:nvPr>
-            <p:ph idx="1"/>
-          </p:nvPr>
-        </p:nvSpPr>
-        <p:spPr/>
-        <p:txBody>
-          <a:bodyPr/>
-          <a:lstStyle/>
-          <a:p>
-            <a:r>
-              <a:rPr lang="en-US" dirty="0"/>
-              <a:t>In situation that we wish to estimate </a:t>
-            </a:r>
-            <a:r>
-              <a:rPr lang="en-US" i="1" dirty="0"/>
-              <a:t>f</a:t>
-            </a:r>
-            <a:r>
-              <a:rPr lang="en-US" dirty="0"/>
-              <a:t>, but not necessarily to make predictions for Y. Instead, to understand the relationship between X and Y</a:t>
-            </a:r>
-          </a:p>
-          <a:p>
-            <a:r>
-              <a:rPr lang="en-US" dirty="0"/>
-              <a:t>Therefore, now ^f cannot be treated as a black box because we need to know its exact form.</a:t>
-            </a:r>
-          </a:p>
-        </p:txBody>
-      </p:sp>
+      <mc:AlternateContent xmlns:mc="http://schemas.openxmlformats.org/markup-compatibility/2006">
+        <mc:Choice xmlns:a14="http://schemas.microsoft.com/office/drawing/2010/main" Requires="a14">
+          <p:sp>
+            <p:nvSpPr>
+              <p:cNvPr id="3" name="Content Placeholder 2">
+                <a:extLst>
+                  <a:ext uri="{FF2B5EF4-FFF2-40B4-BE49-F238E27FC236}">
+                    <a16:creationId xmlns:a16="http://schemas.microsoft.com/office/drawing/2014/main" id="{C2B20E4E-6B9E-48A7-A4F7-C27A14895FCF}"/>
+                  </a:ext>
+                </a:extLst>
+              </p:cNvPr>
+              <p:cNvSpPr>
+                <a:spLocks noGrp="1"/>
+              </p:cNvSpPr>
+              <p:nvPr>
+                <p:ph idx="1"/>
+              </p:nvPr>
+            </p:nvSpPr>
+            <p:spPr/>
+            <p:txBody>
+              <a:bodyPr/>
+              <a:lstStyle/>
+              <a:p>
+                <a:r>
+                  <a:rPr lang="en-US" dirty="0"/>
+                  <a:t>Estimating </a:t>
+                </a:r>
+                <a:r>
+                  <a:rPr lang="en-US" i="1" dirty="0"/>
+                  <a:t>f</a:t>
+                </a:r>
+                <a:r>
+                  <a:rPr lang="en-US" dirty="0"/>
+                  <a:t>, but not necessarily to make predictions for Y. Instead, to understand the relationship between X and Y.</a:t>
+                </a:r>
+              </a:p>
+              <a:p>
+                <a:r>
+                  <a:rPr lang="en-US" dirty="0"/>
+                  <a:t>Therefore, now </a:t>
+                </a:r>
+                <a14:m>
+                  <m:oMath xmlns:m="http://schemas.openxmlformats.org/officeDocument/2006/math">
+                    <m:acc>
+                      <m:accPr>
+                        <m:chr m:val="̂"/>
+                        <m:ctrlPr>
+                          <a:rPr lang="en-US" i="1">
+                            <a:latin typeface="Cambria Math" panose="02040503050406030204" pitchFamily="18" charset="0"/>
+                          </a:rPr>
+                        </m:ctrlPr>
+                      </m:accPr>
+                      <m:e>
+                        <m:r>
+                          <a:rPr lang="en-US" i="1">
+                            <a:latin typeface="Cambria Math" panose="02040503050406030204" pitchFamily="18" charset="0"/>
+                          </a:rPr>
+                          <m:t>𝑓</m:t>
+                        </m:r>
+                      </m:e>
+                    </m:acc>
+                  </m:oMath>
+                </a14:m>
+                <a:r>
+                  <a:rPr lang="en-US" dirty="0"/>
+                  <a:t> cannot be treated as a black box because we need to know its exact form.</a:t>
+                </a:r>
+              </a:p>
+            </p:txBody>
+          </p:sp>
+        </mc:Choice>
+        <mc:Fallback>
+          <p:sp>
+            <p:nvSpPr>
+              <p:cNvPr id="3" name="Content Placeholder 2">
+                <a:extLst>
+                  <a:ext uri="{FF2B5EF4-FFF2-40B4-BE49-F238E27FC236}">
+                    <a16:creationId xmlns:a16="http://schemas.microsoft.com/office/drawing/2014/main" id="{C2B20E4E-6B9E-48A7-A4F7-C27A14895FCF}"/>
+                  </a:ext>
+                </a:extLst>
+              </p:cNvPr>
+              <p:cNvSpPr>
+                <a:spLocks noGrp="1" noRot="1" noChangeAspect="1" noMove="1" noResize="1" noEditPoints="1" noAdjustHandles="1" noChangeArrowheads="1" noChangeShapeType="1" noTextEdit="1"/>
+              </p:cNvSpPr>
+              <p:nvPr>
+                <p:ph idx="1"/>
+              </p:nvPr>
+            </p:nvSpPr>
+            <p:spPr>
+              <a:blipFill>
+                <a:blip r:embed="rId2"/>
+                <a:stretch>
+                  <a:fillRect l="-1043" t="-2241" r="-580"/>
+                </a:stretch>
+              </a:blipFill>
+            </p:spPr>
+            <p:txBody>
+              <a:bodyPr/>
+              <a:lstStyle/>
+              <a:p>
+                <a:r>
+                  <a:rPr lang="en-US">
+                    <a:noFill/>
+                  </a:rPr>
+                  <a:t> </a:t>
+                </a:r>
+              </a:p>
+            </p:txBody>
+          </p:sp>
+        </mc:Fallback>
+      </mc:AlternateContent>
     </p:spTree>
     <p:extLst>
       <p:ext uri="{BB962C8B-B14F-4D97-AF65-F5344CB8AC3E}">

</xml_diff>

<commit_message>
Chapter 2 Version 3
</commit_message>
<xml_diff>
--- a/Presentation Materials/Chapter 2/Chapter 2 Presentation.pptx
+++ b/Presentation Materials/Chapter 2/Chapter 2 Presentation.pptx
@@ -4,6 +4,9 @@
   <p:sldMasterIdLst>
     <p:sldMasterId id="2147483648" r:id="rId1"/>
   </p:sldMasterIdLst>
+  <p:notesMasterIdLst>
+    <p:notesMasterId r:id="rId32"/>
+  </p:notesMasterIdLst>
   <p:sldIdLst>
     <p:sldId id="256" r:id="rId2"/>
     <p:sldId id="258" r:id="rId3"/>
@@ -402,6 +405,355 @@
 </p:cmLst>
 </file>
 
+<file path=ppt/notesMasters/notesMaster1.xml><?xml version="1.0" encoding="utf-8"?>
+<p:notesMaster xmlns:a="http://schemas.openxmlformats.org/drawingml/2006/main" xmlns:r="http://schemas.openxmlformats.org/officeDocument/2006/relationships" xmlns:p="http://schemas.openxmlformats.org/presentationml/2006/main">
+  <p:cSld>
+    <p:bg>
+      <p:bgRef idx="1001">
+        <a:schemeClr val="bg1"/>
+      </p:bgRef>
+    </p:bg>
+    <p:spTree>
+      <p:nvGrpSpPr>
+        <p:cNvPr id="1" name=""/>
+        <p:cNvGrpSpPr/>
+        <p:nvPr/>
+      </p:nvGrpSpPr>
+      <p:grpSpPr>
+        <a:xfrm>
+          <a:off x="0" y="0"/>
+          <a:ext cx="0" cy="0"/>
+          <a:chOff x="0" y="0"/>
+          <a:chExt cx="0" cy="0"/>
+        </a:xfrm>
+      </p:grpSpPr>
+      <p:sp>
+        <p:nvSpPr>
+          <p:cNvPr id="2" name="Header Placeholder 1"/>
+          <p:cNvSpPr>
+            <a:spLocks noGrp="1"/>
+          </p:cNvSpPr>
+          <p:nvPr>
+            <p:ph type="hdr" sz="quarter"/>
+          </p:nvPr>
+        </p:nvSpPr>
+        <p:spPr>
+          <a:xfrm>
+            <a:off x="0" y="0"/>
+            <a:ext cx="2971800" cy="458788"/>
+          </a:xfrm>
+          <a:prstGeom prst="rect">
+            <a:avLst/>
+          </a:prstGeom>
+        </p:spPr>
+        <p:txBody>
+          <a:bodyPr vert="horz" lIns="91440" tIns="45720" rIns="91440" bIns="45720" rtlCol="0"/>
+          <a:lstStyle>
+            <a:lvl1pPr algn="l">
+              <a:defRPr sz="1200"/>
+            </a:lvl1pPr>
+          </a:lstStyle>
+          <a:p>
+            <a:endParaRPr lang="en-US"/>
+          </a:p>
+        </p:txBody>
+      </p:sp>
+      <p:sp>
+        <p:nvSpPr>
+          <p:cNvPr id="3" name="Date Placeholder 2"/>
+          <p:cNvSpPr>
+            <a:spLocks noGrp="1"/>
+          </p:cNvSpPr>
+          <p:nvPr>
+            <p:ph type="dt" idx="1"/>
+          </p:nvPr>
+        </p:nvSpPr>
+        <p:spPr>
+          <a:xfrm>
+            <a:off x="3884613" y="0"/>
+            <a:ext cx="2971800" cy="458788"/>
+          </a:xfrm>
+          <a:prstGeom prst="rect">
+            <a:avLst/>
+          </a:prstGeom>
+        </p:spPr>
+        <p:txBody>
+          <a:bodyPr vert="horz" lIns="91440" tIns="45720" rIns="91440" bIns="45720" rtlCol="0"/>
+          <a:lstStyle>
+            <a:lvl1pPr algn="r">
+              <a:defRPr sz="1200"/>
+            </a:lvl1pPr>
+          </a:lstStyle>
+          <a:p>
+            <a:fld id="{14F2F7C1-392F-49E5-9473-F15DEE9D1AC6}" type="datetimeFigureOut">
+              <a:rPr lang="en-US" smtClean="0"/>
+              <a:t>3/28/2020</a:t>
+            </a:fld>
+            <a:endParaRPr lang="en-US"/>
+          </a:p>
+        </p:txBody>
+      </p:sp>
+      <p:sp>
+        <p:nvSpPr>
+          <p:cNvPr id="4" name="Slide Image Placeholder 3"/>
+          <p:cNvSpPr>
+            <a:spLocks noGrp="1" noRot="1" noChangeAspect="1"/>
+          </p:cNvSpPr>
+          <p:nvPr>
+            <p:ph type="sldImg" idx="2"/>
+          </p:nvPr>
+        </p:nvSpPr>
+        <p:spPr>
+          <a:xfrm>
+            <a:off x="685800" y="1143000"/>
+            <a:ext cx="5486400" cy="3086100"/>
+          </a:xfrm>
+          <a:prstGeom prst="rect">
+            <a:avLst/>
+          </a:prstGeom>
+          <a:noFill/>
+          <a:ln w="12700">
+            <a:solidFill>
+              <a:prstClr val="black"/>
+            </a:solidFill>
+          </a:ln>
+        </p:spPr>
+        <p:txBody>
+          <a:bodyPr vert="horz" lIns="91440" tIns="45720" rIns="91440" bIns="45720" rtlCol="0" anchor="ctr"/>
+          <a:lstStyle/>
+          <a:p>
+            <a:endParaRPr lang="en-US"/>
+          </a:p>
+        </p:txBody>
+      </p:sp>
+      <p:sp>
+        <p:nvSpPr>
+          <p:cNvPr id="5" name="Notes Placeholder 4"/>
+          <p:cNvSpPr>
+            <a:spLocks noGrp="1"/>
+          </p:cNvSpPr>
+          <p:nvPr>
+            <p:ph type="body" sz="quarter" idx="3"/>
+          </p:nvPr>
+        </p:nvSpPr>
+        <p:spPr>
+          <a:xfrm>
+            <a:off x="685800" y="4400550"/>
+            <a:ext cx="5486400" cy="3600450"/>
+          </a:xfrm>
+          <a:prstGeom prst="rect">
+            <a:avLst/>
+          </a:prstGeom>
+        </p:spPr>
+        <p:txBody>
+          <a:bodyPr vert="horz" lIns="91440" tIns="45720" rIns="91440" bIns="45720" rtlCol="0"/>
+          <a:lstStyle/>
+          <a:p>
+            <a:pPr lvl="0"/>
+            <a:r>
+              <a:rPr lang="en-US"/>
+              <a:t>Click to edit Master text styles</a:t>
+            </a:r>
+          </a:p>
+          <a:p>
+            <a:pPr lvl="1"/>
+            <a:r>
+              <a:rPr lang="en-US"/>
+              <a:t>Second level</a:t>
+            </a:r>
+          </a:p>
+          <a:p>
+            <a:pPr lvl="2"/>
+            <a:r>
+              <a:rPr lang="en-US"/>
+              <a:t>Third level</a:t>
+            </a:r>
+          </a:p>
+          <a:p>
+            <a:pPr lvl="3"/>
+            <a:r>
+              <a:rPr lang="en-US"/>
+              <a:t>Fourth level</a:t>
+            </a:r>
+          </a:p>
+          <a:p>
+            <a:pPr lvl="4"/>
+            <a:r>
+              <a:rPr lang="en-US"/>
+              <a:t>Fifth level</a:t>
+            </a:r>
+          </a:p>
+        </p:txBody>
+      </p:sp>
+      <p:sp>
+        <p:nvSpPr>
+          <p:cNvPr id="6" name="Footer Placeholder 5"/>
+          <p:cNvSpPr>
+            <a:spLocks noGrp="1"/>
+          </p:cNvSpPr>
+          <p:nvPr>
+            <p:ph type="ftr" sz="quarter" idx="4"/>
+          </p:nvPr>
+        </p:nvSpPr>
+        <p:spPr>
+          <a:xfrm>
+            <a:off x="0" y="8685213"/>
+            <a:ext cx="2971800" cy="458787"/>
+          </a:xfrm>
+          <a:prstGeom prst="rect">
+            <a:avLst/>
+          </a:prstGeom>
+        </p:spPr>
+        <p:txBody>
+          <a:bodyPr vert="horz" lIns="91440" tIns="45720" rIns="91440" bIns="45720" rtlCol="0" anchor="b"/>
+          <a:lstStyle>
+            <a:lvl1pPr algn="l">
+              <a:defRPr sz="1200"/>
+            </a:lvl1pPr>
+          </a:lstStyle>
+          <a:p>
+            <a:endParaRPr lang="en-US"/>
+          </a:p>
+        </p:txBody>
+      </p:sp>
+      <p:sp>
+        <p:nvSpPr>
+          <p:cNvPr id="7" name="Slide Number Placeholder 6"/>
+          <p:cNvSpPr>
+            <a:spLocks noGrp="1"/>
+          </p:cNvSpPr>
+          <p:nvPr>
+            <p:ph type="sldNum" sz="quarter" idx="5"/>
+          </p:nvPr>
+        </p:nvSpPr>
+        <p:spPr>
+          <a:xfrm>
+            <a:off x="3884613" y="8685213"/>
+            <a:ext cx="2971800" cy="458787"/>
+          </a:xfrm>
+          <a:prstGeom prst="rect">
+            <a:avLst/>
+          </a:prstGeom>
+        </p:spPr>
+        <p:txBody>
+          <a:bodyPr vert="horz" lIns="91440" tIns="45720" rIns="91440" bIns="45720" rtlCol="0" anchor="b"/>
+          <a:lstStyle>
+            <a:lvl1pPr algn="r">
+              <a:defRPr sz="1200"/>
+            </a:lvl1pPr>
+          </a:lstStyle>
+          <a:p>
+            <a:fld id="{E24F6677-45BA-4CEA-83D4-8E0DCDDB64C4}" type="slidenum">
+              <a:rPr lang="en-US" smtClean="0"/>
+              <a:t>‹#›</a:t>
+            </a:fld>
+            <a:endParaRPr lang="en-US"/>
+          </a:p>
+        </p:txBody>
+      </p:sp>
+    </p:spTree>
+    <p:extLst>
+      <p:ext uri="{BB962C8B-B14F-4D97-AF65-F5344CB8AC3E}">
+        <p14:creationId xmlns:p14="http://schemas.microsoft.com/office/powerpoint/2010/main" val="2290124542"/>
+      </p:ext>
+    </p:extLst>
+  </p:cSld>
+  <p:clrMap bg1="lt1" tx1="dk1" bg2="lt2" tx2="dk2" accent1="accent1" accent2="accent2" accent3="accent3" accent4="accent4" accent5="accent5" accent6="accent6" hlink="hlink" folHlink="folHlink"/>
+  <p:notesStyle>
+    <a:lvl1pPr marL="0" algn="l" defTabSz="914400" rtl="0" eaLnBrk="1" latinLnBrk="0" hangingPunct="1">
+      <a:defRPr sz="1200" kern="1200">
+        <a:solidFill>
+          <a:schemeClr val="tx1"/>
+        </a:solidFill>
+        <a:latin typeface="+mn-lt"/>
+        <a:ea typeface="+mn-ea"/>
+        <a:cs typeface="+mn-cs"/>
+      </a:defRPr>
+    </a:lvl1pPr>
+    <a:lvl2pPr marL="457200" algn="l" defTabSz="914400" rtl="0" eaLnBrk="1" latinLnBrk="0" hangingPunct="1">
+      <a:defRPr sz="1200" kern="1200">
+        <a:solidFill>
+          <a:schemeClr val="tx1"/>
+        </a:solidFill>
+        <a:latin typeface="+mn-lt"/>
+        <a:ea typeface="+mn-ea"/>
+        <a:cs typeface="+mn-cs"/>
+      </a:defRPr>
+    </a:lvl2pPr>
+    <a:lvl3pPr marL="914400" algn="l" defTabSz="914400" rtl="0" eaLnBrk="1" latinLnBrk="0" hangingPunct="1">
+      <a:defRPr sz="1200" kern="1200">
+        <a:solidFill>
+          <a:schemeClr val="tx1"/>
+        </a:solidFill>
+        <a:latin typeface="+mn-lt"/>
+        <a:ea typeface="+mn-ea"/>
+        <a:cs typeface="+mn-cs"/>
+      </a:defRPr>
+    </a:lvl3pPr>
+    <a:lvl4pPr marL="1371600" algn="l" defTabSz="914400" rtl="0" eaLnBrk="1" latinLnBrk="0" hangingPunct="1">
+      <a:defRPr sz="1200" kern="1200">
+        <a:solidFill>
+          <a:schemeClr val="tx1"/>
+        </a:solidFill>
+        <a:latin typeface="+mn-lt"/>
+        <a:ea typeface="+mn-ea"/>
+        <a:cs typeface="+mn-cs"/>
+      </a:defRPr>
+    </a:lvl4pPr>
+    <a:lvl5pPr marL="1828800" algn="l" defTabSz="914400" rtl="0" eaLnBrk="1" latinLnBrk="0" hangingPunct="1">
+      <a:defRPr sz="1200" kern="1200">
+        <a:solidFill>
+          <a:schemeClr val="tx1"/>
+        </a:solidFill>
+        <a:latin typeface="+mn-lt"/>
+        <a:ea typeface="+mn-ea"/>
+        <a:cs typeface="+mn-cs"/>
+      </a:defRPr>
+    </a:lvl5pPr>
+    <a:lvl6pPr marL="2286000" algn="l" defTabSz="914400" rtl="0" eaLnBrk="1" latinLnBrk="0" hangingPunct="1">
+      <a:defRPr sz="1200" kern="1200">
+        <a:solidFill>
+          <a:schemeClr val="tx1"/>
+        </a:solidFill>
+        <a:latin typeface="+mn-lt"/>
+        <a:ea typeface="+mn-ea"/>
+        <a:cs typeface="+mn-cs"/>
+      </a:defRPr>
+    </a:lvl6pPr>
+    <a:lvl7pPr marL="2743200" algn="l" defTabSz="914400" rtl="0" eaLnBrk="1" latinLnBrk="0" hangingPunct="1">
+      <a:defRPr sz="1200" kern="1200">
+        <a:solidFill>
+          <a:schemeClr val="tx1"/>
+        </a:solidFill>
+        <a:latin typeface="+mn-lt"/>
+        <a:ea typeface="+mn-ea"/>
+        <a:cs typeface="+mn-cs"/>
+      </a:defRPr>
+    </a:lvl7pPr>
+    <a:lvl8pPr marL="3200400" algn="l" defTabSz="914400" rtl="0" eaLnBrk="1" latinLnBrk="0" hangingPunct="1">
+      <a:defRPr sz="1200" kern="1200">
+        <a:solidFill>
+          <a:schemeClr val="tx1"/>
+        </a:solidFill>
+        <a:latin typeface="+mn-lt"/>
+        <a:ea typeface="+mn-ea"/>
+        <a:cs typeface="+mn-cs"/>
+      </a:defRPr>
+    </a:lvl8pPr>
+    <a:lvl9pPr marL="3657600" algn="l" defTabSz="914400" rtl="0" eaLnBrk="1" latinLnBrk="0" hangingPunct="1">
+      <a:defRPr sz="1200" kern="1200">
+        <a:solidFill>
+          <a:schemeClr val="tx1"/>
+        </a:solidFill>
+        <a:latin typeface="+mn-lt"/>
+        <a:ea typeface="+mn-ea"/>
+        <a:cs typeface="+mn-cs"/>
+      </a:defRPr>
+    </a:lvl9pPr>
+  </p:notesStyle>
+</p:notesMaster>
+</file>
+
 <file path=ppt/slideLayouts/slideLayout1.xml><?xml version="1.0" encoding="utf-8"?>
 <p:sldLayout xmlns:a="http://schemas.openxmlformats.org/drawingml/2006/main" xmlns:r="http://schemas.openxmlformats.org/officeDocument/2006/relationships" xmlns:p="http://schemas.openxmlformats.org/presentationml/2006/main" type="title" preserve="1">
   <p:cSld name="Title Slide">
@@ -549,7 +901,7 @@
           <a:p>
             <a:fld id="{7BB7EBE7-1165-490E-81CC-9521196E8397}" type="datetimeFigureOut">
               <a:rPr lang="en-US" smtClean="0"/>
-              <a:t>3/22/2020</a:t>
+              <a:t>3/27/2020</a:t>
             </a:fld>
             <a:endParaRPr lang="en-US"/>
           </a:p>
@@ -747,7 +1099,7 @@
           <a:p>
             <a:fld id="{7BB7EBE7-1165-490E-81CC-9521196E8397}" type="datetimeFigureOut">
               <a:rPr lang="en-US" smtClean="0"/>
-              <a:t>3/22/2020</a:t>
+              <a:t>3/27/2020</a:t>
             </a:fld>
             <a:endParaRPr lang="en-US"/>
           </a:p>
@@ -955,7 +1307,7 @@
           <a:p>
             <a:fld id="{7BB7EBE7-1165-490E-81CC-9521196E8397}" type="datetimeFigureOut">
               <a:rPr lang="en-US" smtClean="0"/>
-              <a:t>3/22/2020</a:t>
+              <a:t>3/27/2020</a:t>
             </a:fld>
             <a:endParaRPr lang="en-US"/>
           </a:p>
@@ -1153,7 +1505,7 @@
           <a:p>
             <a:fld id="{7BB7EBE7-1165-490E-81CC-9521196E8397}" type="datetimeFigureOut">
               <a:rPr lang="en-US" smtClean="0"/>
-              <a:t>3/22/2020</a:t>
+              <a:t>3/27/2020</a:t>
             </a:fld>
             <a:endParaRPr lang="en-US"/>
           </a:p>
@@ -1428,7 +1780,7 @@
           <a:p>
             <a:fld id="{7BB7EBE7-1165-490E-81CC-9521196E8397}" type="datetimeFigureOut">
               <a:rPr lang="en-US" smtClean="0"/>
-              <a:t>3/22/2020</a:t>
+              <a:t>3/27/2020</a:t>
             </a:fld>
             <a:endParaRPr lang="en-US"/>
           </a:p>
@@ -1693,7 +2045,7 @@
           <a:p>
             <a:fld id="{7BB7EBE7-1165-490E-81CC-9521196E8397}" type="datetimeFigureOut">
               <a:rPr lang="en-US" smtClean="0"/>
-              <a:t>3/22/2020</a:t>
+              <a:t>3/27/2020</a:t>
             </a:fld>
             <a:endParaRPr lang="en-US"/>
           </a:p>
@@ -2105,7 +2457,7 @@
           <a:p>
             <a:fld id="{7BB7EBE7-1165-490E-81CC-9521196E8397}" type="datetimeFigureOut">
               <a:rPr lang="en-US" smtClean="0"/>
-              <a:t>3/22/2020</a:t>
+              <a:t>3/27/2020</a:t>
             </a:fld>
             <a:endParaRPr lang="en-US"/>
           </a:p>
@@ -2246,7 +2598,7 @@
           <a:p>
             <a:fld id="{7BB7EBE7-1165-490E-81CC-9521196E8397}" type="datetimeFigureOut">
               <a:rPr lang="en-US" smtClean="0"/>
-              <a:t>3/22/2020</a:t>
+              <a:t>3/27/2020</a:t>
             </a:fld>
             <a:endParaRPr lang="en-US"/>
           </a:p>
@@ -2359,7 +2711,7 @@
           <a:p>
             <a:fld id="{7BB7EBE7-1165-490E-81CC-9521196E8397}" type="datetimeFigureOut">
               <a:rPr lang="en-US" smtClean="0"/>
-              <a:t>3/22/2020</a:t>
+              <a:t>3/27/2020</a:t>
             </a:fld>
             <a:endParaRPr lang="en-US"/>
           </a:p>
@@ -2670,7 +3022,7 @@
           <a:p>
             <a:fld id="{7BB7EBE7-1165-490E-81CC-9521196E8397}" type="datetimeFigureOut">
               <a:rPr lang="en-US" smtClean="0"/>
-              <a:t>3/22/2020</a:t>
+              <a:t>3/27/2020</a:t>
             </a:fld>
             <a:endParaRPr lang="en-US"/>
           </a:p>
@@ -2958,7 +3310,7 @@
           <a:p>
             <a:fld id="{7BB7EBE7-1165-490E-81CC-9521196E8397}" type="datetimeFigureOut">
               <a:rPr lang="en-US" smtClean="0"/>
-              <a:t>3/22/2020</a:t>
+              <a:t>3/27/2020</a:t>
             </a:fld>
             <a:endParaRPr lang="en-US"/>
           </a:p>
@@ -3199,7 +3551,7 @@
           <a:p>
             <a:fld id="{7BB7EBE7-1165-490E-81CC-9521196E8397}" type="datetimeFigureOut">
               <a:rPr lang="en-US" smtClean="0"/>
-              <a:t>3/22/2020</a:t>
+              <a:t>3/27/2020</a:t>
             </a:fld>
             <a:endParaRPr lang="en-US"/>
           </a:p>
@@ -4025,8 +4377,8 @@
           </a:p>
         </p:txBody>
       </p:sp>
-      <mc:AlternateContent xmlns:mc="http://schemas.openxmlformats.org/markup-compatibility/2006">
-        <mc:Choice xmlns:a14="http://schemas.microsoft.com/office/drawing/2010/main" Requires="a14">
+      <mc:AlternateContent xmlns:mc="http://schemas.openxmlformats.org/markup-compatibility/2006" xmlns:a14="http://schemas.microsoft.com/office/drawing/2010/main">
+        <mc:Choice Requires="a14">
           <p:sp>
             <p:nvSpPr>
               <p:cNvPr id="3" name="Content Placeholder 2">
@@ -4312,7 +4664,7 @@
             </p:txBody>
           </p:sp>
         </mc:Choice>
-        <mc:Fallback>
+        <mc:Fallback xmlns="">
           <p:sp>
             <p:nvSpPr>
               <p:cNvPr id="3" name="Content Placeholder 2">
@@ -6208,7 +6560,7 @@
           <a:p>
             <a:r>
               <a:rPr lang="en-US" sz="2000" dirty="0"/>
-              <a:t>Many statistical learning methods have different characteristics.</a:t>
+              <a:t>Statistical learning methods have different characteristics.</a:t>
             </a:r>
           </a:p>
           <a:p>
@@ -6220,7 +6572,7 @@
           <a:p>
             <a:r>
               <a:rPr lang="en-US" sz="2000" dirty="0"/>
-              <a:t>For example, linear regression is a relatively inflexible approach because it can only generate linear functions.</a:t>
+              <a:t>For example, linear regression is an inflexible approach because it can only generate linear functions.</a:t>
             </a:r>
           </a:p>
         </p:txBody>
@@ -6375,15 +6727,7 @@
           <a:p>
             <a:r>
               <a:rPr lang="en-US" dirty="0"/>
-              <a:t>In contrast, approaches such as splines and boosting method are very flexible, which can lead to complicated estimates of </a:t>
-            </a:r>
-            <a:r>
-              <a:rPr lang="en-US" i="1" dirty="0"/>
-              <a:t>f</a:t>
-            </a:r>
-            <a:r>
-              <a:rPr lang="en-US" dirty="0"/>
-              <a:t> that it is difficult to understand how any individual predictor is associated with the response.</a:t>
+              <a:t>In contrast, approaches such as splines and boosting method are very flexible.</a:t>
             </a:r>
           </a:p>
           <a:p>
@@ -6443,37 +6787,25 @@
         </p:nvSpPr>
         <p:spPr>
           <a:xfrm>
-            <a:off x="838200" y="296562"/>
-            <a:ext cx="10515600" cy="5880401"/>
+            <a:off x="838200" y="1706880"/>
+            <a:ext cx="10515600" cy="4470083"/>
           </a:xfrm>
         </p:spPr>
         <p:txBody>
           <a:bodyPr>
-            <a:normAutofit fontScale="92500" lnSpcReduction="10000"/>
+            <a:normAutofit/>
           </a:bodyPr>
           <a:lstStyle/>
           <a:p>
             <a:r>
               <a:rPr lang="en-US" dirty="0"/>
-              <a:t>an example of inflexible methods is Least squares linear regression is relatively inflexible but is quite interpretable.</a:t>
-            </a:r>
-          </a:p>
-          <a:p>
-            <a:r>
-              <a:rPr lang="en-US" dirty="0"/>
-              <a:t>Another example is lasso because it is restrictive in estimating the coefficients, and sets a number of β0, β1, β2, … , βp to exactly zero, but it is more interpretable than linear regression because in the final model, the response variable will only be related to a small subset of the predictor</a:t>
-            </a:r>
-          </a:p>
-          <a:p>
-            <a:r>
-              <a:rPr lang="en-US" dirty="0"/>
-              <a:t>However, GAM is more flexible but less interpretable than linear regression because the relationship between each predictor and the response is now modeled using a curve.</a:t>
-            </a:r>
-          </a:p>
-          <a:p>
-            <a:r>
-              <a:rPr lang="en-US" dirty="0"/>
-              <a:t>Furthermore, fully non-linear methods such as </a:t>
+              <a:t>However, GAM is more flexible but less interpretable than linear regression.</a:t>
+            </a:r>
+          </a:p>
+          <a:p>
+            <a:r>
+              <a:rPr lang="en-US" dirty="0"/>
+              <a:t>Non-linear methods such as </a:t>
             </a:r>
             <a:r>
               <a:rPr lang="en-US" i="1" dirty="0"/>
@@ -6489,7 +6821,7 @@
             </a:r>
             <a:r>
               <a:rPr lang="en-US" dirty="0"/>
-              <a:t> with non-linear kernels are highly flexible approaches that are harder to interpret.</a:t>
+              <a:t> with non-linear kernels are highly flexible approaches.</a:t>
             </a:r>
           </a:p>
           <a:p>
@@ -6570,106 +6902,163 @@
           </a:p>
         </p:txBody>
       </p:sp>
-      <p:sp>
-        <p:nvSpPr>
-          <p:cNvPr id="3" name="Content Placeholder 2">
-            <a:extLst>
-              <a:ext uri="{FF2B5EF4-FFF2-40B4-BE49-F238E27FC236}">
-                <a16:creationId xmlns:a16="http://schemas.microsoft.com/office/drawing/2014/main" id="{09BEC18C-E62C-49C9-96A6-3A5C4177E059}"/>
-              </a:ext>
-            </a:extLst>
-          </p:cNvPr>
-          <p:cNvSpPr>
-            <a:spLocks noGrp="1"/>
-          </p:cNvSpPr>
-          <p:nvPr>
-            <p:ph idx="1"/>
-          </p:nvPr>
-        </p:nvSpPr>
-        <p:spPr/>
-        <p:txBody>
-          <a:bodyPr/>
-          <a:lstStyle/>
-          <a:p>
-            <a:r>
-              <a:rPr lang="en-US" dirty="0">
-                <a:hlinkClick r:id="rId2"/>
-              </a:rPr>
-              <a:t>What is supervised and unsupervised learning</a:t>
-            </a:r>
-            <a:r>
-              <a:rPr lang="en-US" dirty="0"/>
-              <a:t>: Slide 3</a:t>
-            </a:r>
-          </a:p>
-          <a:p>
-            <a:r>
-              <a:rPr lang="en-US" dirty="0"/>
-              <a:t>The parametric and non-parametric approaches are supervised learning because each observation of the predictor x</a:t>
-            </a:r>
-            <a:r>
-              <a:rPr lang="en-US" sz="2000" dirty="0"/>
-              <a:t>i</a:t>
-            </a:r>
-            <a:r>
-              <a:rPr lang="en-US" dirty="0"/>
-              <a:t> is an associated response to the measurement </a:t>
-            </a:r>
-            <a:r>
-              <a:rPr lang="en-US" dirty="0" err="1"/>
-              <a:t>y</a:t>
-            </a:r>
-            <a:r>
-              <a:rPr lang="en-US" sz="2000" dirty="0" err="1"/>
-              <a:t>i</a:t>
-            </a:r>
-            <a:r>
-              <a:rPr lang="en-US" dirty="0"/>
-              <a:t>.</a:t>
-            </a:r>
-          </a:p>
-          <a:p>
-            <a:r>
-              <a:rPr lang="en-US" dirty="0"/>
-              <a:t>Example of statistical learning methods that fall into the supervised learning domain: linear regression, logistic regression, GAM, boosting, and support vector machines.</a:t>
-            </a:r>
-          </a:p>
-          <a:p>
-            <a:r>
-              <a:rPr lang="en-US" dirty="0"/>
-              <a:t>In contrast, unsupervised learning describes the somewhat more challenging situation in which for every observation </a:t>
-            </a:r>
-            <a:r>
-              <a:rPr lang="en-US" dirty="0" err="1"/>
-              <a:t>i</a:t>
-            </a:r>
-            <a:r>
-              <a:rPr lang="en-US" dirty="0"/>
-              <a:t> = 1, … , n, we observe a vector measurements x</a:t>
-            </a:r>
-            <a:r>
-              <a:rPr lang="en-US" sz="2000" dirty="0"/>
-              <a:t>i</a:t>
-            </a:r>
-            <a:r>
-              <a:rPr lang="en-US" dirty="0"/>
-              <a:t> but no associated response </a:t>
-            </a:r>
-            <a:r>
-              <a:rPr lang="en-US" dirty="0" err="1"/>
-              <a:t>y</a:t>
-            </a:r>
-            <a:r>
-              <a:rPr lang="en-US" sz="2000" dirty="0" err="1"/>
-              <a:t>i</a:t>
-            </a:r>
-            <a:r>
-              <a:rPr lang="en-US" dirty="0"/>
-              <a:t>.</a:t>
-            </a:r>
-          </a:p>
-        </p:txBody>
-      </p:sp>
+      <mc:AlternateContent xmlns:mc="http://schemas.openxmlformats.org/markup-compatibility/2006">
+        <mc:Choice xmlns:a14="http://schemas.microsoft.com/office/drawing/2010/main" Requires="a14">
+          <p:sp>
+            <p:nvSpPr>
+              <p:cNvPr id="3" name="Content Placeholder 2">
+                <a:extLst>
+                  <a:ext uri="{FF2B5EF4-FFF2-40B4-BE49-F238E27FC236}">
+                    <a16:creationId xmlns:a16="http://schemas.microsoft.com/office/drawing/2014/main" id="{09BEC18C-E62C-49C9-96A6-3A5C4177E059}"/>
+                  </a:ext>
+                </a:extLst>
+              </p:cNvPr>
+              <p:cNvSpPr>
+                <a:spLocks noGrp="1"/>
+              </p:cNvSpPr>
+              <p:nvPr>
+                <p:ph idx="1"/>
+              </p:nvPr>
+            </p:nvSpPr>
+            <p:spPr/>
+            <p:txBody>
+              <a:bodyPr/>
+              <a:lstStyle/>
+              <a:p>
+                <a:r>
+                  <a:rPr lang="en-US" dirty="0"/>
+                  <a:t>The parametric and non-parametric approaches are supervised learning.</a:t>
+                </a:r>
+              </a:p>
+              <a:p>
+                <a:r>
+                  <a:rPr lang="en-US" dirty="0"/>
+                  <a:t>Example of statistical learning methods that fall into the supervised learning domain: linear regression, logistic regression, GAM, boosting, and support vector machines.</a:t>
+                </a:r>
+              </a:p>
+              <a:p>
+                <a:r>
+                  <a:rPr lang="en-US" dirty="0"/>
+                  <a:t>In contrast, unsupervised learning describes the situation in which for every observation </a:t>
+                </a:r>
+                <a:r>
+                  <a:rPr lang="en-US" i="1" dirty="0" err="1"/>
+                  <a:t>i</a:t>
+                </a:r>
+                <a:r>
+                  <a:rPr lang="en-US" dirty="0"/>
+                  <a:t> = 1, … , n, we observe a vector measurements </a:t>
+                </a:r>
+                <a14:m>
+                  <m:oMath xmlns:m="http://schemas.openxmlformats.org/officeDocument/2006/math">
+                    <m:sSub>
+                      <m:sSubPr>
+                        <m:ctrlPr>
+                          <a:rPr lang="en-US" i="1">
+                            <a:latin typeface="Cambria Math" panose="02040503050406030204" pitchFamily="18" charset="0"/>
+                          </a:rPr>
+                        </m:ctrlPr>
+                      </m:sSubPr>
+                      <m:e>
+                        <m:r>
+                          <a:rPr lang="en-US" i="1">
+                            <a:latin typeface="Cambria Math" panose="02040503050406030204" pitchFamily="18" charset="0"/>
+                          </a:rPr>
+                          <m:t>𝑥</m:t>
+                        </m:r>
+                      </m:e>
+                      <m:sub>
+                        <m:r>
+                          <a:rPr lang="en-US" i="1">
+                            <a:latin typeface="Cambria Math" panose="02040503050406030204" pitchFamily="18" charset="0"/>
+                          </a:rPr>
+                          <m:t>𝑖</m:t>
+                        </m:r>
+                      </m:sub>
+                    </m:sSub>
+                  </m:oMath>
+                </a14:m>
+                <a:r>
+                  <a:rPr lang="en-US" dirty="0"/>
+                  <a:t> but no associated response </a:t>
+                </a:r>
+                <a14:m>
+                  <m:oMath xmlns:m="http://schemas.openxmlformats.org/officeDocument/2006/math">
+                    <m:sSub>
+                      <m:sSubPr>
+                        <m:ctrlPr>
+                          <a:rPr lang="en-US" i="1">
+                            <a:latin typeface="Cambria Math" panose="02040503050406030204" pitchFamily="18" charset="0"/>
+                          </a:rPr>
+                        </m:ctrlPr>
+                      </m:sSubPr>
+                      <m:e>
+                        <m:r>
+                          <a:rPr lang="en-US" i="1">
+                            <a:latin typeface="Cambria Math" panose="02040503050406030204" pitchFamily="18" charset="0"/>
+                          </a:rPr>
+                          <m:t>𝑦</m:t>
+                        </m:r>
+                      </m:e>
+                      <m:sub>
+                        <m:r>
+                          <a:rPr lang="en-US" i="1">
+                            <a:latin typeface="Cambria Math" panose="02040503050406030204" pitchFamily="18" charset="0"/>
+                          </a:rPr>
+                          <m:t>𝑖</m:t>
+                        </m:r>
+                      </m:sub>
+                    </m:sSub>
+                  </m:oMath>
+                </a14:m>
+                <a:r>
+                  <a:rPr lang="en-US" dirty="0"/>
+                  <a:t>.</a:t>
+                </a:r>
+              </a:p>
+            </p:txBody>
+          </p:sp>
+        </mc:Choice>
+        <mc:Fallback>
+          <p:sp>
+            <p:nvSpPr>
+              <p:cNvPr id="3" name="Content Placeholder 2">
+                <a:extLst>
+                  <a:ext uri="{FF2B5EF4-FFF2-40B4-BE49-F238E27FC236}">
+                    <a16:creationId xmlns:a16="http://schemas.microsoft.com/office/drawing/2014/main" id="{09BEC18C-E62C-49C9-96A6-3A5C4177E059}"/>
+                  </a:ext>
+                </a:extLst>
+              </p:cNvPr>
+              <p:cNvSpPr>
+                <a:spLocks noGrp="1" noRot="1" noChangeAspect="1" noMove="1" noResize="1" noEditPoints="1" noAdjustHandles="1" noChangeArrowheads="1" noChangeShapeType="1" noTextEdit="1"/>
+              </p:cNvSpPr>
+              <p:nvPr>
+                <p:ph idx="1"/>
+              </p:nvPr>
+            </p:nvSpPr>
+            <p:spPr>
+              <a:blipFill>
+                <a:blip r:embed="rId2"/>
+                <a:stretch>
+                  <a:fillRect l="-1043" t="-2241" r="-1797"/>
+                </a:stretch>
+              </a:blipFill>
+            </p:spPr>
+            <p:txBody>
+              <a:bodyPr/>
+              <a:lstStyle/>
+              <a:p>
+                <a:r>
+                  <a:rPr lang="en-US">
+                    <a:noFill/>
+                  </a:rPr>
+                  <a:t> </a:t>
+                </a:r>
+              </a:p>
+            </p:txBody>
+          </p:sp>
+        </mc:Fallback>
+      </mc:AlternateContent>
     </p:spTree>
     <p:extLst>
       <p:ext uri="{BB962C8B-B14F-4D97-AF65-F5344CB8AC3E}">
@@ -6744,7 +7133,7 @@
         <p:spPr/>
         <p:txBody>
           <a:bodyPr>
-            <a:normAutofit lnSpcReduction="10000"/>
+            <a:normAutofit/>
           </a:bodyPr>
           <a:lstStyle/>
           <a:p>
@@ -6757,12 +7146,6 @@
             <a:r>
               <a:rPr lang="en-US" dirty="0"/>
               <a:t>Linear regression is a supervised learning method because there are predictor x is an  associated response to the measurement y.</a:t>
-            </a:r>
-          </a:p>
-          <a:p>
-            <a:r>
-              <a:rPr lang="en-US" dirty="0"/>
-              <a:t>However, since linear regression requires the measurement of y, we should not use linear regression to do unsupervised learning because there is no response variable y to predict in unsupervised learning.</a:t>
             </a:r>
           </a:p>
           <a:p>
@@ -6835,8 +7218,8 @@
         </p:nvSpPr>
         <p:spPr>
           <a:xfrm>
-            <a:off x="838200" y="345989"/>
-            <a:ext cx="10515600" cy="5830974"/>
+            <a:off x="838200" y="2460567"/>
+            <a:ext cx="10515600" cy="3716396"/>
           </a:xfrm>
         </p:spPr>
         <p:txBody>
@@ -6845,52 +7228,70 @@
           <a:p>
             <a:r>
               <a:rPr lang="en-US" dirty="0"/>
-              <a:t>An example for using cluster analysis is:</a:t>
-            </a:r>
-          </a:p>
-          <a:p>
-            <a:pPr marL="0" indent="0">
-              <a:buNone/>
-            </a:pPr>
+              <a:t>Cluster analysis is:</a:t>
+            </a:r>
+          </a:p>
+          <a:p>
+            <a:pPr lvl="1"/>
             <a:r>
               <a:rPr lang="en-US" dirty="0"/>
               <a:t>Suppose there is a market segmentation study, we might observe multiple characteristics (variables) for potential customers.</a:t>
             </a:r>
           </a:p>
           <a:p>
-            <a:pPr marL="0" indent="0">
-              <a:buNone/>
-            </a:pPr>
+            <a:pPr lvl="1"/>
             <a:r>
               <a:rPr lang="en-US" dirty="0"/>
               <a:t>Characteristics like: zip code, family income, and shopping habits.</a:t>
             </a:r>
           </a:p>
           <a:p>
-            <a:pPr marL="0" indent="0">
-              <a:buNone/>
-            </a:pPr>
-            <a:r>
-              <a:rPr lang="en-US" dirty="0"/>
-              <a:t>We can assume that customers fall into these two different groups: big spenders and low spenders.</a:t>
-            </a:r>
-          </a:p>
-          <a:p>
-            <a:pPr marL="0" indent="0">
-              <a:buNone/>
-            </a:pPr>
-            <a:r>
-              <a:rPr lang="en-US" dirty="0"/>
-              <a:t>(If the information about each customer’s spending patterns were available, then a supervised analysis would be possible)</a:t>
-            </a:r>
-          </a:p>
-          <a:p>
-            <a:pPr marL="0" indent="0">
-              <a:buNone/>
-            </a:pPr>
+            <a:pPr lvl="1"/>
+            <a:r>
+              <a:rPr lang="en-US" dirty="0"/>
+              <a:t>Assume that customers fall into these two different groups: big spenders and low spenders.</a:t>
+            </a:r>
+          </a:p>
+          <a:p>
+            <a:pPr lvl="1"/>
             <a:r>
               <a:rPr lang="en-US" dirty="0"/>
               <a:t>In this setting, we can try to cluster the customers on the basis of the variable measured, in order to identify distinct groups of potential customers. </a:t>
+            </a:r>
+          </a:p>
+        </p:txBody>
+      </p:sp>
+      <p:sp>
+        <p:nvSpPr>
+          <p:cNvPr id="2" name="TextBox 1">
+            <a:extLst>
+              <a:ext uri="{FF2B5EF4-FFF2-40B4-BE49-F238E27FC236}">
+                <a16:creationId xmlns:a16="http://schemas.microsoft.com/office/drawing/2014/main" id="{B62E60CC-D82F-456E-8F8A-13D8F7F21A2D}"/>
+              </a:ext>
+            </a:extLst>
+          </p:cNvPr>
+          <p:cNvSpPr txBox="1"/>
+          <p:nvPr/>
+        </p:nvSpPr>
+        <p:spPr>
+          <a:xfrm>
+            <a:off x="838200" y="871851"/>
+            <a:ext cx="9831185" cy="830997"/>
+          </a:xfrm>
+          <a:prstGeom prst="rect">
+            <a:avLst/>
+          </a:prstGeom>
+          <a:noFill/>
+        </p:spPr>
+        <p:txBody>
+          <a:bodyPr wrap="square" rtlCol="0">
+            <a:spAutoFit/>
+          </a:bodyPr>
+          <a:lstStyle/>
+          <a:p>
+            <a:r>
+              <a:rPr lang="en-US" sz="4800" dirty="0"/>
+              <a:t>Example of Cluster analysis</a:t>
             </a:r>
           </a:p>
         </p:txBody>
@@ -7376,13 +7777,13 @@
         <p:spPr/>
         <p:txBody>
           <a:bodyPr>
-            <a:normAutofit fontScale="85000" lnSpcReduction="20000"/>
+            <a:normAutofit lnSpcReduction="10000"/>
           </a:bodyPr>
           <a:lstStyle/>
           <a:p>
             <a:r>
               <a:rPr lang="en-US" dirty="0"/>
-              <a:t>These topic will include variables, which characterized as either quantitative or qualitative.</a:t>
+              <a:t>Variables are characterized as either quantitative or qualitative.</a:t>
             </a:r>
           </a:p>
           <a:p>
@@ -7394,28 +7795,7 @@
           <a:p>
             <a:r>
               <a:rPr lang="en-US" dirty="0"/>
-              <a:t>While problems with qualitative response are often referred as classification problems.</a:t>
-            </a:r>
-          </a:p>
-          <a:p>
-            <a:r>
-              <a:rPr lang="en-US" dirty="0"/>
-              <a:t>Not all regression use quantitative response, example: logistic regression uses qualitative responses.</a:t>
-            </a:r>
-          </a:p>
-          <a:p>
-            <a:r>
-              <a:rPr lang="en-US" dirty="0"/>
-              <a:t>Methods that are available for both quantitative and qualitative response are K-nearest neighbors and boosting.</a:t>
-            </a:r>
-          </a:p>
-          <a:p>
-            <a:pPr marL="0" indent="0">
-              <a:buNone/>
-            </a:pPr>
-            <a:r>
-              <a:rPr lang="en-US" dirty="0"/>
-              <a:t>(This methods will introduce later in the book)</a:t>
+              <a:t>Methods that are available for both quantitative and qualitative response are K-nearest neighbors and boosting. (This methods will introduce later in the book)</a:t>
             </a:r>
           </a:p>
           <a:p>
@@ -8908,8 +9288,8 @@
           </a:p>
         </p:txBody>
       </p:sp>
-      <mc:AlternateContent xmlns:mc="http://schemas.openxmlformats.org/markup-compatibility/2006">
-        <mc:Choice xmlns:a14="http://schemas.microsoft.com/office/drawing/2010/main" Requires="a14">
+      <mc:AlternateContent xmlns:mc="http://schemas.openxmlformats.org/markup-compatibility/2006" xmlns:a14="http://schemas.microsoft.com/office/drawing/2010/main">
+        <mc:Choice Requires="a14">
           <p:sp>
             <p:nvSpPr>
               <p:cNvPr id="3" name="Content Placeholder 2">
@@ -9034,7 +9414,7 @@
             </p:txBody>
           </p:sp>
         </mc:Choice>
-        <mc:Fallback>
+        <mc:Fallback xmlns="">
           <p:sp>
             <p:nvSpPr>
               <p:cNvPr id="3" name="Content Placeholder 2">
@@ -9168,8 +9548,8 @@
           </a:p>
         </p:txBody>
       </p:sp>
-      <mc:AlternateContent xmlns:mc="http://schemas.openxmlformats.org/markup-compatibility/2006">
-        <mc:Choice xmlns:a14="http://schemas.microsoft.com/office/drawing/2010/main" Requires="a14">
+      <mc:AlternateContent xmlns:mc="http://schemas.openxmlformats.org/markup-compatibility/2006" xmlns:a14="http://schemas.microsoft.com/office/drawing/2010/main">
+        <mc:Choice Requires="a14">
           <p:sp>
             <p:nvSpPr>
               <p:cNvPr id="3" name="Content Placeholder 2">
@@ -9239,7 +9619,7 @@
             </p:txBody>
           </p:sp>
         </mc:Choice>
-        <mc:Fallback>
+        <mc:Fallback xmlns="">
           <p:sp>
             <p:nvSpPr>
               <p:cNvPr id="3" name="Content Placeholder 2">
@@ -9585,4 +9965,299 @@
     </a:ext>
   </a:extLst>
 </a:theme>
+</file>
+
+<file path=ppt/theme/theme2.xml><?xml version="1.0" encoding="utf-8"?>
+<a:theme xmlns:a="http://schemas.openxmlformats.org/drawingml/2006/main" name="Office Theme">
+  <a:themeElements>
+    <a:clrScheme name="Office">
+      <a:dk1>
+        <a:sysClr val="windowText" lastClr="000000"/>
+      </a:dk1>
+      <a:lt1>
+        <a:sysClr val="window" lastClr="FFFFFF"/>
+      </a:lt1>
+      <a:dk2>
+        <a:srgbClr val="44546A"/>
+      </a:dk2>
+      <a:lt2>
+        <a:srgbClr val="E7E6E6"/>
+      </a:lt2>
+      <a:accent1>
+        <a:srgbClr val="4472C4"/>
+      </a:accent1>
+      <a:accent2>
+        <a:srgbClr val="ED7D31"/>
+      </a:accent2>
+      <a:accent3>
+        <a:srgbClr val="A5A5A5"/>
+      </a:accent3>
+      <a:accent4>
+        <a:srgbClr val="FFC000"/>
+      </a:accent4>
+      <a:accent5>
+        <a:srgbClr val="5B9BD5"/>
+      </a:accent5>
+      <a:accent6>
+        <a:srgbClr val="70AD47"/>
+      </a:accent6>
+      <a:hlink>
+        <a:srgbClr val="0563C1"/>
+      </a:hlink>
+      <a:folHlink>
+        <a:srgbClr val="954F72"/>
+      </a:folHlink>
+    </a:clrScheme>
+    <a:fontScheme name="Office">
+      <a:majorFont>
+        <a:latin typeface="Calibri Light" panose="020F0302020204030204"/>
+        <a:ea typeface=""/>
+        <a:cs typeface=""/>
+        <a:font script="Jpan" typeface="游ゴシック Light"/>
+        <a:font script="Hang" typeface="맑은 고딕"/>
+        <a:font script="Hans" typeface="等线 Light"/>
+        <a:font script="Hant" typeface="新細明體"/>
+        <a:font script="Arab" typeface="Times New Roman"/>
+        <a:font script="Hebr" typeface="Times New Roman"/>
+        <a:font script="Thai" typeface="Angsana New"/>
+        <a:font script="Ethi" typeface="Nyala"/>
+        <a:font script="Beng" typeface="Vrinda"/>
+        <a:font script="Gujr" typeface="Shruti"/>
+        <a:font script="Khmr" typeface="MoolBoran"/>
+        <a:font script="Knda" typeface="Tunga"/>
+        <a:font script="Guru" typeface="Raavi"/>
+        <a:font script="Cans" typeface="Euphemia"/>
+        <a:font script="Cher" typeface="Plantagenet Cherokee"/>
+        <a:font script="Yiii" typeface="Microsoft Yi Baiti"/>
+        <a:font script="Tibt" typeface="Microsoft Himalaya"/>
+        <a:font script="Thaa" typeface="MV Boli"/>
+        <a:font script="Deva" typeface="Mangal"/>
+        <a:font script="Telu" typeface="Gautami"/>
+        <a:font script="Taml" typeface="Latha"/>
+        <a:font script="Syrc" typeface="Estrangelo Edessa"/>
+        <a:font script="Orya" typeface="Kalinga"/>
+        <a:font script="Mlym" typeface="Kartika"/>
+        <a:font script="Laoo" typeface="DokChampa"/>
+        <a:font script="Sinh" typeface="Iskoola Pota"/>
+        <a:font script="Mong" typeface="Mongolian Baiti"/>
+        <a:font script="Viet" typeface="Times New Roman"/>
+        <a:font script="Uigh" typeface="Microsoft Uighur"/>
+        <a:font script="Geor" typeface="Sylfaen"/>
+        <a:font script="Armn" typeface="Arial"/>
+        <a:font script="Bugi" typeface="Leelawadee UI"/>
+        <a:font script="Bopo" typeface="Microsoft JhengHei"/>
+        <a:font script="Java" typeface="Javanese Text"/>
+        <a:font script="Lisu" typeface="Segoe UI"/>
+        <a:font script="Mymr" typeface="Myanmar Text"/>
+        <a:font script="Nkoo" typeface="Ebrima"/>
+        <a:font script="Olck" typeface="Nirmala UI"/>
+        <a:font script="Osma" typeface="Ebrima"/>
+        <a:font script="Phag" typeface="Phagspa"/>
+        <a:font script="Syrn" typeface="Estrangelo Edessa"/>
+        <a:font script="Syrj" typeface="Estrangelo Edessa"/>
+        <a:font script="Syre" typeface="Estrangelo Edessa"/>
+        <a:font script="Sora" typeface="Nirmala UI"/>
+        <a:font script="Tale" typeface="Microsoft Tai Le"/>
+        <a:font script="Talu" typeface="Microsoft New Tai Lue"/>
+        <a:font script="Tfng" typeface="Ebrima"/>
+      </a:majorFont>
+      <a:minorFont>
+        <a:latin typeface="Calibri" panose="020F0502020204030204"/>
+        <a:ea typeface=""/>
+        <a:cs typeface=""/>
+        <a:font script="Jpan" typeface="游ゴシック"/>
+        <a:font script="Hang" typeface="맑은 고딕"/>
+        <a:font script="Hans" typeface="等线"/>
+        <a:font script="Hant" typeface="新細明體"/>
+        <a:font script="Arab" typeface="Arial"/>
+        <a:font script="Hebr" typeface="Arial"/>
+        <a:font script="Thai" typeface="Cordia New"/>
+        <a:font script="Ethi" typeface="Nyala"/>
+        <a:font script="Beng" typeface="Vrinda"/>
+        <a:font script="Gujr" typeface="Shruti"/>
+        <a:font script="Khmr" typeface="DaunPenh"/>
+        <a:font script="Knda" typeface="Tunga"/>
+        <a:font script="Guru" typeface="Raavi"/>
+        <a:font script="Cans" typeface="Euphemia"/>
+        <a:font script="Cher" typeface="Plantagenet Cherokee"/>
+        <a:font script="Yiii" typeface="Microsoft Yi Baiti"/>
+        <a:font script="Tibt" typeface="Microsoft Himalaya"/>
+        <a:font script="Thaa" typeface="MV Boli"/>
+        <a:font script="Deva" typeface="Mangal"/>
+        <a:font script="Telu" typeface="Gautami"/>
+        <a:font script="Taml" typeface="Latha"/>
+        <a:font script="Syrc" typeface="Estrangelo Edessa"/>
+        <a:font script="Orya" typeface="Kalinga"/>
+        <a:font script="Mlym" typeface="Kartika"/>
+        <a:font script="Laoo" typeface="DokChampa"/>
+        <a:font script="Sinh" typeface="Iskoola Pota"/>
+        <a:font script="Mong" typeface="Mongolian Baiti"/>
+        <a:font script="Viet" typeface="Arial"/>
+        <a:font script="Uigh" typeface="Microsoft Uighur"/>
+        <a:font script="Geor" typeface="Sylfaen"/>
+        <a:font script="Armn" typeface="Arial"/>
+        <a:font script="Bugi" typeface="Leelawadee UI"/>
+        <a:font script="Bopo" typeface="Microsoft JhengHei"/>
+        <a:font script="Java" typeface="Javanese Text"/>
+        <a:font script="Lisu" typeface="Segoe UI"/>
+        <a:font script="Mymr" typeface="Myanmar Text"/>
+        <a:font script="Nkoo" typeface="Ebrima"/>
+        <a:font script="Olck" typeface="Nirmala UI"/>
+        <a:font script="Osma" typeface="Ebrima"/>
+        <a:font script="Phag" typeface="Phagspa"/>
+        <a:font script="Syrn" typeface="Estrangelo Edessa"/>
+        <a:font script="Syrj" typeface="Estrangelo Edessa"/>
+        <a:font script="Syre" typeface="Estrangelo Edessa"/>
+        <a:font script="Sora" typeface="Nirmala UI"/>
+        <a:font script="Tale" typeface="Microsoft Tai Le"/>
+        <a:font script="Talu" typeface="Microsoft New Tai Lue"/>
+        <a:font script="Tfng" typeface="Ebrima"/>
+      </a:minorFont>
+    </a:fontScheme>
+    <a:fmtScheme name="Office">
+      <a:fillStyleLst>
+        <a:solidFill>
+          <a:schemeClr val="phClr"/>
+        </a:solidFill>
+        <a:gradFill rotWithShape="1">
+          <a:gsLst>
+            <a:gs pos="0">
+              <a:schemeClr val="phClr">
+                <a:lumMod val="110000"/>
+                <a:satMod val="105000"/>
+                <a:tint val="67000"/>
+              </a:schemeClr>
+            </a:gs>
+            <a:gs pos="50000">
+              <a:schemeClr val="phClr">
+                <a:lumMod val="105000"/>
+                <a:satMod val="103000"/>
+                <a:tint val="73000"/>
+              </a:schemeClr>
+            </a:gs>
+            <a:gs pos="100000">
+              <a:schemeClr val="phClr">
+                <a:lumMod val="105000"/>
+                <a:satMod val="109000"/>
+                <a:tint val="81000"/>
+              </a:schemeClr>
+            </a:gs>
+          </a:gsLst>
+          <a:lin ang="5400000" scaled="0"/>
+        </a:gradFill>
+        <a:gradFill rotWithShape="1">
+          <a:gsLst>
+            <a:gs pos="0">
+              <a:schemeClr val="phClr">
+                <a:satMod val="103000"/>
+                <a:lumMod val="102000"/>
+                <a:tint val="94000"/>
+              </a:schemeClr>
+            </a:gs>
+            <a:gs pos="50000">
+              <a:schemeClr val="phClr">
+                <a:satMod val="110000"/>
+                <a:lumMod val="100000"/>
+                <a:shade val="100000"/>
+              </a:schemeClr>
+            </a:gs>
+            <a:gs pos="100000">
+              <a:schemeClr val="phClr">
+                <a:lumMod val="99000"/>
+                <a:satMod val="120000"/>
+                <a:shade val="78000"/>
+              </a:schemeClr>
+            </a:gs>
+          </a:gsLst>
+          <a:lin ang="5400000" scaled="0"/>
+        </a:gradFill>
+      </a:fillStyleLst>
+      <a:lnStyleLst>
+        <a:ln w="6350" cap="flat" cmpd="sng" algn="ctr">
+          <a:solidFill>
+            <a:schemeClr val="phClr"/>
+          </a:solidFill>
+          <a:prstDash val="solid"/>
+          <a:miter lim="800000"/>
+        </a:ln>
+        <a:ln w="12700" cap="flat" cmpd="sng" algn="ctr">
+          <a:solidFill>
+            <a:schemeClr val="phClr"/>
+          </a:solidFill>
+          <a:prstDash val="solid"/>
+          <a:miter lim="800000"/>
+        </a:ln>
+        <a:ln w="19050" cap="flat" cmpd="sng" algn="ctr">
+          <a:solidFill>
+            <a:schemeClr val="phClr"/>
+          </a:solidFill>
+          <a:prstDash val="solid"/>
+          <a:miter lim="800000"/>
+        </a:ln>
+      </a:lnStyleLst>
+      <a:effectStyleLst>
+        <a:effectStyle>
+          <a:effectLst/>
+        </a:effectStyle>
+        <a:effectStyle>
+          <a:effectLst/>
+        </a:effectStyle>
+        <a:effectStyle>
+          <a:effectLst>
+            <a:outerShdw blurRad="57150" dist="19050" dir="5400000" algn="ctr" rotWithShape="0">
+              <a:srgbClr val="000000">
+                <a:alpha val="63000"/>
+              </a:srgbClr>
+            </a:outerShdw>
+          </a:effectLst>
+        </a:effectStyle>
+      </a:effectStyleLst>
+      <a:bgFillStyleLst>
+        <a:solidFill>
+          <a:schemeClr val="phClr"/>
+        </a:solidFill>
+        <a:solidFill>
+          <a:schemeClr val="phClr">
+            <a:tint val="95000"/>
+            <a:satMod val="170000"/>
+          </a:schemeClr>
+        </a:solidFill>
+        <a:gradFill rotWithShape="1">
+          <a:gsLst>
+            <a:gs pos="0">
+              <a:schemeClr val="phClr">
+                <a:tint val="93000"/>
+                <a:satMod val="150000"/>
+                <a:shade val="98000"/>
+                <a:lumMod val="102000"/>
+              </a:schemeClr>
+            </a:gs>
+            <a:gs pos="50000">
+              <a:schemeClr val="phClr">
+                <a:tint val="98000"/>
+                <a:satMod val="130000"/>
+                <a:shade val="90000"/>
+                <a:lumMod val="103000"/>
+              </a:schemeClr>
+            </a:gs>
+            <a:gs pos="100000">
+              <a:schemeClr val="phClr">
+                <a:shade val="63000"/>
+                <a:satMod val="120000"/>
+              </a:schemeClr>
+            </a:gs>
+          </a:gsLst>
+          <a:lin ang="5400000" scaled="0"/>
+        </a:gradFill>
+      </a:bgFillStyleLst>
+    </a:fmtScheme>
+  </a:themeElements>
+  <a:objectDefaults/>
+  <a:extraClrSchemeLst/>
+  <a:extLst>
+    <a:ext uri="{05A4C25C-085E-4340-85A3-A5531E510DB2}">
+      <thm15:themeFamily xmlns:thm15="http://schemas.microsoft.com/office/thememl/2012/main" name="Office Theme" id="{62F939B6-93AF-4DB8-9C6B-D6C7DFDC589F}" vid="{4A3C46E8-61CC-4603-A589-7422A47A8E4A}"/>
+    </a:ext>
+  </a:extLst>
+</a:theme>
 </file>
</xml_diff>